<commit_message>
Value and reference types
</commit_message>
<xml_diff>
--- a/Presentation/memory-management-and-gc.pptx
+++ b/Presentation/memory-management-and-gc.pptx
@@ -211,7 +211,7 @@
           <a:p>
             <a:fld id="{B24A7054-7FFB-49F4-A126-5DF6E687FF53}" type="datetimeFigureOut">
               <a:rPr lang="ru-RU" smtClean="0"/>
-              <a:t>13.09.2014</a:t>
+              <a:t>19.09.2014</a:t>
             </a:fld>
             <a:endParaRPr lang="ru-RU"/>
           </a:p>
@@ -1577,7 +1577,7 @@
           <a:p>
             <a:fld id="{8E6E6A2A-E9D3-4A0D-B04A-ABDD367A1E08}" type="datetimeFigureOut">
               <a:rPr lang="ru-RU" smtClean="0"/>
-              <a:t>13.09.2014</a:t>
+              <a:t>19.09.2014</a:t>
             </a:fld>
             <a:endParaRPr lang="ru-RU"/>
           </a:p>
@@ -3029,7 +3029,7 @@
           <a:p>
             <a:fld id="{AC3D3127-B7C4-45E3-9797-C527EC9FDD78}" type="datetimeFigureOut">
               <a:rPr lang="ru-RU" smtClean="0"/>
-              <a:t>13.09.2014</a:t>
+              <a:t>19.09.2014</a:t>
             </a:fld>
             <a:endParaRPr lang="ru-RU"/>
           </a:p>
@@ -10143,7 +10143,7 @@
         <p:spPr>
           <a:xfrm>
             <a:off x="179512" y="4653136"/>
-            <a:ext cx="8777087" cy="2062103"/>
+            <a:ext cx="8777087" cy="1938992"/>
           </a:xfrm>
           <a:prstGeom prst="rect">
             <a:avLst/>
@@ -10157,25 +10157,48 @@
           <a:lstStyle/>
           <a:p>
             <a:r>
-              <a:rPr lang="ru-RU" sz="3200" dirty="0" smtClean="0"/>
+              <a:rPr lang="ru-RU" sz="2000" dirty="0" smtClean="0"/>
               <a:t>Благодаря своему сравнительно небольшому размеру значения переменных </a:t>
             </a:r>
             <a:r>
-              <a:rPr lang="en-US" sz="3200" dirty="0" smtClean="0"/>
+              <a:rPr lang="en-US" sz="2000" dirty="0" smtClean="0"/>
               <a:t>value </a:t>
             </a:r>
             <a:r>
-              <a:rPr lang="ru-RU" sz="3200" dirty="0" smtClean="0"/>
+              <a:rPr lang="ru-RU" sz="2000" dirty="0" smtClean="0"/>
               <a:t>типа могут храниться в стеке.</a:t>
             </a:r>
             <a:r>
-              <a:rPr lang="en-US" sz="3200" dirty="0" smtClean="0"/>
+              <a:rPr lang="en-US" sz="2000" dirty="0" smtClean="0"/>
               <a:t> </a:t>
             </a:r>
             <a:r>
-              <a:rPr lang="ru-RU" sz="3200" dirty="0" smtClean="0"/>
-              <a:t>При присваивании происходит копирование значения.</a:t>
-            </a:r>
+              <a:rPr lang="ru-RU" sz="2000" dirty="0" smtClean="0"/>
+              <a:t>При присваивании происходит копирование значения</a:t>
+            </a:r>
+            <a:r>
+              <a:rPr lang="ru-RU" sz="2000" dirty="0" smtClean="0"/>
+              <a:t>.</a:t>
+            </a:r>
+            <a:endParaRPr lang="en-US" sz="2000" dirty="0" smtClean="0"/>
+          </a:p>
+          <a:p>
+            <a:endParaRPr lang="en-US" sz="2000" dirty="0"/>
+          </a:p>
+          <a:p>
+            <a:r>
+              <a:rPr lang="en-US" sz="2000" dirty="0">
+                <a:hlinkClick r:id="rId3"/>
+              </a:rPr>
+              <a:t>http://</a:t>
+            </a:r>
+            <a:r>
+              <a:rPr lang="en-US" sz="2000" dirty="0" smtClean="0">
+                <a:hlinkClick r:id="rId3"/>
+              </a:rPr>
+              <a:t>blogs.msdn.com/b/ruericlippert/archive/2010/10/25/the-truth-about-value-types.aspx</a:t>
+            </a:r>
+            <a:endParaRPr lang="ru-RU" sz="2000" dirty="0" smtClean="0"/>
           </a:p>
         </p:txBody>
       </p:sp>

</xml_diff>

<commit_message>
.NET CLR Memory performance counters
</commit_message>
<xml_diff>
--- a/Presentation/memory-management-and-gc.pptx
+++ b/Presentation/memory-management-and-gc.pptx
@@ -5,7 +5,7 @@
     <p:sldMasterId id="2147483648" r:id="rId1"/>
   </p:sldMasterIdLst>
   <p:notesMasterIdLst>
-    <p:notesMasterId r:id="rId28"/>
+    <p:notesMasterId r:id="rId29"/>
   </p:notesMasterIdLst>
   <p:sldIdLst>
     <p:sldId id="261" r:id="rId2"/>
@@ -33,7 +33,8 @@
     <p:sldId id="277" r:id="rId24"/>
     <p:sldId id="258" r:id="rId25"/>
     <p:sldId id="259" r:id="rId26"/>
-    <p:sldId id="260" r:id="rId27"/>
+    <p:sldId id="283" r:id="rId27"/>
+    <p:sldId id="260" r:id="rId28"/>
   </p:sldIdLst>
   <p:sldSz cx="9144000" cy="6858000" type="screen4x3"/>
   <p:notesSz cx="6858000" cy="9144000"/>
@@ -217,7 +218,7 @@
           <a:p>
             <a:fld id="{B24A7054-7FFB-49F4-A126-5DF6E687FF53}" type="datetimeFigureOut">
               <a:rPr lang="ru-RU" smtClean="0"/>
-              <a:t>21.08.2015</a:t>
+              <a:t>22.08.2015</a:t>
             </a:fld>
             <a:endParaRPr lang="ru-RU"/>
           </a:p>
@@ -1583,7 +1584,7 @@
           <a:p>
             <a:fld id="{8E6E6A2A-E9D3-4A0D-B04A-ABDD367A1E08}" type="datetimeFigureOut">
               <a:rPr lang="ru-RU" smtClean="0"/>
-              <a:t>21.08.2015</a:t>
+              <a:t>22.08.2015</a:t>
             </a:fld>
             <a:endParaRPr lang="ru-RU"/>
           </a:p>
@@ -3035,7 +3036,7 @@
           <a:p>
             <a:fld id="{AC3D3127-B7C4-45E3-9797-C527EC9FDD78}" type="datetimeFigureOut">
               <a:rPr lang="ru-RU" smtClean="0"/>
-              <a:t>21.08.2015</a:t>
+              <a:t>22.08.2015</a:t>
             </a:fld>
             <a:endParaRPr lang="ru-RU"/>
           </a:p>
@@ -9584,11 +9585,7 @@
           <a:p>
             <a:r>
               <a:rPr lang="en-US" dirty="0" smtClean="0"/>
-              <a:t>Workstation </a:t>
-            </a:r>
-            <a:r>
-              <a:rPr lang="en-US" dirty="0" smtClean="0"/>
-              <a:t>GC</a:t>
+              <a:t>Workstation GC</a:t>
             </a:r>
             <a:endParaRPr lang="ru-RU" dirty="0"/>
           </a:p>
@@ -12551,11 +12548,7 @@
           <a:p>
             <a:r>
               <a:rPr lang="ru-RU" sz="1400" dirty="0" smtClean="0"/>
-              <a:t>64 </a:t>
-            </a:r>
-            <a:r>
-              <a:rPr lang="ru-RU" sz="1400" dirty="0" smtClean="0"/>
-              <a:t>бита = 2</a:t>
+              <a:t>64 бита = 2</a:t>
             </a:r>
             <a:r>
               <a:rPr lang="en-US" sz="1400" dirty="0" smtClean="0"/>
@@ -12567,15 +12560,7 @@
             </a:r>
             <a:r>
               <a:rPr lang="en-US" sz="1400" dirty="0" smtClean="0"/>
-              <a:t> </a:t>
-            </a:r>
-            <a:r>
-              <a:rPr lang="en-US" sz="1400" dirty="0" smtClean="0"/>
-              <a:t>= </a:t>
-            </a:r>
-            <a:r>
-              <a:rPr lang="en-US" sz="1400" dirty="0" smtClean="0"/>
-              <a:t>17</a:t>
+              <a:t> = 17</a:t>
             </a:r>
             <a:r>
               <a:rPr lang="ru-RU" sz="1400" dirty="0" smtClean="0"/>
@@ -14263,6 +14248,4637 @@
             <p:ph type="title"/>
           </p:nvPr>
         </p:nvSpPr>
+        <p:spPr>
+          <a:xfrm>
+            <a:off x="457200" y="188640"/>
+            <a:ext cx="8229600" cy="648072"/>
+          </a:xfrm>
+        </p:spPr>
+        <p:txBody>
+          <a:bodyPr>
+            <a:normAutofit fontScale="90000"/>
+          </a:bodyPr>
+          <a:lstStyle/>
+          <a:p>
+            <a:r>
+              <a:rPr lang="ru-RU" sz="2400" dirty="0" smtClean="0"/>
+              <a:t>Счетчики производительности для мониторинга памяти</a:t>
+            </a:r>
+            <a:r>
+              <a:rPr lang="en-US" sz="2400" dirty="0" smtClean="0"/>
+              <a:t/>
+            </a:r>
+            <a:br>
+              <a:rPr lang="en-US" sz="2400" dirty="0" smtClean="0"/>
+            </a:br>
+            <a:r>
+              <a:rPr lang="en-US" sz="2400" dirty="0" smtClean="0"/>
+              <a:t>(</a:t>
+            </a:r>
+            <a:r>
+              <a:rPr lang="ru-RU" sz="2400" dirty="0" smtClean="0"/>
+              <a:t>категория </a:t>
+            </a:r>
+            <a:r>
+              <a:rPr lang="en-US" sz="2000" dirty="0"/>
+              <a:t>.NET CLR </a:t>
+            </a:r>
+            <a:r>
+              <a:rPr lang="en-US" sz="2000" dirty="0" smtClean="0"/>
+              <a:t>Memory</a:t>
+            </a:r>
+            <a:r>
+              <a:rPr lang="ru-RU" sz="2000" dirty="0" smtClean="0"/>
+              <a:t>)</a:t>
+            </a:r>
+            <a:endParaRPr lang="ru-RU" sz="2400" dirty="0"/>
+          </a:p>
+        </p:txBody>
+      </p:sp>
+      <p:graphicFrame>
+        <p:nvGraphicFramePr>
+          <p:cNvPr id="8" name="Table 7"/>
+          <p:cNvGraphicFramePr>
+            <a:graphicFrameLocks noGrp="1"/>
+          </p:cNvGraphicFramePr>
+          <p:nvPr>
+            <p:extLst>
+              <p:ext uri="{D42A27DB-BD31-4B8C-83A1-F6EECF244321}">
+                <p14:modId xmlns:p14="http://schemas.microsoft.com/office/powerpoint/2010/main" val="541397274"/>
+              </p:ext>
+            </p:extLst>
+          </p:nvPr>
+        </p:nvGraphicFramePr>
+        <p:xfrm>
+          <a:off x="467544" y="1124744"/>
+          <a:ext cx="8208912" cy="5394960"/>
+        </p:xfrm>
+        <a:graphic>
+          <a:graphicData uri="http://schemas.openxmlformats.org/drawingml/2006/table">
+            <a:tbl>
+              <a:tblPr/>
+              <a:tblGrid>
+                <a:gridCol w="3312368"/>
+                <a:gridCol w="4896544"/>
+              </a:tblGrid>
+              <a:tr h="182299">
+                <a:tc>
+                  <a:txBody>
+                    <a:bodyPr/>
+                    <a:lstStyle>
+                      <a:lvl1pPr marL="0" algn="l" defTabSz="914400" rtl="0" eaLnBrk="1" latinLnBrk="0" hangingPunct="1">
+                        <a:defRPr sz="1800" kern="1200">
+                          <a:solidFill>
+                            <a:schemeClr val="tx1"/>
+                          </a:solidFill>
+                          <a:latin typeface="Calibri"/>
+                        </a:defRPr>
+                      </a:lvl1pPr>
+                      <a:lvl2pPr marL="457200" algn="l" defTabSz="914400" rtl="0" eaLnBrk="1" latinLnBrk="0" hangingPunct="1">
+                        <a:defRPr sz="1800" kern="1200">
+                          <a:solidFill>
+                            <a:schemeClr val="tx1"/>
+                          </a:solidFill>
+                          <a:latin typeface="Calibri"/>
+                        </a:defRPr>
+                      </a:lvl2pPr>
+                      <a:lvl3pPr marL="914400" algn="l" defTabSz="914400" rtl="0" eaLnBrk="1" latinLnBrk="0" hangingPunct="1">
+                        <a:defRPr sz="1800" kern="1200">
+                          <a:solidFill>
+                            <a:schemeClr val="tx1"/>
+                          </a:solidFill>
+                          <a:latin typeface="Calibri"/>
+                        </a:defRPr>
+                      </a:lvl3pPr>
+                      <a:lvl4pPr marL="1371600" algn="l" defTabSz="914400" rtl="0" eaLnBrk="1" latinLnBrk="0" hangingPunct="1">
+                        <a:defRPr sz="1800" kern="1200">
+                          <a:solidFill>
+                            <a:schemeClr val="tx1"/>
+                          </a:solidFill>
+                          <a:latin typeface="Calibri"/>
+                        </a:defRPr>
+                      </a:lvl4pPr>
+                      <a:lvl5pPr marL="1828800" algn="l" defTabSz="914400" rtl="0" eaLnBrk="1" latinLnBrk="0" hangingPunct="1">
+                        <a:defRPr sz="1800" kern="1200">
+                          <a:solidFill>
+                            <a:schemeClr val="tx1"/>
+                          </a:solidFill>
+                          <a:latin typeface="Calibri"/>
+                        </a:defRPr>
+                      </a:lvl5pPr>
+                      <a:lvl6pPr marL="2286000" algn="l" defTabSz="914400" rtl="0" eaLnBrk="1" latinLnBrk="0" hangingPunct="1">
+                        <a:defRPr sz="1800" kern="1200">
+                          <a:solidFill>
+                            <a:schemeClr val="tx1"/>
+                          </a:solidFill>
+                          <a:latin typeface="Calibri"/>
+                        </a:defRPr>
+                      </a:lvl6pPr>
+                      <a:lvl7pPr marL="2743200" algn="l" defTabSz="914400" rtl="0" eaLnBrk="1" latinLnBrk="0" hangingPunct="1">
+                        <a:defRPr sz="1800" kern="1200">
+                          <a:solidFill>
+                            <a:schemeClr val="tx1"/>
+                          </a:solidFill>
+                          <a:latin typeface="Calibri"/>
+                        </a:defRPr>
+                      </a:lvl7pPr>
+                      <a:lvl8pPr marL="3200400" algn="l" defTabSz="914400" rtl="0" eaLnBrk="1" latinLnBrk="0" hangingPunct="1">
+                        <a:defRPr sz="1800" kern="1200">
+                          <a:solidFill>
+                            <a:schemeClr val="tx1"/>
+                          </a:solidFill>
+                          <a:latin typeface="Calibri"/>
+                        </a:defRPr>
+                      </a:lvl8pPr>
+                      <a:lvl9pPr marL="3657600" algn="l" defTabSz="914400" rtl="0" eaLnBrk="1" latinLnBrk="0" hangingPunct="1">
+                        <a:defRPr sz="1800" kern="1200">
+                          <a:solidFill>
+                            <a:schemeClr val="tx1"/>
+                          </a:solidFill>
+                          <a:latin typeface="Calibri"/>
+                        </a:defRPr>
+                      </a:lvl9pPr>
+                    </a:lstStyle>
+                    <a:p>
+                      <a:pPr algn="l" fontAlgn="b"/>
+                      <a:r>
+                        <a:rPr lang="ru-RU" sz="1400" b="0" i="0" u="none" strike="noStrike" dirty="0" smtClean="0">
+                          <a:solidFill>
+                            <a:srgbClr val="0070C0"/>
+                          </a:solidFill>
+                          <a:effectLst/>
+                          <a:latin typeface="+mn-lt"/>
+                          <a:cs typeface="Consolas" panose="020B0609020204030204" pitchFamily="49" charset="0"/>
+                        </a:rPr>
+                        <a:t>Название</a:t>
+                      </a:r>
+                      <a:endParaRPr lang="en-US" sz="1400" b="0" i="0" u="none" strike="noStrike" dirty="0">
+                        <a:solidFill>
+                          <a:srgbClr val="0070C0"/>
+                        </a:solidFill>
+                        <a:effectLst/>
+                        <a:latin typeface="+mn-lt"/>
+                        <a:cs typeface="Consolas" panose="020B0609020204030204" pitchFamily="49" charset="0"/>
+                      </a:endParaRPr>
+                    </a:p>
+                  </a:txBody>
+                  <a:tcPr marL="45720" marR="45720" anchor="b">
+                    <a:lnL w="12700" cap="flat" cmpd="sng" algn="ctr">
+                      <a:solidFill>
+                        <a:srgbClr val="FFFFFF"/>
+                      </a:solidFill>
+                      <a:prstDash val="solid"/>
+                      <a:round/>
+                      <a:headEnd type="none" w="med" len="med"/>
+                      <a:tailEnd type="none" w="med" len="med"/>
+                    </a:lnL>
+                    <a:lnR w="12700" cap="flat" cmpd="sng" algn="ctr">
+                      <a:solidFill>
+                        <a:srgbClr val="FFFFFF"/>
+                      </a:solidFill>
+                      <a:prstDash val="solid"/>
+                      <a:round/>
+                      <a:headEnd type="none" w="med" len="med"/>
+                      <a:tailEnd type="none" w="med" len="med"/>
+                    </a:lnR>
+                    <a:lnT w="12700" cap="flat" cmpd="sng" algn="ctr">
+                      <a:solidFill>
+                        <a:srgbClr val="FFFFFF"/>
+                      </a:solidFill>
+                      <a:prstDash val="solid"/>
+                      <a:round/>
+                      <a:headEnd type="none" w="med" len="med"/>
+                      <a:tailEnd type="none" w="med" len="med"/>
+                    </a:lnT>
+                    <a:lnB w="12700" cap="flat" cmpd="sng" algn="ctr">
+                      <a:solidFill>
+                        <a:srgbClr val="FFFFFF"/>
+                      </a:solidFill>
+                      <a:prstDash val="solid"/>
+                      <a:round/>
+                      <a:headEnd type="none" w="med" len="med"/>
+                      <a:tailEnd type="none" w="med" len="med"/>
+                    </a:lnB>
+                    <a:lnTlToBr w="12700" cmpd="sng">
+                      <a:noFill/>
+                      <a:prstDash val="solid"/>
+                    </a:lnTlToBr>
+                    <a:lnBlToTr w="12700" cmpd="sng">
+                      <a:noFill/>
+                      <a:prstDash val="solid"/>
+                    </a:lnBlToTr>
+                    <a:solidFill>
+                      <a:srgbClr val="FFFFFF"/>
+                    </a:solidFill>
+                  </a:tcPr>
+                </a:tc>
+                <a:tc>
+                  <a:txBody>
+                    <a:bodyPr/>
+                    <a:lstStyle>
+                      <a:lvl1pPr marL="0" algn="l" defTabSz="914400" rtl="0" eaLnBrk="1" latinLnBrk="0" hangingPunct="1">
+                        <a:defRPr sz="1800" kern="1200">
+                          <a:solidFill>
+                            <a:schemeClr val="tx1"/>
+                          </a:solidFill>
+                          <a:latin typeface="Calibri"/>
+                        </a:defRPr>
+                      </a:lvl1pPr>
+                      <a:lvl2pPr marL="457200" algn="l" defTabSz="914400" rtl="0" eaLnBrk="1" latinLnBrk="0" hangingPunct="1">
+                        <a:defRPr sz="1800" kern="1200">
+                          <a:solidFill>
+                            <a:schemeClr val="tx1"/>
+                          </a:solidFill>
+                          <a:latin typeface="Calibri"/>
+                        </a:defRPr>
+                      </a:lvl2pPr>
+                      <a:lvl3pPr marL="914400" algn="l" defTabSz="914400" rtl="0" eaLnBrk="1" latinLnBrk="0" hangingPunct="1">
+                        <a:defRPr sz="1800" kern="1200">
+                          <a:solidFill>
+                            <a:schemeClr val="tx1"/>
+                          </a:solidFill>
+                          <a:latin typeface="Calibri"/>
+                        </a:defRPr>
+                      </a:lvl3pPr>
+                      <a:lvl4pPr marL="1371600" algn="l" defTabSz="914400" rtl="0" eaLnBrk="1" latinLnBrk="0" hangingPunct="1">
+                        <a:defRPr sz="1800" kern="1200">
+                          <a:solidFill>
+                            <a:schemeClr val="tx1"/>
+                          </a:solidFill>
+                          <a:latin typeface="Calibri"/>
+                        </a:defRPr>
+                      </a:lvl4pPr>
+                      <a:lvl5pPr marL="1828800" algn="l" defTabSz="914400" rtl="0" eaLnBrk="1" latinLnBrk="0" hangingPunct="1">
+                        <a:defRPr sz="1800" kern="1200">
+                          <a:solidFill>
+                            <a:schemeClr val="tx1"/>
+                          </a:solidFill>
+                          <a:latin typeface="Calibri"/>
+                        </a:defRPr>
+                      </a:lvl5pPr>
+                      <a:lvl6pPr marL="2286000" algn="l" defTabSz="914400" rtl="0" eaLnBrk="1" latinLnBrk="0" hangingPunct="1">
+                        <a:defRPr sz="1800" kern="1200">
+                          <a:solidFill>
+                            <a:schemeClr val="tx1"/>
+                          </a:solidFill>
+                          <a:latin typeface="Calibri"/>
+                        </a:defRPr>
+                      </a:lvl6pPr>
+                      <a:lvl7pPr marL="2743200" algn="l" defTabSz="914400" rtl="0" eaLnBrk="1" latinLnBrk="0" hangingPunct="1">
+                        <a:defRPr sz="1800" kern="1200">
+                          <a:solidFill>
+                            <a:schemeClr val="tx1"/>
+                          </a:solidFill>
+                          <a:latin typeface="Calibri"/>
+                        </a:defRPr>
+                      </a:lvl7pPr>
+                      <a:lvl8pPr marL="3200400" algn="l" defTabSz="914400" rtl="0" eaLnBrk="1" latinLnBrk="0" hangingPunct="1">
+                        <a:defRPr sz="1800" kern="1200">
+                          <a:solidFill>
+                            <a:schemeClr val="tx1"/>
+                          </a:solidFill>
+                          <a:latin typeface="Calibri"/>
+                        </a:defRPr>
+                      </a:lvl8pPr>
+                      <a:lvl9pPr marL="3657600" algn="l" defTabSz="914400" rtl="0" eaLnBrk="1" latinLnBrk="0" hangingPunct="1">
+                        <a:defRPr sz="1800" kern="1200">
+                          <a:solidFill>
+                            <a:schemeClr val="tx1"/>
+                          </a:solidFill>
+                          <a:latin typeface="Calibri"/>
+                        </a:defRPr>
+                      </a:lvl9pPr>
+                    </a:lstStyle>
+                    <a:p>
+                      <a:pPr algn="l" fontAlgn="b"/>
+                      <a:r>
+                        <a:rPr lang="ru-RU" sz="1400" b="0" i="0" u="none" strike="noStrike" dirty="0" smtClean="0">
+                          <a:solidFill>
+                            <a:srgbClr val="0070C0"/>
+                          </a:solidFill>
+                          <a:effectLst/>
+                          <a:latin typeface="+mn-lt"/>
+                          <a:cs typeface="Consolas" panose="020B0609020204030204" pitchFamily="49" charset="0"/>
+                        </a:rPr>
+                        <a:t>Описание</a:t>
+                      </a:r>
+                      <a:endParaRPr lang="en-US" sz="1400" b="0" i="0" u="none" strike="noStrike" dirty="0">
+                        <a:solidFill>
+                          <a:srgbClr val="0070C0"/>
+                        </a:solidFill>
+                        <a:effectLst/>
+                        <a:latin typeface="+mn-lt"/>
+                        <a:cs typeface="Consolas" panose="020B0609020204030204" pitchFamily="49" charset="0"/>
+                      </a:endParaRPr>
+                    </a:p>
+                  </a:txBody>
+                  <a:tcPr marL="45720" marR="45720" anchor="b">
+                    <a:lnL w="12700" cap="flat" cmpd="sng" algn="ctr">
+                      <a:solidFill>
+                        <a:srgbClr val="FFFFFF"/>
+                      </a:solidFill>
+                      <a:prstDash val="solid"/>
+                      <a:round/>
+                      <a:headEnd type="none" w="med" len="med"/>
+                      <a:tailEnd type="none" w="med" len="med"/>
+                    </a:lnL>
+                    <a:lnR w="12700" cap="flat" cmpd="sng" algn="ctr">
+                      <a:solidFill>
+                        <a:srgbClr val="FFFFFF"/>
+                      </a:solidFill>
+                      <a:prstDash val="solid"/>
+                      <a:round/>
+                      <a:headEnd type="none" w="med" len="med"/>
+                      <a:tailEnd type="none" w="med" len="med"/>
+                    </a:lnR>
+                    <a:lnT w="12700" cap="flat" cmpd="sng" algn="ctr">
+                      <a:solidFill>
+                        <a:srgbClr val="FFFFFF"/>
+                      </a:solidFill>
+                      <a:prstDash val="solid"/>
+                      <a:round/>
+                      <a:headEnd type="none" w="med" len="med"/>
+                      <a:tailEnd type="none" w="med" len="med"/>
+                    </a:lnT>
+                    <a:lnB w="12700" cap="flat" cmpd="sng" algn="ctr">
+                      <a:solidFill>
+                        <a:srgbClr val="FFFFFF"/>
+                      </a:solidFill>
+                      <a:prstDash val="solid"/>
+                      <a:round/>
+                      <a:headEnd type="none" w="med" len="med"/>
+                      <a:tailEnd type="none" w="med" len="med"/>
+                    </a:lnB>
+                    <a:lnTlToBr w="12700" cmpd="sng">
+                      <a:noFill/>
+                      <a:prstDash val="solid"/>
+                    </a:lnTlToBr>
+                    <a:lnBlToTr w="12700" cmpd="sng">
+                      <a:noFill/>
+                      <a:prstDash val="solid"/>
+                    </a:lnBlToTr>
+                    <a:solidFill>
+                      <a:srgbClr val="FFFFFF"/>
+                    </a:solidFill>
+                  </a:tcPr>
+                </a:tc>
+              </a:tr>
+              <a:tr h="182299">
+                <a:tc>
+                  <a:txBody>
+                    <a:bodyPr/>
+                    <a:lstStyle>
+                      <a:lvl1pPr marL="0" algn="l" defTabSz="914400" rtl="0" eaLnBrk="1" latinLnBrk="0" hangingPunct="1">
+                        <a:defRPr sz="1800" kern="1200">
+                          <a:solidFill>
+                            <a:schemeClr val="tx1"/>
+                          </a:solidFill>
+                          <a:latin typeface="Calibri"/>
+                        </a:defRPr>
+                      </a:lvl1pPr>
+                      <a:lvl2pPr marL="457200" algn="l" defTabSz="914400" rtl="0" eaLnBrk="1" latinLnBrk="0" hangingPunct="1">
+                        <a:defRPr sz="1800" kern="1200">
+                          <a:solidFill>
+                            <a:schemeClr val="tx1"/>
+                          </a:solidFill>
+                          <a:latin typeface="Calibri"/>
+                        </a:defRPr>
+                      </a:lvl2pPr>
+                      <a:lvl3pPr marL="914400" algn="l" defTabSz="914400" rtl="0" eaLnBrk="1" latinLnBrk="0" hangingPunct="1">
+                        <a:defRPr sz="1800" kern="1200">
+                          <a:solidFill>
+                            <a:schemeClr val="tx1"/>
+                          </a:solidFill>
+                          <a:latin typeface="Calibri"/>
+                        </a:defRPr>
+                      </a:lvl3pPr>
+                      <a:lvl4pPr marL="1371600" algn="l" defTabSz="914400" rtl="0" eaLnBrk="1" latinLnBrk="0" hangingPunct="1">
+                        <a:defRPr sz="1800" kern="1200">
+                          <a:solidFill>
+                            <a:schemeClr val="tx1"/>
+                          </a:solidFill>
+                          <a:latin typeface="Calibri"/>
+                        </a:defRPr>
+                      </a:lvl4pPr>
+                      <a:lvl5pPr marL="1828800" algn="l" defTabSz="914400" rtl="0" eaLnBrk="1" latinLnBrk="0" hangingPunct="1">
+                        <a:defRPr sz="1800" kern="1200">
+                          <a:solidFill>
+                            <a:schemeClr val="tx1"/>
+                          </a:solidFill>
+                          <a:latin typeface="Calibri"/>
+                        </a:defRPr>
+                      </a:lvl5pPr>
+                      <a:lvl6pPr marL="2286000" algn="l" defTabSz="914400" rtl="0" eaLnBrk="1" latinLnBrk="0" hangingPunct="1">
+                        <a:defRPr sz="1800" kern="1200">
+                          <a:solidFill>
+                            <a:schemeClr val="tx1"/>
+                          </a:solidFill>
+                          <a:latin typeface="Calibri"/>
+                        </a:defRPr>
+                      </a:lvl6pPr>
+                      <a:lvl7pPr marL="2743200" algn="l" defTabSz="914400" rtl="0" eaLnBrk="1" latinLnBrk="0" hangingPunct="1">
+                        <a:defRPr sz="1800" kern="1200">
+                          <a:solidFill>
+                            <a:schemeClr val="tx1"/>
+                          </a:solidFill>
+                          <a:latin typeface="Calibri"/>
+                        </a:defRPr>
+                      </a:lvl7pPr>
+                      <a:lvl8pPr marL="3200400" algn="l" defTabSz="914400" rtl="0" eaLnBrk="1" latinLnBrk="0" hangingPunct="1">
+                        <a:defRPr sz="1800" kern="1200">
+                          <a:solidFill>
+                            <a:schemeClr val="tx1"/>
+                          </a:solidFill>
+                          <a:latin typeface="Calibri"/>
+                        </a:defRPr>
+                      </a:lvl8pPr>
+                      <a:lvl9pPr marL="3657600" algn="l" defTabSz="914400" rtl="0" eaLnBrk="1" latinLnBrk="0" hangingPunct="1">
+                        <a:defRPr sz="1800" kern="1200">
+                          <a:solidFill>
+                            <a:schemeClr val="tx1"/>
+                          </a:solidFill>
+                          <a:latin typeface="Calibri"/>
+                        </a:defRPr>
+                      </a:lvl9pPr>
+                    </a:lstStyle>
+                    <a:p>
+                      <a:pPr algn="l" fontAlgn="b"/>
+                      <a:r>
+                        <a:rPr lang="en-US" sz="1400" b="1" i="0" u="none" strike="noStrike" dirty="0" smtClean="0">
+                          <a:solidFill>
+                            <a:schemeClr val="bg1"/>
+                          </a:solidFill>
+                          <a:effectLst/>
+                          <a:latin typeface="+mn-lt"/>
+                          <a:cs typeface="Consolas" panose="020B0609020204030204" pitchFamily="49" charset="0"/>
+                        </a:rPr>
+                        <a:t># Bytes in all Heaps</a:t>
+                      </a:r>
+                      <a:endParaRPr lang="en-US" sz="1400" b="1" i="0" u="none" strike="noStrike" dirty="0">
+                        <a:solidFill>
+                          <a:schemeClr val="bg1"/>
+                        </a:solidFill>
+                        <a:effectLst/>
+                        <a:latin typeface="+mn-lt"/>
+                        <a:cs typeface="Consolas" panose="020B0609020204030204" pitchFamily="49" charset="0"/>
+                      </a:endParaRPr>
+                    </a:p>
+                  </a:txBody>
+                  <a:tcPr marL="45720" marR="45720" anchor="b">
+                    <a:lnL w="12700" cap="flat" cmpd="sng" algn="ctr">
+                      <a:solidFill>
+                        <a:srgbClr val="FFFFFF"/>
+                      </a:solidFill>
+                      <a:prstDash val="solid"/>
+                      <a:round/>
+                      <a:headEnd type="none" w="med" len="med"/>
+                      <a:tailEnd type="none" w="med" len="med"/>
+                    </a:lnL>
+                    <a:lnR w="12700" cap="flat" cmpd="sng" algn="ctr">
+                      <a:solidFill>
+                        <a:srgbClr val="FFFFFF"/>
+                      </a:solidFill>
+                      <a:prstDash val="solid"/>
+                      <a:round/>
+                      <a:headEnd type="none" w="med" len="med"/>
+                      <a:tailEnd type="none" w="med" len="med"/>
+                    </a:lnR>
+                    <a:lnT w="12700" cap="flat" cmpd="sng" algn="ctr">
+                      <a:solidFill>
+                        <a:srgbClr val="FFFFFF"/>
+                      </a:solidFill>
+                      <a:prstDash val="solid"/>
+                      <a:round/>
+                      <a:headEnd type="none" w="med" len="med"/>
+                      <a:tailEnd type="none" w="med" len="med"/>
+                    </a:lnT>
+                    <a:lnB w="12700" cap="flat" cmpd="sng" algn="ctr">
+                      <a:solidFill>
+                        <a:srgbClr val="FFFFFF"/>
+                      </a:solidFill>
+                      <a:prstDash val="solid"/>
+                      <a:round/>
+                      <a:headEnd type="none" w="med" len="med"/>
+                      <a:tailEnd type="none" w="med" len="med"/>
+                    </a:lnB>
+                    <a:lnTlToBr w="12700" cmpd="sng">
+                      <a:noFill/>
+                      <a:prstDash val="solid"/>
+                    </a:lnTlToBr>
+                    <a:lnBlToTr w="12700" cmpd="sng">
+                      <a:noFill/>
+                      <a:prstDash val="solid"/>
+                    </a:lnBlToTr>
+                    <a:noFill/>
+                  </a:tcPr>
+                </a:tc>
+                <a:tc>
+                  <a:txBody>
+                    <a:bodyPr/>
+                    <a:lstStyle>
+                      <a:lvl1pPr marL="0" algn="l" defTabSz="914400" rtl="0" eaLnBrk="1" latinLnBrk="0" hangingPunct="1">
+                        <a:defRPr sz="1800" kern="1200">
+                          <a:solidFill>
+                            <a:schemeClr val="tx1"/>
+                          </a:solidFill>
+                          <a:latin typeface="Calibri"/>
+                        </a:defRPr>
+                      </a:lvl1pPr>
+                      <a:lvl2pPr marL="457200" algn="l" defTabSz="914400" rtl="0" eaLnBrk="1" latinLnBrk="0" hangingPunct="1">
+                        <a:defRPr sz="1800" kern="1200">
+                          <a:solidFill>
+                            <a:schemeClr val="tx1"/>
+                          </a:solidFill>
+                          <a:latin typeface="Calibri"/>
+                        </a:defRPr>
+                      </a:lvl2pPr>
+                      <a:lvl3pPr marL="914400" algn="l" defTabSz="914400" rtl="0" eaLnBrk="1" latinLnBrk="0" hangingPunct="1">
+                        <a:defRPr sz="1800" kern="1200">
+                          <a:solidFill>
+                            <a:schemeClr val="tx1"/>
+                          </a:solidFill>
+                          <a:latin typeface="Calibri"/>
+                        </a:defRPr>
+                      </a:lvl3pPr>
+                      <a:lvl4pPr marL="1371600" algn="l" defTabSz="914400" rtl="0" eaLnBrk="1" latinLnBrk="0" hangingPunct="1">
+                        <a:defRPr sz="1800" kern="1200">
+                          <a:solidFill>
+                            <a:schemeClr val="tx1"/>
+                          </a:solidFill>
+                          <a:latin typeface="Calibri"/>
+                        </a:defRPr>
+                      </a:lvl4pPr>
+                      <a:lvl5pPr marL="1828800" algn="l" defTabSz="914400" rtl="0" eaLnBrk="1" latinLnBrk="0" hangingPunct="1">
+                        <a:defRPr sz="1800" kern="1200">
+                          <a:solidFill>
+                            <a:schemeClr val="tx1"/>
+                          </a:solidFill>
+                          <a:latin typeface="Calibri"/>
+                        </a:defRPr>
+                      </a:lvl5pPr>
+                      <a:lvl6pPr marL="2286000" algn="l" defTabSz="914400" rtl="0" eaLnBrk="1" latinLnBrk="0" hangingPunct="1">
+                        <a:defRPr sz="1800" kern="1200">
+                          <a:solidFill>
+                            <a:schemeClr val="tx1"/>
+                          </a:solidFill>
+                          <a:latin typeface="Calibri"/>
+                        </a:defRPr>
+                      </a:lvl6pPr>
+                      <a:lvl7pPr marL="2743200" algn="l" defTabSz="914400" rtl="0" eaLnBrk="1" latinLnBrk="0" hangingPunct="1">
+                        <a:defRPr sz="1800" kern="1200">
+                          <a:solidFill>
+                            <a:schemeClr val="tx1"/>
+                          </a:solidFill>
+                          <a:latin typeface="Calibri"/>
+                        </a:defRPr>
+                      </a:lvl7pPr>
+                      <a:lvl8pPr marL="3200400" algn="l" defTabSz="914400" rtl="0" eaLnBrk="1" latinLnBrk="0" hangingPunct="1">
+                        <a:defRPr sz="1800" kern="1200">
+                          <a:solidFill>
+                            <a:schemeClr val="tx1"/>
+                          </a:solidFill>
+                          <a:latin typeface="Calibri"/>
+                        </a:defRPr>
+                      </a:lvl8pPr>
+                      <a:lvl9pPr marL="3657600" algn="l" defTabSz="914400" rtl="0" eaLnBrk="1" latinLnBrk="0" hangingPunct="1">
+                        <a:defRPr sz="1800" kern="1200">
+                          <a:solidFill>
+                            <a:schemeClr val="tx1"/>
+                          </a:solidFill>
+                          <a:latin typeface="Calibri"/>
+                        </a:defRPr>
+                      </a:lvl9pPr>
+                    </a:lstStyle>
+                    <a:p>
+                      <a:pPr algn="l" fontAlgn="b"/>
+                      <a:r>
+                        <a:rPr lang="ru-RU" sz="1400" b="0" i="0" u="none" strike="noStrike" dirty="0" smtClean="0">
+                          <a:solidFill>
+                            <a:schemeClr val="bg1"/>
+                          </a:solidFill>
+                          <a:effectLst/>
+                          <a:latin typeface="+mn-lt"/>
+                          <a:cs typeface="Consolas" panose="020B0609020204030204" pitchFamily="49" charset="0"/>
+                        </a:rPr>
+                        <a:t>Общий размер кучи</a:t>
+                      </a:r>
+                      <a:r>
+                        <a:rPr lang="en-US" sz="1400" b="0" i="0" u="none" strike="noStrike" dirty="0" smtClean="0">
+                          <a:solidFill>
+                            <a:schemeClr val="bg1"/>
+                          </a:solidFill>
+                          <a:effectLst/>
+                          <a:latin typeface="+mn-lt"/>
+                          <a:cs typeface="Consolas" panose="020B0609020204030204" pitchFamily="49" charset="0"/>
+                        </a:rPr>
+                        <a:t>:</a:t>
+                      </a:r>
+                      <a:r>
+                        <a:rPr lang="ru-RU" sz="1400" b="0" i="0" u="none" strike="noStrike" dirty="0" smtClean="0">
+                          <a:solidFill>
+                            <a:schemeClr val="bg1"/>
+                          </a:solidFill>
+                          <a:effectLst/>
+                          <a:latin typeface="+mn-lt"/>
+                          <a:cs typeface="Consolas" panose="020B0609020204030204" pitchFamily="49" charset="0"/>
+                        </a:rPr>
+                        <a:t> </a:t>
+                      </a:r>
+                      <a:r>
+                        <a:rPr lang="en-US" sz="1400" b="0" i="0" u="none" strike="noStrike" dirty="0" smtClean="0">
+                          <a:solidFill>
+                            <a:schemeClr val="bg1"/>
+                          </a:solidFill>
+                          <a:effectLst/>
+                          <a:latin typeface="+mn-lt"/>
+                          <a:cs typeface="Consolas" panose="020B0609020204030204" pitchFamily="49" charset="0"/>
+                        </a:rPr>
+                        <a:t>Gen0+Gen1+Gen2+LOH</a:t>
+                      </a:r>
+                      <a:endParaRPr lang="en-US" sz="1400" b="0" i="0" u="none" strike="noStrike" dirty="0">
+                        <a:solidFill>
+                          <a:schemeClr val="bg1"/>
+                        </a:solidFill>
+                        <a:effectLst/>
+                        <a:latin typeface="+mn-lt"/>
+                        <a:cs typeface="Consolas" panose="020B0609020204030204" pitchFamily="49" charset="0"/>
+                      </a:endParaRPr>
+                    </a:p>
+                  </a:txBody>
+                  <a:tcPr marL="45720" marR="45720" anchor="b">
+                    <a:lnL w="12700" cap="flat" cmpd="sng" algn="ctr">
+                      <a:solidFill>
+                        <a:srgbClr val="FFFFFF"/>
+                      </a:solidFill>
+                      <a:prstDash val="solid"/>
+                      <a:round/>
+                      <a:headEnd type="none" w="med" len="med"/>
+                      <a:tailEnd type="none" w="med" len="med"/>
+                    </a:lnL>
+                    <a:lnR w="12700" cap="flat" cmpd="sng" algn="ctr">
+                      <a:solidFill>
+                        <a:srgbClr val="FFFFFF"/>
+                      </a:solidFill>
+                      <a:prstDash val="solid"/>
+                      <a:round/>
+                      <a:headEnd type="none" w="med" len="med"/>
+                      <a:tailEnd type="none" w="med" len="med"/>
+                    </a:lnR>
+                    <a:lnT w="12700" cap="flat" cmpd="sng" algn="ctr">
+                      <a:solidFill>
+                        <a:srgbClr val="FFFFFF"/>
+                      </a:solidFill>
+                      <a:prstDash val="solid"/>
+                      <a:round/>
+                      <a:headEnd type="none" w="med" len="med"/>
+                      <a:tailEnd type="none" w="med" len="med"/>
+                    </a:lnT>
+                    <a:lnB w="12700" cap="flat" cmpd="sng" algn="ctr">
+                      <a:solidFill>
+                        <a:srgbClr val="FFFFFF"/>
+                      </a:solidFill>
+                      <a:prstDash val="solid"/>
+                      <a:round/>
+                      <a:headEnd type="none" w="med" len="med"/>
+                      <a:tailEnd type="none" w="med" len="med"/>
+                    </a:lnB>
+                    <a:lnTlToBr w="12700" cmpd="sng">
+                      <a:noFill/>
+                      <a:prstDash val="solid"/>
+                    </a:lnTlToBr>
+                    <a:lnBlToTr w="12700" cmpd="sng">
+                      <a:noFill/>
+                      <a:prstDash val="solid"/>
+                    </a:lnBlToTr>
+                    <a:noFill/>
+                  </a:tcPr>
+                </a:tc>
+              </a:tr>
+              <a:tr h="182299">
+                <a:tc>
+                  <a:txBody>
+                    <a:bodyPr/>
+                    <a:lstStyle>
+                      <a:lvl1pPr marL="0" algn="l" defTabSz="914400" rtl="0" eaLnBrk="1" latinLnBrk="0" hangingPunct="1">
+                        <a:defRPr sz="1800" kern="1200">
+                          <a:solidFill>
+                            <a:schemeClr val="tx1"/>
+                          </a:solidFill>
+                          <a:latin typeface="Calibri"/>
+                        </a:defRPr>
+                      </a:lvl1pPr>
+                      <a:lvl2pPr marL="457200" algn="l" defTabSz="914400" rtl="0" eaLnBrk="1" latinLnBrk="0" hangingPunct="1">
+                        <a:defRPr sz="1800" kern="1200">
+                          <a:solidFill>
+                            <a:schemeClr val="tx1"/>
+                          </a:solidFill>
+                          <a:latin typeface="Calibri"/>
+                        </a:defRPr>
+                      </a:lvl2pPr>
+                      <a:lvl3pPr marL="914400" algn="l" defTabSz="914400" rtl="0" eaLnBrk="1" latinLnBrk="0" hangingPunct="1">
+                        <a:defRPr sz="1800" kern="1200">
+                          <a:solidFill>
+                            <a:schemeClr val="tx1"/>
+                          </a:solidFill>
+                          <a:latin typeface="Calibri"/>
+                        </a:defRPr>
+                      </a:lvl3pPr>
+                      <a:lvl4pPr marL="1371600" algn="l" defTabSz="914400" rtl="0" eaLnBrk="1" latinLnBrk="0" hangingPunct="1">
+                        <a:defRPr sz="1800" kern="1200">
+                          <a:solidFill>
+                            <a:schemeClr val="tx1"/>
+                          </a:solidFill>
+                          <a:latin typeface="Calibri"/>
+                        </a:defRPr>
+                      </a:lvl4pPr>
+                      <a:lvl5pPr marL="1828800" algn="l" defTabSz="914400" rtl="0" eaLnBrk="1" latinLnBrk="0" hangingPunct="1">
+                        <a:defRPr sz="1800" kern="1200">
+                          <a:solidFill>
+                            <a:schemeClr val="tx1"/>
+                          </a:solidFill>
+                          <a:latin typeface="Calibri"/>
+                        </a:defRPr>
+                      </a:lvl5pPr>
+                      <a:lvl6pPr marL="2286000" algn="l" defTabSz="914400" rtl="0" eaLnBrk="1" latinLnBrk="0" hangingPunct="1">
+                        <a:defRPr sz="1800" kern="1200">
+                          <a:solidFill>
+                            <a:schemeClr val="tx1"/>
+                          </a:solidFill>
+                          <a:latin typeface="Calibri"/>
+                        </a:defRPr>
+                      </a:lvl6pPr>
+                      <a:lvl7pPr marL="2743200" algn="l" defTabSz="914400" rtl="0" eaLnBrk="1" latinLnBrk="0" hangingPunct="1">
+                        <a:defRPr sz="1800" kern="1200">
+                          <a:solidFill>
+                            <a:schemeClr val="tx1"/>
+                          </a:solidFill>
+                          <a:latin typeface="Calibri"/>
+                        </a:defRPr>
+                      </a:lvl7pPr>
+                      <a:lvl8pPr marL="3200400" algn="l" defTabSz="914400" rtl="0" eaLnBrk="1" latinLnBrk="0" hangingPunct="1">
+                        <a:defRPr sz="1800" kern="1200">
+                          <a:solidFill>
+                            <a:schemeClr val="tx1"/>
+                          </a:solidFill>
+                          <a:latin typeface="Calibri"/>
+                        </a:defRPr>
+                      </a:lvl8pPr>
+                      <a:lvl9pPr marL="3657600" algn="l" defTabSz="914400" rtl="0" eaLnBrk="1" latinLnBrk="0" hangingPunct="1">
+                        <a:defRPr sz="1800" kern="1200">
+                          <a:solidFill>
+                            <a:schemeClr val="tx1"/>
+                          </a:solidFill>
+                          <a:latin typeface="Calibri"/>
+                        </a:defRPr>
+                      </a:lvl9pPr>
+                    </a:lstStyle>
+                    <a:p>
+                      <a:pPr algn="l" fontAlgn="b"/>
+                      <a:r>
+                        <a:rPr lang="en-US" sz="1400" b="1" i="0" u="none" strike="noStrike" kern="1200" dirty="0" smtClean="0">
+                          <a:solidFill>
+                            <a:schemeClr val="bg1"/>
+                          </a:solidFill>
+                          <a:effectLst/>
+                          <a:latin typeface="Calibri"/>
+                          <a:ea typeface="+mn-ea"/>
+                          <a:cs typeface="Consolas" panose="020B0609020204030204" pitchFamily="49" charset="0"/>
+                        </a:rPr>
+                        <a:t># GC Handles</a:t>
+                      </a:r>
+                      <a:endParaRPr lang="en-US" sz="1400" b="1" i="0" u="none" strike="noStrike" dirty="0">
+                        <a:solidFill>
+                          <a:schemeClr val="bg1"/>
+                        </a:solidFill>
+                        <a:effectLst/>
+                        <a:latin typeface="+mn-lt"/>
+                        <a:cs typeface="Consolas" panose="020B0609020204030204" pitchFamily="49" charset="0"/>
+                      </a:endParaRPr>
+                    </a:p>
+                  </a:txBody>
+                  <a:tcPr marL="45720" marR="45720" anchor="b">
+                    <a:lnL w="12700" cap="flat" cmpd="sng" algn="ctr">
+                      <a:solidFill>
+                        <a:srgbClr val="FFFFFF"/>
+                      </a:solidFill>
+                      <a:prstDash val="solid"/>
+                      <a:round/>
+                      <a:headEnd type="none" w="med" len="med"/>
+                      <a:tailEnd type="none" w="med" len="med"/>
+                    </a:lnL>
+                    <a:lnR w="12700" cap="flat" cmpd="sng" algn="ctr">
+                      <a:solidFill>
+                        <a:srgbClr val="FFFFFF"/>
+                      </a:solidFill>
+                      <a:prstDash val="solid"/>
+                      <a:round/>
+                      <a:headEnd type="none" w="med" len="med"/>
+                      <a:tailEnd type="none" w="med" len="med"/>
+                    </a:lnR>
+                    <a:lnT w="12700" cap="flat" cmpd="sng" algn="ctr">
+                      <a:solidFill>
+                        <a:srgbClr val="FFFFFF"/>
+                      </a:solidFill>
+                      <a:prstDash val="solid"/>
+                      <a:round/>
+                      <a:headEnd type="none" w="med" len="med"/>
+                      <a:tailEnd type="none" w="med" len="med"/>
+                    </a:lnT>
+                    <a:lnB w="12700" cap="flat" cmpd="sng" algn="ctr">
+                      <a:solidFill>
+                        <a:srgbClr val="FFFFFF"/>
+                      </a:solidFill>
+                      <a:prstDash val="solid"/>
+                      <a:round/>
+                      <a:headEnd type="none" w="med" len="med"/>
+                      <a:tailEnd type="none" w="med" len="med"/>
+                    </a:lnB>
+                    <a:lnTlToBr w="12700" cmpd="sng">
+                      <a:noFill/>
+                      <a:prstDash val="solid"/>
+                    </a:lnTlToBr>
+                    <a:lnBlToTr w="12700" cmpd="sng">
+                      <a:noFill/>
+                      <a:prstDash val="solid"/>
+                    </a:lnBlToTr>
+                    <a:noFill/>
+                  </a:tcPr>
+                </a:tc>
+                <a:tc>
+                  <a:txBody>
+                    <a:bodyPr/>
+                    <a:lstStyle>
+                      <a:lvl1pPr marL="0" algn="l" defTabSz="914400" rtl="0" eaLnBrk="1" latinLnBrk="0" hangingPunct="1">
+                        <a:defRPr sz="1800" kern="1200">
+                          <a:solidFill>
+                            <a:schemeClr val="tx1"/>
+                          </a:solidFill>
+                          <a:latin typeface="Calibri"/>
+                        </a:defRPr>
+                      </a:lvl1pPr>
+                      <a:lvl2pPr marL="457200" algn="l" defTabSz="914400" rtl="0" eaLnBrk="1" latinLnBrk="0" hangingPunct="1">
+                        <a:defRPr sz="1800" kern="1200">
+                          <a:solidFill>
+                            <a:schemeClr val="tx1"/>
+                          </a:solidFill>
+                          <a:latin typeface="Calibri"/>
+                        </a:defRPr>
+                      </a:lvl2pPr>
+                      <a:lvl3pPr marL="914400" algn="l" defTabSz="914400" rtl="0" eaLnBrk="1" latinLnBrk="0" hangingPunct="1">
+                        <a:defRPr sz="1800" kern="1200">
+                          <a:solidFill>
+                            <a:schemeClr val="tx1"/>
+                          </a:solidFill>
+                          <a:latin typeface="Calibri"/>
+                        </a:defRPr>
+                      </a:lvl3pPr>
+                      <a:lvl4pPr marL="1371600" algn="l" defTabSz="914400" rtl="0" eaLnBrk="1" latinLnBrk="0" hangingPunct="1">
+                        <a:defRPr sz="1800" kern="1200">
+                          <a:solidFill>
+                            <a:schemeClr val="tx1"/>
+                          </a:solidFill>
+                          <a:latin typeface="Calibri"/>
+                        </a:defRPr>
+                      </a:lvl4pPr>
+                      <a:lvl5pPr marL="1828800" algn="l" defTabSz="914400" rtl="0" eaLnBrk="1" latinLnBrk="0" hangingPunct="1">
+                        <a:defRPr sz="1800" kern="1200">
+                          <a:solidFill>
+                            <a:schemeClr val="tx1"/>
+                          </a:solidFill>
+                          <a:latin typeface="Calibri"/>
+                        </a:defRPr>
+                      </a:lvl5pPr>
+                      <a:lvl6pPr marL="2286000" algn="l" defTabSz="914400" rtl="0" eaLnBrk="1" latinLnBrk="0" hangingPunct="1">
+                        <a:defRPr sz="1800" kern="1200">
+                          <a:solidFill>
+                            <a:schemeClr val="tx1"/>
+                          </a:solidFill>
+                          <a:latin typeface="Calibri"/>
+                        </a:defRPr>
+                      </a:lvl6pPr>
+                      <a:lvl7pPr marL="2743200" algn="l" defTabSz="914400" rtl="0" eaLnBrk="1" latinLnBrk="0" hangingPunct="1">
+                        <a:defRPr sz="1800" kern="1200">
+                          <a:solidFill>
+                            <a:schemeClr val="tx1"/>
+                          </a:solidFill>
+                          <a:latin typeface="Calibri"/>
+                        </a:defRPr>
+                      </a:lvl7pPr>
+                      <a:lvl8pPr marL="3200400" algn="l" defTabSz="914400" rtl="0" eaLnBrk="1" latinLnBrk="0" hangingPunct="1">
+                        <a:defRPr sz="1800" kern="1200">
+                          <a:solidFill>
+                            <a:schemeClr val="tx1"/>
+                          </a:solidFill>
+                          <a:latin typeface="Calibri"/>
+                        </a:defRPr>
+                      </a:lvl8pPr>
+                      <a:lvl9pPr marL="3657600" algn="l" defTabSz="914400" rtl="0" eaLnBrk="1" latinLnBrk="0" hangingPunct="1">
+                        <a:defRPr sz="1800" kern="1200">
+                          <a:solidFill>
+                            <a:schemeClr val="tx1"/>
+                          </a:solidFill>
+                          <a:latin typeface="Calibri"/>
+                        </a:defRPr>
+                      </a:lvl9pPr>
+                    </a:lstStyle>
+                    <a:p>
+                      <a:pPr algn="l" fontAlgn="b"/>
+                      <a:r>
+                        <a:rPr lang="ru-RU" sz="1400" b="0" i="0" u="none" strike="noStrike" dirty="0" smtClean="0">
+                          <a:solidFill>
+                            <a:schemeClr val="bg1"/>
+                          </a:solidFill>
+                          <a:effectLst/>
+                          <a:latin typeface="+mn-lt"/>
+                          <a:cs typeface="Consolas" panose="020B0609020204030204" pitchFamily="49" charset="0"/>
+                        </a:rPr>
+                        <a:t>Текущее кол-во </a:t>
+                      </a:r>
+                      <a:r>
+                        <a:rPr lang="en-US" sz="1400" b="0" i="0" u="none" strike="noStrike" dirty="0" smtClean="0">
+                          <a:solidFill>
+                            <a:schemeClr val="bg1"/>
+                          </a:solidFill>
+                          <a:effectLst/>
+                          <a:latin typeface="+mn-lt"/>
+                          <a:cs typeface="Consolas" panose="020B0609020204030204" pitchFamily="49" charset="0"/>
+                        </a:rPr>
+                        <a:t>GC </a:t>
+                      </a:r>
+                      <a:r>
+                        <a:rPr lang="ru-RU" sz="1400" b="0" i="0" u="none" strike="noStrike" dirty="0" smtClean="0">
+                          <a:solidFill>
+                            <a:schemeClr val="bg1"/>
+                          </a:solidFill>
+                          <a:effectLst/>
+                          <a:latin typeface="+mn-lt"/>
+                          <a:cs typeface="Consolas" panose="020B0609020204030204" pitchFamily="49" charset="0"/>
+                        </a:rPr>
+                        <a:t>дескрипторов</a:t>
+                      </a:r>
+                      <a:endParaRPr lang="en-US" sz="1400" b="0" i="0" u="none" strike="noStrike" dirty="0">
+                        <a:solidFill>
+                          <a:schemeClr val="bg1"/>
+                        </a:solidFill>
+                        <a:effectLst/>
+                        <a:latin typeface="+mn-lt"/>
+                        <a:cs typeface="Consolas" panose="020B0609020204030204" pitchFamily="49" charset="0"/>
+                      </a:endParaRPr>
+                    </a:p>
+                  </a:txBody>
+                  <a:tcPr marL="45720" marR="45720" anchor="b">
+                    <a:lnL w="12700" cap="flat" cmpd="sng" algn="ctr">
+                      <a:solidFill>
+                        <a:srgbClr val="FFFFFF"/>
+                      </a:solidFill>
+                      <a:prstDash val="solid"/>
+                      <a:round/>
+                      <a:headEnd type="none" w="med" len="med"/>
+                      <a:tailEnd type="none" w="med" len="med"/>
+                    </a:lnL>
+                    <a:lnR w="12700" cap="flat" cmpd="sng" algn="ctr">
+                      <a:solidFill>
+                        <a:srgbClr val="FFFFFF"/>
+                      </a:solidFill>
+                      <a:prstDash val="solid"/>
+                      <a:round/>
+                      <a:headEnd type="none" w="med" len="med"/>
+                      <a:tailEnd type="none" w="med" len="med"/>
+                    </a:lnR>
+                    <a:lnT w="12700" cap="flat" cmpd="sng" algn="ctr">
+                      <a:solidFill>
+                        <a:srgbClr val="FFFFFF"/>
+                      </a:solidFill>
+                      <a:prstDash val="solid"/>
+                      <a:round/>
+                      <a:headEnd type="none" w="med" len="med"/>
+                      <a:tailEnd type="none" w="med" len="med"/>
+                    </a:lnT>
+                    <a:lnB w="12700" cap="flat" cmpd="sng" algn="ctr">
+                      <a:solidFill>
+                        <a:srgbClr val="FFFFFF"/>
+                      </a:solidFill>
+                      <a:prstDash val="solid"/>
+                      <a:round/>
+                      <a:headEnd type="none" w="med" len="med"/>
+                      <a:tailEnd type="none" w="med" len="med"/>
+                    </a:lnB>
+                    <a:lnTlToBr w="12700" cmpd="sng">
+                      <a:noFill/>
+                      <a:prstDash val="solid"/>
+                    </a:lnTlToBr>
+                    <a:lnBlToTr w="12700" cmpd="sng">
+                      <a:noFill/>
+                      <a:prstDash val="solid"/>
+                    </a:lnBlToTr>
+                    <a:noFill/>
+                  </a:tcPr>
+                </a:tc>
+              </a:tr>
+              <a:tr h="182299">
+                <a:tc>
+                  <a:txBody>
+                    <a:bodyPr/>
+                    <a:lstStyle>
+                      <a:lvl1pPr marL="0" algn="l" defTabSz="914400" rtl="0" eaLnBrk="1" latinLnBrk="0" hangingPunct="1">
+                        <a:defRPr sz="1800" kern="1200">
+                          <a:solidFill>
+                            <a:schemeClr val="tx1"/>
+                          </a:solidFill>
+                          <a:latin typeface="Calibri"/>
+                        </a:defRPr>
+                      </a:lvl1pPr>
+                      <a:lvl2pPr marL="457200" algn="l" defTabSz="914400" rtl="0" eaLnBrk="1" latinLnBrk="0" hangingPunct="1">
+                        <a:defRPr sz="1800" kern="1200">
+                          <a:solidFill>
+                            <a:schemeClr val="tx1"/>
+                          </a:solidFill>
+                          <a:latin typeface="Calibri"/>
+                        </a:defRPr>
+                      </a:lvl2pPr>
+                      <a:lvl3pPr marL="914400" algn="l" defTabSz="914400" rtl="0" eaLnBrk="1" latinLnBrk="0" hangingPunct="1">
+                        <a:defRPr sz="1800" kern="1200">
+                          <a:solidFill>
+                            <a:schemeClr val="tx1"/>
+                          </a:solidFill>
+                          <a:latin typeface="Calibri"/>
+                        </a:defRPr>
+                      </a:lvl3pPr>
+                      <a:lvl4pPr marL="1371600" algn="l" defTabSz="914400" rtl="0" eaLnBrk="1" latinLnBrk="0" hangingPunct="1">
+                        <a:defRPr sz="1800" kern="1200">
+                          <a:solidFill>
+                            <a:schemeClr val="tx1"/>
+                          </a:solidFill>
+                          <a:latin typeface="Calibri"/>
+                        </a:defRPr>
+                      </a:lvl4pPr>
+                      <a:lvl5pPr marL="1828800" algn="l" defTabSz="914400" rtl="0" eaLnBrk="1" latinLnBrk="0" hangingPunct="1">
+                        <a:defRPr sz="1800" kern="1200">
+                          <a:solidFill>
+                            <a:schemeClr val="tx1"/>
+                          </a:solidFill>
+                          <a:latin typeface="Calibri"/>
+                        </a:defRPr>
+                      </a:lvl5pPr>
+                      <a:lvl6pPr marL="2286000" algn="l" defTabSz="914400" rtl="0" eaLnBrk="1" latinLnBrk="0" hangingPunct="1">
+                        <a:defRPr sz="1800" kern="1200">
+                          <a:solidFill>
+                            <a:schemeClr val="tx1"/>
+                          </a:solidFill>
+                          <a:latin typeface="Calibri"/>
+                        </a:defRPr>
+                      </a:lvl6pPr>
+                      <a:lvl7pPr marL="2743200" algn="l" defTabSz="914400" rtl="0" eaLnBrk="1" latinLnBrk="0" hangingPunct="1">
+                        <a:defRPr sz="1800" kern="1200">
+                          <a:solidFill>
+                            <a:schemeClr val="tx1"/>
+                          </a:solidFill>
+                          <a:latin typeface="Calibri"/>
+                        </a:defRPr>
+                      </a:lvl7pPr>
+                      <a:lvl8pPr marL="3200400" algn="l" defTabSz="914400" rtl="0" eaLnBrk="1" latinLnBrk="0" hangingPunct="1">
+                        <a:defRPr sz="1800" kern="1200">
+                          <a:solidFill>
+                            <a:schemeClr val="tx1"/>
+                          </a:solidFill>
+                          <a:latin typeface="Calibri"/>
+                        </a:defRPr>
+                      </a:lvl8pPr>
+                      <a:lvl9pPr marL="3657600" algn="l" defTabSz="914400" rtl="0" eaLnBrk="1" latinLnBrk="0" hangingPunct="1">
+                        <a:defRPr sz="1800" kern="1200">
+                          <a:solidFill>
+                            <a:schemeClr val="tx1"/>
+                          </a:solidFill>
+                          <a:latin typeface="Calibri"/>
+                        </a:defRPr>
+                      </a:lvl9pPr>
+                    </a:lstStyle>
+                    <a:p>
+                      <a:pPr marL="0" marR="0" indent="0" algn="l" defTabSz="914400" rtl="0" eaLnBrk="1" fontAlgn="b" latinLnBrk="0" hangingPunct="1">
+                        <a:lnSpc>
+                          <a:spcPct val="100000"/>
+                        </a:lnSpc>
+                        <a:spcBef>
+                          <a:spcPts val="0"/>
+                        </a:spcBef>
+                        <a:spcAft>
+                          <a:spcPts val="0"/>
+                        </a:spcAft>
+                        <a:buClrTx/>
+                        <a:buSzTx/>
+                        <a:buFontTx/>
+                        <a:buNone/>
+                        <a:tabLst/>
+                        <a:defRPr/>
+                      </a:pPr>
+                      <a:r>
+                        <a:rPr lang="en-US" sz="1400" b="1" i="0" u="none" strike="noStrike" kern="1200" dirty="0" smtClean="0">
+                          <a:solidFill>
+                            <a:schemeClr val="bg1"/>
+                          </a:solidFill>
+                          <a:effectLst/>
+                          <a:latin typeface="Calibri"/>
+                          <a:ea typeface="+mn-ea"/>
+                          <a:cs typeface="Consolas" panose="020B0609020204030204" pitchFamily="49" charset="0"/>
+                        </a:rPr>
+                        <a:t># Gen 0,1,2 Collections</a:t>
+                      </a:r>
+                      <a:endParaRPr lang="en-US" sz="1400" b="1" i="0" u="none" strike="noStrike" dirty="0">
+                        <a:solidFill>
+                          <a:schemeClr val="bg1"/>
+                        </a:solidFill>
+                        <a:effectLst/>
+                        <a:latin typeface="+mn-lt"/>
+                        <a:cs typeface="Consolas" panose="020B0609020204030204" pitchFamily="49" charset="0"/>
+                      </a:endParaRPr>
+                    </a:p>
+                  </a:txBody>
+                  <a:tcPr marL="45720" marR="45720" anchor="b">
+                    <a:lnL w="12700" cap="flat" cmpd="sng" algn="ctr">
+                      <a:solidFill>
+                        <a:srgbClr val="FFFFFF"/>
+                      </a:solidFill>
+                      <a:prstDash val="solid"/>
+                      <a:round/>
+                      <a:headEnd type="none" w="med" len="med"/>
+                      <a:tailEnd type="none" w="med" len="med"/>
+                    </a:lnL>
+                    <a:lnR w="12700" cap="flat" cmpd="sng" algn="ctr">
+                      <a:solidFill>
+                        <a:srgbClr val="FFFFFF"/>
+                      </a:solidFill>
+                      <a:prstDash val="solid"/>
+                      <a:round/>
+                      <a:headEnd type="none" w="med" len="med"/>
+                      <a:tailEnd type="none" w="med" len="med"/>
+                    </a:lnR>
+                    <a:lnT w="12700" cap="flat" cmpd="sng" algn="ctr">
+                      <a:solidFill>
+                        <a:srgbClr val="FFFFFF"/>
+                      </a:solidFill>
+                      <a:prstDash val="solid"/>
+                      <a:round/>
+                      <a:headEnd type="none" w="med" len="med"/>
+                      <a:tailEnd type="none" w="med" len="med"/>
+                    </a:lnT>
+                    <a:lnB w="12700" cap="flat" cmpd="sng" algn="ctr">
+                      <a:solidFill>
+                        <a:srgbClr val="FFFFFF"/>
+                      </a:solidFill>
+                      <a:prstDash val="solid"/>
+                      <a:round/>
+                      <a:headEnd type="none" w="med" len="med"/>
+                      <a:tailEnd type="none" w="med" len="med"/>
+                    </a:lnB>
+                    <a:lnTlToBr w="12700" cmpd="sng">
+                      <a:noFill/>
+                      <a:prstDash val="solid"/>
+                    </a:lnTlToBr>
+                    <a:lnBlToTr w="12700" cmpd="sng">
+                      <a:noFill/>
+                      <a:prstDash val="solid"/>
+                    </a:lnBlToTr>
+                    <a:noFill/>
+                  </a:tcPr>
+                </a:tc>
+                <a:tc>
+                  <a:txBody>
+                    <a:bodyPr/>
+                    <a:lstStyle>
+                      <a:lvl1pPr marL="0" algn="l" defTabSz="914400" rtl="0" eaLnBrk="1" latinLnBrk="0" hangingPunct="1">
+                        <a:defRPr sz="1800" kern="1200">
+                          <a:solidFill>
+                            <a:schemeClr val="tx1"/>
+                          </a:solidFill>
+                          <a:latin typeface="Calibri"/>
+                        </a:defRPr>
+                      </a:lvl1pPr>
+                      <a:lvl2pPr marL="457200" algn="l" defTabSz="914400" rtl="0" eaLnBrk="1" latinLnBrk="0" hangingPunct="1">
+                        <a:defRPr sz="1800" kern="1200">
+                          <a:solidFill>
+                            <a:schemeClr val="tx1"/>
+                          </a:solidFill>
+                          <a:latin typeface="Calibri"/>
+                        </a:defRPr>
+                      </a:lvl2pPr>
+                      <a:lvl3pPr marL="914400" algn="l" defTabSz="914400" rtl="0" eaLnBrk="1" latinLnBrk="0" hangingPunct="1">
+                        <a:defRPr sz="1800" kern="1200">
+                          <a:solidFill>
+                            <a:schemeClr val="tx1"/>
+                          </a:solidFill>
+                          <a:latin typeface="Calibri"/>
+                        </a:defRPr>
+                      </a:lvl3pPr>
+                      <a:lvl4pPr marL="1371600" algn="l" defTabSz="914400" rtl="0" eaLnBrk="1" latinLnBrk="0" hangingPunct="1">
+                        <a:defRPr sz="1800" kern="1200">
+                          <a:solidFill>
+                            <a:schemeClr val="tx1"/>
+                          </a:solidFill>
+                          <a:latin typeface="Calibri"/>
+                        </a:defRPr>
+                      </a:lvl4pPr>
+                      <a:lvl5pPr marL="1828800" algn="l" defTabSz="914400" rtl="0" eaLnBrk="1" latinLnBrk="0" hangingPunct="1">
+                        <a:defRPr sz="1800" kern="1200">
+                          <a:solidFill>
+                            <a:schemeClr val="tx1"/>
+                          </a:solidFill>
+                          <a:latin typeface="Calibri"/>
+                        </a:defRPr>
+                      </a:lvl5pPr>
+                      <a:lvl6pPr marL="2286000" algn="l" defTabSz="914400" rtl="0" eaLnBrk="1" latinLnBrk="0" hangingPunct="1">
+                        <a:defRPr sz="1800" kern="1200">
+                          <a:solidFill>
+                            <a:schemeClr val="tx1"/>
+                          </a:solidFill>
+                          <a:latin typeface="Calibri"/>
+                        </a:defRPr>
+                      </a:lvl6pPr>
+                      <a:lvl7pPr marL="2743200" algn="l" defTabSz="914400" rtl="0" eaLnBrk="1" latinLnBrk="0" hangingPunct="1">
+                        <a:defRPr sz="1800" kern="1200">
+                          <a:solidFill>
+                            <a:schemeClr val="tx1"/>
+                          </a:solidFill>
+                          <a:latin typeface="Calibri"/>
+                        </a:defRPr>
+                      </a:lvl7pPr>
+                      <a:lvl8pPr marL="3200400" algn="l" defTabSz="914400" rtl="0" eaLnBrk="1" latinLnBrk="0" hangingPunct="1">
+                        <a:defRPr sz="1800" kern="1200">
+                          <a:solidFill>
+                            <a:schemeClr val="tx1"/>
+                          </a:solidFill>
+                          <a:latin typeface="Calibri"/>
+                        </a:defRPr>
+                      </a:lvl8pPr>
+                      <a:lvl9pPr marL="3657600" algn="l" defTabSz="914400" rtl="0" eaLnBrk="1" latinLnBrk="0" hangingPunct="1">
+                        <a:defRPr sz="1800" kern="1200">
+                          <a:solidFill>
+                            <a:schemeClr val="tx1"/>
+                          </a:solidFill>
+                          <a:latin typeface="Calibri"/>
+                        </a:defRPr>
+                      </a:lvl9pPr>
+                    </a:lstStyle>
+                    <a:p>
+                      <a:pPr algn="l" fontAlgn="b"/>
+                      <a:r>
+                        <a:rPr lang="ru-RU" sz="1400" b="0" i="0" u="none" strike="noStrike" dirty="0" smtClean="0">
+                          <a:solidFill>
+                            <a:schemeClr val="bg1"/>
+                          </a:solidFill>
+                          <a:effectLst/>
+                          <a:latin typeface="+mn-lt"/>
+                          <a:cs typeface="Consolas" panose="020B0609020204030204" pitchFamily="49" charset="0"/>
+                        </a:rPr>
+                        <a:t>Сколько раз </a:t>
+                      </a:r>
+                      <a:r>
+                        <a:rPr lang="en-US" sz="1400" b="0" i="0" u="none" strike="noStrike" dirty="0" smtClean="0">
+                          <a:solidFill>
+                            <a:schemeClr val="bg1"/>
+                          </a:solidFill>
+                          <a:effectLst/>
+                          <a:latin typeface="+mn-lt"/>
+                          <a:cs typeface="Consolas" panose="020B0609020204030204" pitchFamily="49" charset="0"/>
+                        </a:rPr>
+                        <a:t>GC </a:t>
+                      </a:r>
+                      <a:r>
+                        <a:rPr lang="ru-RU" sz="1400" b="0" i="0" u="none" strike="noStrike" dirty="0" smtClean="0">
+                          <a:solidFill>
+                            <a:schemeClr val="bg1"/>
+                          </a:solidFill>
+                          <a:effectLst/>
+                          <a:latin typeface="+mn-lt"/>
+                          <a:cs typeface="Consolas" panose="020B0609020204030204" pitchFamily="49" charset="0"/>
+                        </a:rPr>
+                        <a:t>выполнялся для каждого поколения</a:t>
+                      </a:r>
+                      <a:endParaRPr lang="en-US" sz="1400" b="0" i="0" u="none" strike="noStrike" dirty="0">
+                        <a:solidFill>
+                          <a:schemeClr val="bg1"/>
+                        </a:solidFill>
+                        <a:effectLst/>
+                        <a:latin typeface="+mn-lt"/>
+                        <a:cs typeface="Consolas" panose="020B0609020204030204" pitchFamily="49" charset="0"/>
+                      </a:endParaRPr>
+                    </a:p>
+                  </a:txBody>
+                  <a:tcPr marL="45720" marR="45720" anchor="b">
+                    <a:lnL w="12700" cap="flat" cmpd="sng" algn="ctr">
+                      <a:solidFill>
+                        <a:srgbClr val="FFFFFF"/>
+                      </a:solidFill>
+                      <a:prstDash val="solid"/>
+                      <a:round/>
+                      <a:headEnd type="none" w="med" len="med"/>
+                      <a:tailEnd type="none" w="med" len="med"/>
+                    </a:lnL>
+                    <a:lnR w="12700" cap="flat" cmpd="sng" algn="ctr">
+                      <a:solidFill>
+                        <a:srgbClr val="FFFFFF"/>
+                      </a:solidFill>
+                      <a:prstDash val="solid"/>
+                      <a:round/>
+                      <a:headEnd type="none" w="med" len="med"/>
+                      <a:tailEnd type="none" w="med" len="med"/>
+                    </a:lnR>
+                    <a:lnT w="12700" cap="flat" cmpd="sng" algn="ctr">
+                      <a:solidFill>
+                        <a:srgbClr val="FFFFFF"/>
+                      </a:solidFill>
+                      <a:prstDash val="solid"/>
+                      <a:round/>
+                      <a:headEnd type="none" w="med" len="med"/>
+                      <a:tailEnd type="none" w="med" len="med"/>
+                    </a:lnT>
+                    <a:lnB w="12700" cap="flat" cmpd="sng" algn="ctr">
+                      <a:solidFill>
+                        <a:srgbClr val="FFFFFF"/>
+                      </a:solidFill>
+                      <a:prstDash val="solid"/>
+                      <a:round/>
+                      <a:headEnd type="none" w="med" len="med"/>
+                      <a:tailEnd type="none" w="med" len="med"/>
+                    </a:lnB>
+                    <a:lnTlToBr w="12700" cmpd="sng">
+                      <a:noFill/>
+                      <a:prstDash val="solid"/>
+                    </a:lnTlToBr>
+                    <a:lnBlToTr w="12700" cmpd="sng">
+                      <a:noFill/>
+                      <a:prstDash val="solid"/>
+                    </a:lnBlToTr>
+                    <a:noFill/>
+                  </a:tcPr>
+                </a:tc>
+              </a:tr>
+              <a:tr h="0">
+                <a:tc>
+                  <a:txBody>
+                    <a:bodyPr/>
+                    <a:lstStyle>
+                      <a:lvl1pPr marL="0" algn="l" defTabSz="914400" rtl="0" eaLnBrk="1" latinLnBrk="0" hangingPunct="1">
+                        <a:defRPr sz="1800" kern="1200">
+                          <a:solidFill>
+                            <a:schemeClr val="tx1"/>
+                          </a:solidFill>
+                          <a:latin typeface="Calibri"/>
+                        </a:defRPr>
+                      </a:lvl1pPr>
+                      <a:lvl2pPr marL="457200" algn="l" defTabSz="914400" rtl="0" eaLnBrk="1" latinLnBrk="0" hangingPunct="1">
+                        <a:defRPr sz="1800" kern="1200">
+                          <a:solidFill>
+                            <a:schemeClr val="tx1"/>
+                          </a:solidFill>
+                          <a:latin typeface="Calibri"/>
+                        </a:defRPr>
+                      </a:lvl2pPr>
+                      <a:lvl3pPr marL="914400" algn="l" defTabSz="914400" rtl="0" eaLnBrk="1" latinLnBrk="0" hangingPunct="1">
+                        <a:defRPr sz="1800" kern="1200">
+                          <a:solidFill>
+                            <a:schemeClr val="tx1"/>
+                          </a:solidFill>
+                          <a:latin typeface="Calibri"/>
+                        </a:defRPr>
+                      </a:lvl3pPr>
+                      <a:lvl4pPr marL="1371600" algn="l" defTabSz="914400" rtl="0" eaLnBrk="1" latinLnBrk="0" hangingPunct="1">
+                        <a:defRPr sz="1800" kern="1200">
+                          <a:solidFill>
+                            <a:schemeClr val="tx1"/>
+                          </a:solidFill>
+                          <a:latin typeface="Calibri"/>
+                        </a:defRPr>
+                      </a:lvl4pPr>
+                      <a:lvl5pPr marL="1828800" algn="l" defTabSz="914400" rtl="0" eaLnBrk="1" latinLnBrk="0" hangingPunct="1">
+                        <a:defRPr sz="1800" kern="1200">
+                          <a:solidFill>
+                            <a:schemeClr val="tx1"/>
+                          </a:solidFill>
+                          <a:latin typeface="Calibri"/>
+                        </a:defRPr>
+                      </a:lvl5pPr>
+                      <a:lvl6pPr marL="2286000" algn="l" defTabSz="914400" rtl="0" eaLnBrk="1" latinLnBrk="0" hangingPunct="1">
+                        <a:defRPr sz="1800" kern="1200">
+                          <a:solidFill>
+                            <a:schemeClr val="tx1"/>
+                          </a:solidFill>
+                          <a:latin typeface="Calibri"/>
+                        </a:defRPr>
+                      </a:lvl6pPr>
+                      <a:lvl7pPr marL="2743200" algn="l" defTabSz="914400" rtl="0" eaLnBrk="1" latinLnBrk="0" hangingPunct="1">
+                        <a:defRPr sz="1800" kern="1200">
+                          <a:solidFill>
+                            <a:schemeClr val="tx1"/>
+                          </a:solidFill>
+                          <a:latin typeface="Calibri"/>
+                        </a:defRPr>
+                      </a:lvl7pPr>
+                      <a:lvl8pPr marL="3200400" algn="l" defTabSz="914400" rtl="0" eaLnBrk="1" latinLnBrk="0" hangingPunct="1">
+                        <a:defRPr sz="1800" kern="1200">
+                          <a:solidFill>
+                            <a:schemeClr val="tx1"/>
+                          </a:solidFill>
+                          <a:latin typeface="Calibri"/>
+                        </a:defRPr>
+                      </a:lvl8pPr>
+                      <a:lvl9pPr marL="3657600" algn="l" defTabSz="914400" rtl="0" eaLnBrk="1" latinLnBrk="0" hangingPunct="1">
+                        <a:defRPr sz="1800" kern="1200">
+                          <a:solidFill>
+                            <a:schemeClr val="tx1"/>
+                          </a:solidFill>
+                          <a:latin typeface="Calibri"/>
+                        </a:defRPr>
+                      </a:lvl9pPr>
+                    </a:lstStyle>
+                    <a:p>
+                      <a:pPr algn="l" fontAlgn="b"/>
+                      <a:r>
+                        <a:rPr lang="en-US" sz="1400" b="1" i="0" u="none" strike="noStrike" kern="1200" dirty="0" smtClean="0">
+                          <a:solidFill>
+                            <a:schemeClr val="bg1"/>
+                          </a:solidFill>
+                          <a:effectLst/>
+                          <a:latin typeface="Calibri"/>
+                          <a:ea typeface="+mn-ea"/>
+                          <a:cs typeface="Consolas" panose="020B0609020204030204" pitchFamily="49" charset="0"/>
+                        </a:rPr>
+                        <a:t># Induced GC</a:t>
+                      </a:r>
+                      <a:endParaRPr lang="en-US" sz="1400" b="1" i="0" u="none" strike="noStrike" dirty="0">
+                        <a:solidFill>
+                          <a:schemeClr val="bg1"/>
+                        </a:solidFill>
+                        <a:effectLst/>
+                        <a:latin typeface="+mn-lt"/>
+                        <a:cs typeface="Consolas" panose="020B0609020204030204" pitchFamily="49" charset="0"/>
+                      </a:endParaRPr>
+                    </a:p>
+                  </a:txBody>
+                  <a:tcPr marL="45720" marR="45720" anchor="b">
+                    <a:lnL w="12700" cap="flat" cmpd="sng" algn="ctr">
+                      <a:solidFill>
+                        <a:srgbClr val="FFFFFF"/>
+                      </a:solidFill>
+                      <a:prstDash val="solid"/>
+                      <a:round/>
+                      <a:headEnd type="none" w="med" len="med"/>
+                      <a:tailEnd type="none" w="med" len="med"/>
+                    </a:lnL>
+                    <a:lnR w="12700" cap="flat" cmpd="sng" algn="ctr">
+                      <a:solidFill>
+                        <a:srgbClr val="FFFFFF"/>
+                      </a:solidFill>
+                      <a:prstDash val="solid"/>
+                      <a:round/>
+                      <a:headEnd type="none" w="med" len="med"/>
+                      <a:tailEnd type="none" w="med" len="med"/>
+                    </a:lnR>
+                    <a:lnT w="12700" cap="flat" cmpd="sng" algn="ctr">
+                      <a:solidFill>
+                        <a:srgbClr val="FFFFFF"/>
+                      </a:solidFill>
+                      <a:prstDash val="solid"/>
+                      <a:round/>
+                      <a:headEnd type="none" w="med" len="med"/>
+                      <a:tailEnd type="none" w="med" len="med"/>
+                    </a:lnT>
+                    <a:lnB w="12700" cap="flat" cmpd="sng" algn="ctr">
+                      <a:solidFill>
+                        <a:srgbClr val="FFFFFF"/>
+                      </a:solidFill>
+                      <a:prstDash val="solid"/>
+                      <a:round/>
+                      <a:headEnd type="none" w="med" len="med"/>
+                      <a:tailEnd type="none" w="med" len="med"/>
+                    </a:lnB>
+                    <a:lnTlToBr w="12700" cmpd="sng">
+                      <a:noFill/>
+                      <a:prstDash val="solid"/>
+                    </a:lnTlToBr>
+                    <a:lnBlToTr w="12700" cmpd="sng">
+                      <a:noFill/>
+                      <a:prstDash val="solid"/>
+                    </a:lnBlToTr>
+                    <a:noFill/>
+                  </a:tcPr>
+                </a:tc>
+                <a:tc>
+                  <a:txBody>
+                    <a:bodyPr/>
+                    <a:lstStyle>
+                      <a:lvl1pPr marL="0" algn="l" defTabSz="914400" rtl="0" eaLnBrk="1" latinLnBrk="0" hangingPunct="1">
+                        <a:defRPr sz="1800" kern="1200">
+                          <a:solidFill>
+                            <a:schemeClr val="tx1"/>
+                          </a:solidFill>
+                          <a:latin typeface="Calibri"/>
+                        </a:defRPr>
+                      </a:lvl1pPr>
+                      <a:lvl2pPr marL="457200" algn="l" defTabSz="914400" rtl="0" eaLnBrk="1" latinLnBrk="0" hangingPunct="1">
+                        <a:defRPr sz="1800" kern="1200">
+                          <a:solidFill>
+                            <a:schemeClr val="tx1"/>
+                          </a:solidFill>
+                          <a:latin typeface="Calibri"/>
+                        </a:defRPr>
+                      </a:lvl2pPr>
+                      <a:lvl3pPr marL="914400" algn="l" defTabSz="914400" rtl="0" eaLnBrk="1" latinLnBrk="0" hangingPunct="1">
+                        <a:defRPr sz="1800" kern="1200">
+                          <a:solidFill>
+                            <a:schemeClr val="tx1"/>
+                          </a:solidFill>
+                          <a:latin typeface="Calibri"/>
+                        </a:defRPr>
+                      </a:lvl3pPr>
+                      <a:lvl4pPr marL="1371600" algn="l" defTabSz="914400" rtl="0" eaLnBrk="1" latinLnBrk="0" hangingPunct="1">
+                        <a:defRPr sz="1800" kern="1200">
+                          <a:solidFill>
+                            <a:schemeClr val="tx1"/>
+                          </a:solidFill>
+                          <a:latin typeface="Calibri"/>
+                        </a:defRPr>
+                      </a:lvl4pPr>
+                      <a:lvl5pPr marL="1828800" algn="l" defTabSz="914400" rtl="0" eaLnBrk="1" latinLnBrk="0" hangingPunct="1">
+                        <a:defRPr sz="1800" kern="1200">
+                          <a:solidFill>
+                            <a:schemeClr val="tx1"/>
+                          </a:solidFill>
+                          <a:latin typeface="Calibri"/>
+                        </a:defRPr>
+                      </a:lvl5pPr>
+                      <a:lvl6pPr marL="2286000" algn="l" defTabSz="914400" rtl="0" eaLnBrk="1" latinLnBrk="0" hangingPunct="1">
+                        <a:defRPr sz="1800" kern="1200">
+                          <a:solidFill>
+                            <a:schemeClr val="tx1"/>
+                          </a:solidFill>
+                          <a:latin typeface="Calibri"/>
+                        </a:defRPr>
+                      </a:lvl6pPr>
+                      <a:lvl7pPr marL="2743200" algn="l" defTabSz="914400" rtl="0" eaLnBrk="1" latinLnBrk="0" hangingPunct="1">
+                        <a:defRPr sz="1800" kern="1200">
+                          <a:solidFill>
+                            <a:schemeClr val="tx1"/>
+                          </a:solidFill>
+                          <a:latin typeface="Calibri"/>
+                        </a:defRPr>
+                      </a:lvl7pPr>
+                      <a:lvl8pPr marL="3200400" algn="l" defTabSz="914400" rtl="0" eaLnBrk="1" latinLnBrk="0" hangingPunct="1">
+                        <a:defRPr sz="1800" kern="1200">
+                          <a:solidFill>
+                            <a:schemeClr val="tx1"/>
+                          </a:solidFill>
+                          <a:latin typeface="Calibri"/>
+                        </a:defRPr>
+                      </a:lvl8pPr>
+                      <a:lvl9pPr marL="3657600" algn="l" defTabSz="914400" rtl="0" eaLnBrk="1" latinLnBrk="0" hangingPunct="1">
+                        <a:defRPr sz="1800" kern="1200">
+                          <a:solidFill>
+                            <a:schemeClr val="tx1"/>
+                          </a:solidFill>
+                          <a:latin typeface="Calibri"/>
+                        </a:defRPr>
+                      </a:lvl9pPr>
+                    </a:lstStyle>
+                    <a:p>
+                      <a:pPr algn="l" fontAlgn="b"/>
+                      <a:r>
+                        <a:rPr lang="ru-RU" sz="1400" b="0" i="0" u="none" strike="noStrike" dirty="0" smtClean="0">
+                          <a:solidFill>
+                            <a:schemeClr val="bg1"/>
+                          </a:solidFill>
+                          <a:effectLst/>
+                          <a:latin typeface="+mn-lt"/>
+                          <a:cs typeface="Consolas" panose="020B0609020204030204" pitchFamily="49" charset="0"/>
+                        </a:rPr>
+                        <a:t>Сколько раз вызывался </a:t>
+                      </a:r>
+                      <a:r>
+                        <a:rPr lang="en-US" sz="1400" b="0" i="0" u="none" strike="noStrike" dirty="0" err="1" smtClean="0">
+                          <a:solidFill>
+                            <a:schemeClr val="bg1"/>
+                          </a:solidFill>
+                          <a:effectLst/>
+                          <a:latin typeface="+mn-lt"/>
+                          <a:cs typeface="Consolas" panose="020B0609020204030204" pitchFamily="49" charset="0"/>
+                        </a:rPr>
+                        <a:t>GC.Collect</a:t>
+                      </a:r>
+                      <a:r>
+                        <a:rPr lang="en-US" sz="1400" b="0" i="0" u="none" strike="noStrike" dirty="0" smtClean="0">
+                          <a:solidFill>
+                            <a:schemeClr val="bg1"/>
+                          </a:solidFill>
+                          <a:effectLst/>
+                          <a:latin typeface="+mn-lt"/>
+                          <a:cs typeface="Consolas" panose="020B0609020204030204" pitchFamily="49" charset="0"/>
+                        </a:rPr>
+                        <a:t>()</a:t>
+                      </a:r>
+                      <a:endParaRPr lang="en-US" sz="1400" b="0" i="0" u="none" strike="noStrike" dirty="0">
+                        <a:solidFill>
+                          <a:schemeClr val="bg1"/>
+                        </a:solidFill>
+                        <a:effectLst/>
+                        <a:latin typeface="+mn-lt"/>
+                        <a:cs typeface="Consolas" panose="020B0609020204030204" pitchFamily="49" charset="0"/>
+                      </a:endParaRPr>
+                    </a:p>
+                  </a:txBody>
+                  <a:tcPr marL="45720" marR="45720" anchor="b">
+                    <a:lnL w="12700" cap="flat" cmpd="sng" algn="ctr">
+                      <a:solidFill>
+                        <a:srgbClr val="FFFFFF"/>
+                      </a:solidFill>
+                      <a:prstDash val="solid"/>
+                      <a:round/>
+                      <a:headEnd type="none" w="med" len="med"/>
+                      <a:tailEnd type="none" w="med" len="med"/>
+                    </a:lnL>
+                    <a:lnR w="12700" cap="flat" cmpd="sng" algn="ctr">
+                      <a:solidFill>
+                        <a:srgbClr val="FFFFFF"/>
+                      </a:solidFill>
+                      <a:prstDash val="solid"/>
+                      <a:round/>
+                      <a:headEnd type="none" w="med" len="med"/>
+                      <a:tailEnd type="none" w="med" len="med"/>
+                    </a:lnR>
+                    <a:lnT w="12700" cap="flat" cmpd="sng" algn="ctr">
+                      <a:solidFill>
+                        <a:srgbClr val="FFFFFF"/>
+                      </a:solidFill>
+                      <a:prstDash val="solid"/>
+                      <a:round/>
+                      <a:headEnd type="none" w="med" len="med"/>
+                      <a:tailEnd type="none" w="med" len="med"/>
+                    </a:lnT>
+                    <a:lnB w="12700" cap="flat" cmpd="sng" algn="ctr">
+                      <a:solidFill>
+                        <a:srgbClr val="FFFFFF"/>
+                      </a:solidFill>
+                      <a:prstDash val="solid"/>
+                      <a:round/>
+                      <a:headEnd type="none" w="med" len="med"/>
+                      <a:tailEnd type="none" w="med" len="med"/>
+                    </a:lnB>
+                    <a:lnTlToBr w="12700" cmpd="sng">
+                      <a:noFill/>
+                      <a:prstDash val="solid"/>
+                    </a:lnTlToBr>
+                    <a:lnBlToTr w="12700" cmpd="sng">
+                      <a:noFill/>
+                      <a:prstDash val="solid"/>
+                    </a:lnBlToTr>
+                    <a:noFill/>
+                  </a:tcPr>
+                </a:tc>
+              </a:tr>
+              <a:tr h="0">
+                <a:tc>
+                  <a:txBody>
+                    <a:bodyPr/>
+                    <a:lstStyle>
+                      <a:lvl1pPr marL="0" algn="l" defTabSz="914400" rtl="0" eaLnBrk="1" latinLnBrk="0" hangingPunct="1">
+                        <a:defRPr sz="1800" kern="1200">
+                          <a:solidFill>
+                            <a:schemeClr val="tx1"/>
+                          </a:solidFill>
+                          <a:latin typeface="Calibri"/>
+                        </a:defRPr>
+                      </a:lvl1pPr>
+                      <a:lvl2pPr marL="457200" algn="l" defTabSz="914400" rtl="0" eaLnBrk="1" latinLnBrk="0" hangingPunct="1">
+                        <a:defRPr sz="1800" kern="1200">
+                          <a:solidFill>
+                            <a:schemeClr val="tx1"/>
+                          </a:solidFill>
+                          <a:latin typeface="Calibri"/>
+                        </a:defRPr>
+                      </a:lvl2pPr>
+                      <a:lvl3pPr marL="914400" algn="l" defTabSz="914400" rtl="0" eaLnBrk="1" latinLnBrk="0" hangingPunct="1">
+                        <a:defRPr sz="1800" kern="1200">
+                          <a:solidFill>
+                            <a:schemeClr val="tx1"/>
+                          </a:solidFill>
+                          <a:latin typeface="Calibri"/>
+                        </a:defRPr>
+                      </a:lvl3pPr>
+                      <a:lvl4pPr marL="1371600" algn="l" defTabSz="914400" rtl="0" eaLnBrk="1" latinLnBrk="0" hangingPunct="1">
+                        <a:defRPr sz="1800" kern="1200">
+                          <a:solidFill>
+                            <a:schemeClr val="tx1"/>
+                          </a:solidFill>
+                          <a:latin typeface="Calibri"/>
+                        </a:defRPr>
+                      </a:lvl4pPr>
+                      <a:lvl5pPr marL="1828800" algn="l" defTabSz="914400" rtl="0" eaLnBrk="1" latinLnBrk="0" hangingPunct="1">
+                        <a:defRPr sz="1800" kern="1200">
+                          <a:solidFill>
+                            <a:schemeClr val="tx1"/>
+                          </a:solidFill>
+                          <a:latin typeface="Calibri"/>
+                        </a:defRPr>
+                      </a:lvl5pPr>
+                      <a:lvl6pPr marL="2286000" algn="l" defTabSz="914400" rtl="0" eaLnBrk="1" latinLnBrk="0" hangingPunct="1">
+                        <a:defRPr sz="1800" kern="1200">
+                          <a:solidFill>
+                            <a:schemeClr val="tx1"/>
+                          </a:solidFill>
+                          <a:latin typeface="Calibri"/>
+                        </a:defRPr>
+                      </a:lvl6pPr>
+                      <a:lvl7pPr marL="2743200" algn="l" defTabSz="914400" rtl="0" eaLnBrk="1" latinLnBrk="0" hangingPunct="1">
+                        <a:defRPr sz="1800" kern="1200">
+                          <a:solidFill>
+                            <a:schemeClr val="tx1"/>
+                          </a:solidFill>
+                          <a:latin typeface="Calibri"/>
+                        </a:defRPr>
+                      </a:lvl7pPr>
+                      <a:lvl8pPr marL="3200400" algn="l" defTabSz="914400" rtl="0" eaLnBrk="1" latinLnBrk="0" hangingPunct="1">
+                        <a:defRPr sz="1800" kern="1200">
+                          <a:solidFill>
+                            <a:schemeClr val="tx1"/>
+                          </a:solidFill>
+                          <a:latin typeface="Calibri"/>
+                        </a:defRPr>
+                      </a:lvl8pPr>
+                      <a:lvl9pPr marL="3657600" algn="l" defTabSz="914400" rtl="0" eaLnBrk="1" latinLnBrk="0" hangingPunct="1">
+                        <a:defRPr sz="1800" kern="1200">
+                          <a:solidFill>
+                            <a:schemeClr val="tx1"/>
+                          </a:solidFill>
+                          <a:latin typeface="Calibri"/>
+                        </a:defRPr>
+                      </a:lvl9pPr>
+                    </a:lstStyle>
+                    <a:p>
+                      <a:pPr algn="l" fontAlgn="b"/>
+                      <a:r>
+                        <a:rPr lang="en-US" sz="1400" b="1" i="0" u="none" strike="noStrike" kern="1200" dirty="0" smtClean="0">
+                          <a:solidFill>
+                            <a:schemeClr val="bg1"/>
+                          </a:solidFill>
+                          <a:effectLst/>
+                          <a:latin typeface="Calibri"/>
+                          <a:ea typeface="+mn-ea"/>
+                          <a:cs typeface="Consolas" panose="020B0609020204030204" pitchFamily="49" charset="0"/>
+                        </a:rPr>
+                        <a:t># Total committed Bytes</a:t>
+                      </a:r>
+                      <a:endParaRPr lang="en-US" sz="1400" b="1" i="0" u="none" strike="noStrike" dirty="0">
+                        <a:solidFill>
+                          <a:schemeClr val="bg1"/>
+                        </a:solidFill>
+                        <a:effectLst/>
+                        <a:latin typeface="+mn-lt"/>
+                        <a:cs typeface="Consolas" panose="020B0609020204030204" pitchFamily="49" charset="0"/>
+                      </a:endParaRPr>
+                    </a:p>
+                  </a:txBody>
+                  <a:tcPr marL="45720" marR="45720" anchor="b">
+                    <a:lnL w="12700" cap="flat" cmpd="sng" algn="ctr">
+                      <a:solidFill>
+                        <a:srgbClr val="FFFFFF"/>
+                      </a:solidFill>
+                      <a:prstDash val="solid"/>
+                      <a:round/>
+                      <a:headEnd type="none" w="med" len="med"/>
+                      <a:tailEnd type="none" w="med" len="med"/>
+                    </a:lnL>
+                    <a:lnR w="12700" cap="flat" cmpd="sng" algn="ctr">
+                      <a:solidFill>
+                        <a:srgbClr val="FFFFFF"/>
+                      </a:solidFill>
+                      <a:prstDash val="solid"/>
+                      <a:round/>
+                      <a:headEnd type="none" w="med" len="med"/>
+                      <a:tailEnd type="none" w="med" len="med"/>
+                    </a:lnR>
+                    <a:lnT w="12700" cap="flat" cmpd="sng" algn="ctr">
+                      <a:solidFill>
+                        <a:srgbClr val="FFFFFF"/>
+                      </a:solidFill>
+                      <a:prstDash val="solid"/>
+                      <a:round/>
+                      <a:headEnd type="none" w="med" len="med"/>
+                      <a:tailEnd type="none" w="med" len="med"/>
+                    </a:lnT>
+                    <a:lnB w="12700" cap="flat" cmpd="sng" algn="ctr">
+                      <a:solidFill>
+                        <a:srgbClr val="FFFFFF"/>
+                      </a:solidFill>
+                      <a:prstDash val="solid"/>
+                      <a:round/>
+                      <a:headEnd type="none" w="med" len="med"/>
+                      <a:tailEnd type="none" w="med" len="med"/>
+                    </a:lnB>
+                    <a:lnTlToBr w="12700" cmpd="sng">
+                      <a:noFill/>
+                      <a:prstDash val="solid"/>
+                    </a:lnTlToBr>
+                    <a:lnBlToTr w="12700" cmpd="sng">
+                      <a:noFill/>
+                      <a:prstDash val="solid"/>
+                    </a:lnBlToTr>
+                    <a:noFill/>
+                  </a:tcPr>
+                </a:tc>
+                <a:tc>
+                  <a:txBody>
+                    <a:bodyPr/>
+                    <a:lstStyle>
+                      <a:lvl1pPr marL="0" algn="l" defTabSz="914400" rtl="0" eaLnBrk="1" latinLnBrk="0" hangingPunct="1">
+                        <a:defRPr sz="1800" kern="1200">
+                          <a:solidFill>
+                            <a:schemeClr val="tx1"/>
+                          </a:solidFill>
+                          <a:latin typeface="Calibri"/>
+                        </a:defRPr>
+                      </a:lvl1pPr>
+                      <a:lvl2pPr marL="457200" algn="l" defTabSz="914400" rtl="0" eaLnBrk="1" latinLnBrk="0" hangingPunct="1">
+                        <a:defRPr sz="1800" kern="1200">
+                          <a:solidFill>
+                            <a:schemeClr val="tx1"/>
+                          </a:solidFill>
+                          <a:latin typeface="Calibri"/>
+                        </a:defRPr>
+                      </a:lvl2pPr>
+                      <a:lvl3pPr marL="914400" algn="l" defTabSz="914400" rtl="0" eaLnBrk="1" latinLnBrk="0" hangingPunct="1">
+                        <a:defRPr sz="1800" kern="1200">
+                          <a:solidFill>
+                            <a:schemeClr val="tx1"/>
+                          </a:solidFill>
+                          <a:latin typeface="Calibri"/>
+                        </a:defRPr>
+                      </a:lvl3pPr>
+                      <a:lvl4pPr marL="1371600" algn="l" defTabSz="914400" rtl="0" eaLnBrk="1" latinLnBrk="0" hangingPunct="1">
+                        <a:defRPr sz="1800" kern="1200">
+                          <a:solidFill>
+                            <a:schemeClr val="tx1"/>
+                          </a:solidFill>
+                          <a:latin typeface="Calibri"/>
+                        </a:defRPr>
+                      </a:lvl4pPr>
+                      <a:lvl5pPr marL="1828800" algn="l" defTabSz="914400" rtl="0" eaLnBrk="1" latinLnBrk="0" hangingPunct="1">
+                        <a:defRPr sz="1800" kern="1200">
+                          <a:solidFill>
+                            <a:schemeClr val="tx1"/>
+                          </a:solidFill>
+                          <a:latin typeface="Calibri"/>
+                        </a:defRPr>
+                      </a:lvl5pPr>
+                      <a:lvl6pPr marL="2286000" algn="l" defTabSz="914400" rtl="0" eaLnBrk="1" latinLnBrk="0" hangingPunct="1">
+                        <a:defRPr sz="1800" kern="1200">
+                          <a:solidFill>
+                            <a:schemeClr val="tx1"/>
+                          </a:solidFill>
+                          <a:latin typeface="Calibri"/>
+                        </a:defRPr>
+                      </a:lvl6pPr>
+                      <a:lvl7pPr marL="2743200" algn="l" defTabSz="914400" rtl="0" eaLnBrk="1" latinLnBrk="0" hangingPunct="1">
+                        <a:defRPr sz="1800" kern="1200">
+                          <a:solidFill>
+                            <a:schemeClr val="tx1"/>
+                          </a:solidFill>
+                          <a:latin typeface="Calibri"/>
+                        </a:defRPr>
+                      </a:lvl7pPr>
+                      <a:lvl8pPr marL="3200400" algn="l" defTabSz="914400" rtl="0" eaLnBrk="1" latinLnBrk="0" hangingPunct="1">
+                        <a:defRPr sz="1800" kern="1200">
+                          <a:solidFill>
+                            <a:schemeClr val="tx1"/>
+                          </a:solidFill>
+                          <a:latin typeface="Calibri"/>
+                        </a:defRPr>
+                      </a:lvl8pPr>
+                      <a:lvl9pPr marL="3657600" algn="l" defTabSz="914400" rtl="0" eaLnBrk="1" latinLnBrk="0" hangingPunct="1">
+                        <a:defRPr sz="1800" kern="1200">
+                          <a:solidFill>
+                            <a:schemeClr val="tx1"/>
+                          </a:solidFill>
+                          <a:latin typeface="Calibri"/>
+                        </a:defRPr>
+                      </a:lvl9pPr>
+                    </a:lstStyle>
+                    <a:p>
+                      <a:pPr algn="l" fontAlgn="b"/>
+                      <a:r>
+                        <a:rPr lang="ru-RU" sz="1400" b="0" i="0" u="none" strike="noStrike" dirty="0" smtClean="0">
+                          <a:solidFill>
+                            <a:schemeClr val="bg1"/>
+                          </a:solidFill>
+                          <a:effectLst/>
+                          <a:latin typeface="+mn-lt"/>
+                          <a:cs typeface="Consolas" panose="020B0609020204030204" pitchFamily="49" charset="0"/>
+                        </a:rPr>
+                        <a:t>Кол-во</a:t>
+                      </a:r>
+                      <a:r>
+                        <a:rPr lang="ru-RU" sz="1400" b="0" i="0" u="none" strike="noStrike" baseline="0" dirty="0" smtClean="0">
+                          <a:solidFill>
+                            <a:schemeClr val="bg1"/>
+                          </a:solidFill>
+                          <a:effectLst/>
+                          <a:latin typeface="+mn-lt"/>
+                          <a:cs typeface="Consolas" panose="020B0609020204030204" pitchFamily="49" charset="0"/>
+                        </a:rPr>
+                        <a:t> </a:t>
+                      </a:r>
+                      <a:r>
+                        <a:rPr lang="en-US" sz="1400" b="0" i="0" u="none" strike="noStrike" baseline="0" dirty="0" smtClean="0">
+                          <a:solidFill>
+                            <a:schemeClr val="bg1"/>
+                          </a:solidFill>
+                          <a:effectLst/>
+                          <a:latin typeface="+mn-lt"/>
+                          <a:cs typeface="Consolas" panose="020B0609020204030204" pitchFamily="49" charset="0"/>
+                        </a:rPr>
+                        <a:t>committed </a:t>
+                      </a:r>
+                      <a:r>
+                        <a:rPr lang="ru-RU" sz="1400" b="0" i="0" u="none" strike="noStrike" baseline="0" dirty="0" smtClean="0">
+                          <a:solidFill>
+                            <a:schemeClr val="bg1"/>
+                          </a:solidFill>
+                          <a:effectLst/>
+                          <a:latin typeface="+mn-lt"/>
+                          <a:cs typeface="Consolas" panose="020B0609020204030204" pitchFamily="49" charset="0"/>
+                        </a:rPr>
+                        <a:t>байтов для </a:t>
+                      </a:r>
+                      <a:r>
+                        <a:rPr lang="en-US" sz="1400" b="0" i="0" u="none" strike="noStrike" baseline="0" dirty="0" smtClean="0">
+                          <a:solidFill>
+                            <a:schemeClr val="bg1"/>
+                          </a:solidFill>
+                          <a:effectLst/>
+                          <a:latin typeface="+mn-lt"/>
+                          <a:cs typeface="Consolas" panose="020B0609020204030204" pitchFamily="49" charset="0"/>
+                        </a:rPr>
+                        <a:t>GC (</a:t>
+                      </a:r>
+                      <a:r>
+                        <a:rPr lang="ru-RU" sz="1400" b="0" i="0" u="none" strike="noStrike" baseline="0" dirty="0" smtClean="0">
+                          <a:solidFill>
+                            <a:schemeClr val="bg1"/>
+                          </a:solidFill>
+                          <a:effectLst/>
+                          <a:latin typeface="+mn-lt"/>
+                          <a:cs typeface="Consolas" panose="020B0609020204030204" pitchFamily="49" charset="0"/>
+                        </a:rPr>
+                        <a:t>выделено и используется)</a:t>
+                      </a:r>
+                      <a:endParaRPr lang="en-US" sz="1400" b="0" i="0" u="none" strike="noStrike" dirty="0">
+                        <a:solidFill>
+                          <a:schemeClr val="bg1"/>
+                        </a:solidFill>
+                        <a:effectLst/>
+                        <a:latin typeface="+mn-lt"/>
+                        <a:cs typeface="Consolas" panose="020B0609020204030204" pitchFamily="49" charset="0"/>
+                      </a:endParaRPr>
+                    </a:p>
+                  </a:txBody>
+                  <a:tcPr marL="45720" marR="45720" anchor="b">
+                    <a:lnL w="12700" cap="flat" cmpd="sng" algn="ctr">
+                      <a:solidFill>
+                        <a:srgbClr val="FFFFFF"/>
+                      </a:solidFill>
+                      <a:prstDash val="solid"/>
+                      <a:round/>
+                      <a:headEnd type="none" w="med" len="med"/>
+                      <a:tailEnd type="none" w="med" len="med"/>
+                    </a:lnL>
+                    <a:lnR w="12700" cap="flat" cmpd="sng" algn="ctr">
+                      <a:solidFill>
+                        <a:srgbClr val="FFFFFF"/>
+                      </a:solidFill>
+                      <a:prstDash val="solid"/>
+                      <a:round/>
+                      <a:headEnd type="none" w="med" len="med"/>
+                      <a:tailEnd type="none" w="med" len="med"/>
+                    </a:lnR>
+                    <a:lnT w="12700" cap="flat" cmpd="sng" algn="ctr">
+                      <a:solidFill>
+                        <a:srgbClr val="FFFFFF"/>
+                      </a:solidFill>
+                      <a:prstDash val="solid"/>
+                      <a:round/>
+                      <a:headEnd type="none" w="med" len="med"/>
+                      <a:tailEnd type="none" w="med" len="med"/>
+                    </a:lnT>
+                    <a:lnB w="12700" cap="flat" cmpd="sng" algn="ctr">
+                      <a:solidFill>
+                        <a:srgbClr val="FFFFFF"/>
+                      </a:solidFill>
+                      <a:prstDash val="solid"/>
+                      <a:round/>
+                      <a:headEnd type="none" w="med" len="med"/>
+                      <a:tailEnd type="none" w="med" len="med"/>
+                    </a:lnB>
+                    <a:lnTlToBr w="12700" cmpd="sng">
+                      <a:noFill/>
+                      <a:prstDash val="solid"/>
+                    </a:lnTlToBr>
+                    <a:lnBlToTr w="12700" cmpd="sng">
+                      <a:noFill/>
+                      <a:prstDash val="solid"/>
+                    </a:lnBlToTr>
+                    <a:noFill/>
+                  </a:tcPr>
+                </a:tc>
+              </a:tr>
+              <a:tr h="0">
+                <a:tc>
+                  <a:txBody>
+                    <a:bodyPr/>
+                    <a:lstStyle>
+                      <a:lvl1pPr marL="0" algn="l" defTabSz="914400" rtl="0" eaLnBrk="1" latinLnBrk="0" hangingPunct="1">
+                        <a:defRPr sz="1800" kern="1200">
+                          <a:solidFill>
+                            <a:schemeClr val="tx1"/>
+                          </a:solidFill>
+                          <a:latin typeface="Calibri"/>
+                        </a:defRPr>
+                      </a:lvl1pPr>
+                      <a:lvl2pPr marL="457200" algn="l" defTabSz="914400" rtl="0" eaLnBrk="1" latinLnBrk="0" hangingPunct="1">
+                        <a:defRPr sz="1800" kern="1200">
+                          <a:solidFill>
+                            <a:schemeClr val="tx1"/>
+                          </a:solidFill>
+                          <a:latin typeface="Calibri"/>
+                        </a:defRPr>
+                      </a:lvl2pPr>
+                      <a:lvl3pPr marL="914400" algn="l" defTabSz="914400" rtl="0" eaLnBrk="1" latinLnBrk="0" hangingPunct="1">
+                        <a:defRPr sz="1800" kern="1200">
+                          <a:solidFill>
+                            <a:schemeClr val="tx1"/>
+                          </a:solidFill>
+                          <a:latin typeface="Calibri"/>
+                        </a:defRPr>
+                      </a:lvl3pPr>
+                      <a:lvl4pPr marL="1371600" algn="l" defTabSz="914400" rtl="0" eaLnBrk="1" latinLnBrk="0" hangingPunct="1">
+                        <a:defRPr sz="1800" kern="1200">
+                          <a:solidFill>
+                            <a:schemeClr val="tx1"/>
+                          </a:solidFill>
+                          <a:latin typeface="Calibri"/>
+                        </a:defRPr>
+                      </a:lvl4pPr>
+                      <a:lvl5pPr marL="1828800" algn="l" defTabSz="914400" rtl="0" eaLnBrk="1" latinLnBrk="0" hangingPunct="1">
+                        <a:defRPr sz="1800" kern="1200">
+                          <a:solidFill>
+                            <a:schemeClr val="tx1"/>
+                          </a:solidFill>
+                          <a:latin typeface="Calibri"/>
+                        </a:defRPr>
+                      </a:lvl5pPr>
+                      <a:lvl6pPr marL="2286000" algn="l" defTabSz="914400" rtl="0" eaLnBrk="1" latinLnBrk="0" hangingPunct="1">
+                        <a:defRPr sz="1800" kern="1200">
+                          <a:solidFill>
+                            <a:schemeClr val="tx1"/>
+                          </a:solidFill>
+                          <a:latin typeface="Calibri"/>
+                        </a:defRPr>
+                      </a:lvl6pPr>
+                      <a:lvl7pPr marL="2743200" algn="l" defTabSz="914400" rtl="0" eaLnBrk="1" latinLnBrk="0" hangingPunct="1">
+                        <a:defRPr sz="1800" kern="1200">
+                          <a:solidFill>
+                            <a:schemeClr val="tx1"/>
+                          </a:solidFill>
+                          <a:latin typeface="Calibri"/>
+                        </a:defRPr>
+                      </a:lvl7pPr>
+                      <a:lvl8pPr marL="3200400" algn="l" defTabSz="914400" rtl="0" eaLnBrk="1" latinLnBrk="0" hangingPunct="1">
+                        <a:defRPr sz="1800" kern="1200">
+                          <a:solidFill>
+                            <a:schemeClr val="tx1"/>
+                          </a:solidFill>
+                          <a:latin typeface="Calibri"/>
+                        </a:defRPr>
+                      </a:lvl8pPr>
+                      <a:lvl9pPr marL="3657600" algn="l" defTabSz="914400" rtl="0" eaLnBrk="1" latinLnBrk="0" hangingPunct="1">
+                        <a:defRPr sz="1800" kern="1200">
+                          <a:solidFill>
+                            <a:schemeClr val="tx1"/>
+                          </a:solidFill>
+                          <a:latin typeface="Calibri"/>
+                        </a:defRPr>
+                      </a:lvl9pPr>
+                    </a:lstStyle>
+                    <a:p>
+                      <a:pPr marL="0" marR="0" indent="0" algn="l" defTabSz="914400" rtl="0" eaLnBrk="1" fontAlgn="b" latinLnBrk="0" hangingPunct="1">
+                        <a:lnSpc>
+                          <a:spcPct val="100000"/>
+                        </a:lnSpc>
+                        <a:spcBef>
+                          <a:spcPts val="0"/>
+                        </a:spcBef>
+                        <a:spcAft>
+                          <a:spcPts val="0"/>
+                        </a:spcAft>
+                        <a:buClrTx/>
+                        <a:buSzTx/>
+                        <a:buFontTx/>
+                        <a:buNone/>
+                        <a:tabLst/>
+                        <a:defRPr/>
+                      </a:pPr>
+                      <a:r>
+                        <a:rPr lang="en-US" sz="1400" b="1" i="0" u="none" strike="noStrike" kern="1200" dirty="0" smtClean="0">
+                          <a:solidFill>
+                            <a:schemeClr val="bg1"/>
+                          </a:solidFill>
+                          <a:effectLst/>
+                          <a:latin typeface="Calibri"/>
+                          <a:ea typeface="+mn-ea"/>
+                          <a:cs typeface="Consolas" panose="020B0609020204030204" pitchFamily="49" charset="0"/>
+                        </a:rPr>
+                        <a:t># Total reserved Bytes</a:t>
+                      </a:r>
+                      <a:endParaRPr lang="en-US" sz="1400" b="1" i="0" u="none" strike="noStrike" dirty="0">
+                        <a:solidFill>
+                          <a:schemeClr val="bg1"/>
+                        </a:solidFill>
+                        <a:effectLst/>
+                        <a:latin typeface="+mn-lt"/>
+                        <a:cs typeface="Consolas" panose="020B0609020204030204" pitchFamily="49" charset="0"/>
+                      </a:endParaRPr>
+                    </a:p>
+                  </a:txBody>
+                  <a:tcPr marL="45720" marR="45720" anchor="ctr">
+                    <a:lnL w="12700" cap="flat" cmpd="sng" algn="ctr">
+                      <a:solidFill>
+                        <a:srgbClr val="FFFFFF"/>
+                      </a:solidFill>
+                      <a:prstDash val="solid"/>
+                      <a:round/>
+                      <a:headEnd type="none" w="med" len="med"/>
+                      <a:tailEnd type="none" w="med" len="med"/>
+                    </a:lnL>
+                    <a:lnR w="12700" cap="flat" cmpd="sng" algn="ctr">
+                      <a:solidFill>
+                        <a:srgbClr val="FFFFFF"/>
+                      </a:solidFill>
+                      <a:prstDash val="solid"/>
+                      <a:round/>
+                      <a:headEnd type="none" w="med" len="med"/>
+                      <a:tailEnd type="none" w="med" len="med"/>
+                    </a:lnR>
+                    <a:lnT w="12700" cap="flat" cmpd="sng" algn="ctr">
+                      <a:solidFill>
+                        <a:srgbClr val="FFFFFF"/>
+                      </a:solidFill>
+                      <a:prstDash val="solid"/>
+                      <a:round/>
+                      <a:headEnd type="none" w="med" len="med"/>
+                      <a:tailEnd type="none" w="med" len="med"/>
+                    </a:lnT>
+                    <a:lnB w="12700" cap="flat" cmpd="sng" algn="ctr">
+                      <a:solidFill>
+                        <a:srgbClr val="FFFFFF"/>
+                      </a:solidFill>
+                      <a:prstDash val="solid"/>
+                      <a:round/>
+                      <a:headEnd type="none" w="med" len="med"/>
+                      <a:tailEnd type="none" w="med" len="med"/>
+                    </a:lnB>
+                    <a:lnTlToBr w="12700" cmpd="sng">
+                      <a:noFill/>
+                      <a:prstDash val="solid"/>
+                    </a:lnTlToBr>
+                    <a:lnBlToTr w="12700" cmpd="sng">
+                      <a:noFill/>
+                      <a:prstDash val="solid"/>
+                    </a:lnBlToTr>
+                    <a:noFill/>
+                  </a:tcPr>
+                </a:tc>
+                <a:tc>
+                  <a:txBody>
+                    <a:bodyPr/>
+                    <a:lstStyle>
+                      <a:lvl1pPr marL="0" algn="l" defTabSz="914400" rtl="0" eaLnBrk="1" latinLnBrk="0" hangingPunct="1">
+                        <a:defRPr sz="1800" kern="1200">
+                          <a:solidFill>
+                            <a:schemeClr val="tx1"/>
+                          </a:solidFill>
+                          <a:latin typeface="Calibri"/>
+                        </a:defRPr>
+                      </a:lvl1pPr>
+                      <a:lvl2pPr marL="457200" algn="l" defTabSz="914400" rtl="0" eaLnBrk="1" latinLnBrk="0" hangingPunct="1">
+                        <a:defRPr sz="1800" kern="1200">
+                          <a:solidFill>
+                            <a:schemeClr val="tx1"/>
+                          </a:solidFill>
+                          <a:latin typeface="Calibri"/>
+                        </a:defRPr>
+                      </a:lvl2pPr>
+                      <a:lvl3pPr marL="914400" algn="l" defTabSz="914400" rtl="0" eaLnBrk="1" latinLnBrk="0" hangingPunct="1">
+                        <a:defRPr sz="1800" kern="1200">
+                          <a:solidFill>
+                            <a:schemeClr val="tx1"/>
+                          </a:solidFill>
+                          <a:latin typeface="Calibri"/>
+                        </a:defRPr>
+                      </a:lvl3pPr>
+                      <a:lvl4pPr marL="1371600" algn="l" defTabSz="914400" rtl="0" eaLnBrk="1" latinLnBrk="0" hangingPunct="1">
+                        <a:defRPr sz="1800" kern="1200">
+                          <a:solidFill>
+                            <a:schemeClr val="tx1"/>
+                          </a:solidFill>
+                          <a:latin typeface="Calibri"/>
+                        </a:defRPr>
+                      </a:lvl4pPr>
+                      <a:lvl5pPr marL="1828800" algn="l" defTabSz="914400" rtl="0" eaLnBrk="1" latinLnBrk="0" hangingPunct="1">
+                        <a:defRPr sz="1800" kern="1200">
+                          <a:solidFill>
+                            <a:schemeClr val="tx1"/>
+                          </a:solidFill>
+                          <a:latin typeface="Calibri"/>
+                        </a:defRPr>
+                      </a:lvl5pPr>
+                      <a:lvl6pPr marL="2286000" algn="l" defTabSz="914400" rtl="0" eaLnBrk="1" latinLnBrk="0" hangingPunct="1">
+                        <a:defRPr sz="1800" kern="1200">
+                          <a:solidFill>
+                            <a:schemeClr val="tx1"/>
+                          </a:solidFill>
+                          <a:latin typeface="Calibri"/>
+                        </a:defRPr>
+                      </a:lvl6pPr>
+                      <a:lvl7pPr marL="2743200" algn="l" defTabSz="914400" rtl="0" eaLnBrk="1" latinLnBrk="0" hangingPunct="1">
+                        <a:defRPr sz="1800" kern="1200">
+                          <a:solidFill>
+                            <a:schemeClr val="tx1"/>
+                          </a:solidFill>
+                          <a:latin typeface="Calibri"/>
+                        </a:defRPr>
+                      </a:lvl7pPr>
+                      <a:lvl8pPr marL="3200400" algn="l" defTabSz="914400" rtl="0" eaLnBrk="1" latinLnBrk="0" hangingPunct="1">
+                        <a:defRPr sz="1800" kern="1200">
+                          <a:solidFill>
+                            <a:schemeClr val="tx1"/>
+                          </a:solidFill>
+                          <a:latin typeface="Calibri"/>
+                        </a:defRPr>
+                      </a:lvl8pPr>
+                      <a:lvl9pPr marL="3657600" algn="l" defTabSz="914400" rtl="0" eaLnBrk="1" latinLnBrk="0" hangingPunct="1">
+                        <a:defRPr sz="1800" kern="1200">
+                          <a:solidFill>
+                            <a:schemeClr val="tx1"/>
+                          </a:solidFill>
+                          <a:latin typeface="Calibri"/>
+                        </a:defRPr>
+                      </a:lvl9pPr>
+                    </a:lstStyle>
+                    <a:p>
+                      <a:pPr marL="0" marR="0" indent="0" algn="l" defTabSz="914400" rtl="0" eaLnBrk="1" fontAlgn="b" latinLnBrk="0" hangingPunct="1">
+                        <a:lnSpc>
+                          <a:spcPct val="100000"/>
+                        </a:lnSpc>
+                        <a:spcBef>
+                          <a:spcPts val="0"/>
+                        </a:spcBef>
+                        <a:spcAft>
+                          <a:spcPts val="0"/>
+                        </a:spcAft>
+                        <a:buClrTx/>
+                        <a:buSzTx/>
+                        <a:buFontTx/>
+                        <a:buNone/>
+                        <a:tabLst/>
+                        <a:defRPr/>
+                      </a:pPr>
+                      <a:r>
+                        <a:rPr lang="ru-RU" sz="1400" b="0" i="0" u="none" strike="noStrike" kern="1200" dirty="0" smtClean="0">
+                          <a:solidFill>
+                            <a:schemeClr val="bg1"/>
+                          </a:solidFill>
+                          <a:effectLst/>
+                          <a:latin typeface="Calibri"/>
+                          <a:ea typeface="+mn-ea"/>
+                          <a:cs typeface="Consolas" panose="020B0609020204030204" pitchFamily="49" charset="0"/>
+                        </a:rPr>
+                        <a:t>Кол-во</a:t>
+                      </a:r>
+                      <a:r>
+                        <a:rPr lang="ru-RU" sz="1400" b="0" i="0" u="none" strike="noStrike" kern="1200" baseline="0" dirty="0" smtClean="0">
+                          <a:solidFill>
+                            <a:schemeClr val="bg1"/>
+                          </a:solidFill>
+                          <a:effectLst/>
+                          <a:latin typeface="Calibri"/>
+                          <a:ea typeface="+mn-ea"/>
+                          <a:cs typeface="Consolas" panose="020B0609020204030204" pitchFamily="49" charset="0"/>
+                        </a:rPr>
+                        <a:t> зарезервированных байтов для </a:t>
+                      </a:r>
+                      <a:r>
+                        <a:rPr lang="en-US" sz="1400" b="0" i="0" u="none" strike="noStrike" kern="1200" baseline="0" dirty="0" smtClean="0">
+                          <a:solidFill>
+                            <a:schemeClr val="bg1"/>
+                          </a:solidFill>
+                          <a:effectLst/>
+                          <a:latin typeface="Calibri"/>
+                          <a:ea typeface="+mn-ea"/>
+                          <a:cs typeface="Consolas" panose="020B0609020204030204" pitchFamily="49" charset="0"/>
+                        </a:rPr>
+                        <a:t>GC</a:t>
+                      </a:r>
+                      <a:endParaRPr lang="en-US" sz="1400" b="0" i="0" u="none" strike="noStrike" dirty="0">
+                        <a:solidFill>
+                          <a:schemeClr val="bg1"/>
+                        </a:solidFill>
+                        <a:effectLst/>
+                        <a:latin typeface="+mn-lt"/>
+                        <a:cs typeface="Consolas" panose="020B0609020204030204" pitchFamily="49" charset="0"/>
+                      </a:endParaRPr>
+                    </a:p>
+                  </a:txBody>
+                  <a:tcPr marL="45720" marR="45720" anchor="b">
+                    <a:lnL w="12700" cap="flat" cmpd="sng" algn="ctr">
+                      <a:solidFill>
+                        <a:srgbClr val="FFFFFF"/>
+                      </a:solidFill>
+                      <a:prstDash val="solid"/>
+                      <a:round/>
+                      <a:headEnd type="none" w="med" len="med"/>
+                      <a:tailEnd type="none" w="med" len="med"/>
+                    </a:lnL>
+                    <a:lnR w="12700" cap="flat" cmpd="sng" algn="ctr">
+                      <a:solidFill>
+                        <a:srgbClr val="FFFFFF"/>
+                      </a:solidFill>
+                      <a:prstDash val="solid"/>
+                      <a:round/>
+                      <a:headEnd type="none" w="med" len="med"/>
+                      <a:tailEnd type="none" w="med" len="med"/>
+                    </a:lnR>
+                    <a:lnT w="12700" cap="flat" cmpd="sng" algn="ctr">
+                      <a:solidFill>
+                        <a:srgbClr val="FFFFFF"/>
+                      </a:solidFill>
+                      <a:prstDash val="solid"/>
+                      <a:round/>
+                      <a:headEnd type="none" w="med" len="med"/>
+                      <a:tailEnd type="none" w="med" len="med"/>
+                    </a:lnT>
+                    <a:lnB w="12700" cap="flat" cmpd="sng" algn="ctr">
+                      <a:solidFill>
+                        <a:srgbClr val="FFFFFF"/>
+                      </a:solidFill>
+                      <a:prstDash val="solid"/>
+                      <a:round/>
+                      <a:headEnd type="none" w="med" len="med"/>
+                      <a:tailEnd type="none" w="med" len="med"/>
+                    </a:lnB>
+                    <a:lnTlToBr w="12700" cmpd="sng">
+                      <a:noFill/>
+                      <a:prstDash val="solid"/>
+                    </a:lnTlToBr>
+                    <a:lnBlToTr w="12700" cmpd="sng">
+                      <a:noFill/>
+                      <a:prstDash val="solid"/>
+                    </a:lnBlToTr>
+                    <a:noFill/>
+                  </a:tcPr>
+                </a:tc>
+              </a:tr>
+              <a:tr h="0">
+                <a:tc>
+                  <a:txBody>
+                    <a:bodyPr/>
+                    <a:lstStyle>
+                      <a:lvl1pPr marL="0" algn="l" defTabSz="914400" rtl="0" eaLnBrk="1" latinLnBrk="0" hangingPunct="1">
+                        <a:defRPr sz="1800" kern="1200">
+                          <a:solidFill>
+                            <a:schemeClr val="tx1"/>
+                          </a:solidFill>
+                          <a:latin typeface="Calibri"/>
+                        </a:defRPr>
+                      </a:lvl1pPr>
+                      <a:lvl2pPr marL="457200" algn="l" defTabSz="914400" rtl="0" eaLnBrk="1" latinLnBrk="0" hangingPunct="1">
+                        <a:defRPr sz="1800" kern="1200">
+                          <a:solidFill>
+                            <a:schemeClr val="tx1"/>
+                          </a:solidFill>
+                          <a:latin typeface="Calibri"/>
+                        </a:defRPr>
+                      </a:lvl2pPr>
+                      <a:lvl3pPr marL="914400" algn="l" defTabSz="914400" rtl="0" eaLnBrk="1" latinLnBrk="0" hangingPunct="1">
+                        <a:defRPr sz="1800" kern="1200">
+                          <a:solidFill>
+                            <a:schemeClr val="tx1"/>
+                          </a:solidFill>
+                          <a:latin typeface="Calibri"/>
+                        </a:defRPr>
+                      </a:lvl3pPr>
+                      <a:lvl4pPr marL="1371600" algn="l" defTabSz="914400" rtl="0" eaLnBrk="1" latinLnBrk="0" hangingPunct="1">
+                        <a:defRPr sz="1800" kern="1200">
+                          <a:solidFill>
+                            <a:schemeClr val="tx1"/>
+                          </a:solidFill>
+                          <a:latin typeface="Calibri"/>
+                        </a:defRPr>
+                      </a:lvl4pPr>
+                      <a:lvl5pPr marL="1828800" algn="l" defTabSz="914400" rtl="0" eaLnBrk="1" latinLnBrk="0" hangingPunct="1">
+                        <a:defRPr sz="1800" kern="1200">
+                          <a:solidFill>
+                            <a:schemeClr val="tx1"/>
+                          </a:solidFill>
+                          <a:latin typeface="Calibri"/>
+                        </a:defRPr>
+                      </a:lvl5pPr>
+                      <a:lvl6pPr marL="2286000" algn="l" defTabSz="914400" rtl="0" eaLnBrk="1" latinLnBrk="0" hangingPunct="1">
+                        <a:defRPr sz="1800" kern="1200">
+                          <a:solidFill>
+                            <a:schemeClr val="tx1"/>
+                          </a:solidFill>
+                          <a:latin typeface="Calibri"/>
+                        </a:defRPr>
+                      </a:lvl6pPr>
+                      <a:lvl7pPr marL="2743200" algn="l" defTabSz="914400" rtl="0" eaLnBrk="1" latinLnBrk="0" hangingPunct="1">
+                        <a:defRPr sz="1800" kern="1200">
+                          <a:solidFill>
+                            <a:schemeClr val="tx1"/>
+                          </a:solidFill>
+                          <a:latin typeface="Calibri"/>
+                        </a:defRPr>
+                      </a:lvl7pPr>
+                      <a:lvl8pPr marL="3200400" algn="l" defTabSz="914400" rtl="0" eaLnBrk="1" latinLnBrk="0" hangingPunct="1">
+                        <a:defRPr sz="1800" kern="1200">
+                          <a:solidFill>
+                            <a:schemeClr val="tx1"/>
+                          </a:solidFill>
+                          <a:latin typeface="Calibri"/>
+                        </a:defRPr>
+                      </a:lvl8pPr>
+                      <a:lvl9pPr marL="3657600" algn="l" defTabSz="914400" rtl="0" eaLnBrk="1" latinLnBrk="0" hangingPunct="1">
+                        <a:defRPr sz="1800" kern="1200">
+                          <a:solidFill>
+                            <a:schemeClr val="tx1"/>
+                          </a:solidFill>
+                          <a:latin typeface="Calibri"/>
+                        </a:defRPr>
+                      </a:lvl9pPr>
+                    </a:lstStyle>
+                    <a:p>
+                      <a:pPr algn="l" fontAlgn="b"/>
+                      <a:r>
+                        <a:rPr lang="en-US" sz="1400" b="1" i="0" u="none" strike="noStrike" kern="1200" dirty="0" smtClean="0">
+                          <a:solidFill>
+                            <a:schemeClr val="bg1"/>
+                          </a:solidFill>
+                          <a:effectLst/>
+                          <a:latin typeface="Calibri"/>
+                          <a:ea typeface="+mn-ea"/>
+                          <a:cs typeface="Consolas" panose="020B0609020204030204" pitchFamily="49" charset="0"/>
+                        </a:rPr>
+                        <a:t># of Pinned Objects</a:t>
+                      </a:r>
+                      <a:endParaRPr lang="en-US" sz="1400" b="1" i="0" u="none" strike="noStrike" dirty="0">
+                        <a:solidFill>
+                          <a:schemeClr val="bg1"/>
+                        </a:solidFill>
+                        <a:effectLst/>
+                        <a:latin typeface="+mn-lt"/>
+                        <a:cs typeface="Consolas" panose="020B0609020204030204" pitchFamily="49" charset="0"/>
+                      </a:endParaRPr>
+                    </a:p>
+                  </a:txBody>
+                  <a:tcPr marL="45720" marR="45720" anchor="b">
+                    <a:lnL w="12700" cap="flat" cmpd="sng" algn="ctr">
+                      <a:solidFill>
+                        <a:srgbClr val="FFFFFF"/>
+                      </a:solidFill>
+                      <a:prstDash val="solid"/>
+                      <a:round/>
+                      <a:headEnd type="none" w="med" len="med"/>
+                      <a:tailEnd type="none" w="med" len="med"/>
+                    </a:lnL>
+                    <a:lnR w="12700" cap="flat" cmpd="sng" algn="ctr">
+                      <a:solidFill>
+                        <a:srgbClr val="FFFFFF"/>
+                      </a:solidFill>
+                      <a:prstDash val="solid"/>
+                      <a:round/>
+                      <a:headEnd type="none" w="med" len="med"/>
+                      <a:tailEnd type="none" w="med" len="med"/>
+                    </a:lnR>
+                    <a:lnT w="12700" cap="flat" cmpd="sng" algn="ctr">
+                      <a:solidFill>
+                        <a:srgbClr val="FFFFFF"/>
+                      </a:solidFill>
+                      <a:prstDash val="solid"/>
+                      <a:round/>
+                      <a:headEnd type="none" w="med" len="med"/>
+                      <a:tailEnd type="none" w="med" len="med"/>
+                    </a:lnT>
+                    <a:lnB w="12700" cap="flat" cmpd="sng" algn="ctr">
+                      <a:solidFill>
+                        <a:srgbClr val="FFFFFF"/>
+                      </a:solidFill>
+                      <a:prstDash val="solid"/>
+                      <a:round/>
+                      <a:headEnd type="none" w="med" len="med"/>
+                      <a:tailEnd type="none" w="med" len="med"/>
+                    </a:lnB>
+                    <a:lnTlToBr w="12700" cmpd="sng">
+                      <a:noFill/>
+                      <a:prstDash val="solid"/>
+                    </a:lnTlToBr>
+                    <a:lnBlToTr w="12700" cmpd="sng">
+                      <a:noFill/>
+                      <a:prstDash val="solid"/>
+                    </a:lnBlToTr>
+                    <a:noFill/>
+                  </a:tcPr>
+                </a:tc>
+                <a:tc>
+                  <a:txBody>
+                    <a:bodyPr/>
+                    <a:lstStyle>
+                      <a:lvl1pPr marL="0" algn="l" defTabSz="914400" rtl="0" eaLnBrk="1" latinLnBrk="0" hangingPunct="1">
+                        <a:defRPr sz="1800" kern="1200">
+                          <a:solidFill>
+                            <a:schemeClr val="tx1"/>
+                          </a:solidFill>
+                          <a:latin typeface="Calibri"/>
+                        </a:defRPr>
+                      </a:lvl1pPr>
+                      <a:lvl2pPr marL="457200" algn="l" defTabSz="914400" rtl="0" eaLnBrk="1" latinLnBrk="0" hangingPunct="1">
+                        <a:defRPr sz="1800" kern="1200">
+                          <a:solidFill>
+                            <a:schemeClr val="tx1"/>
+                          </a:solidFill>
+                          <a:latin typeface="Calibri"/>
+                        </a:defRPr>
+                      </a:lvl2pPr>
+                      <a:lvl3pPr marL="914400" algn="l" defTabSz="914400" rtl="0" eaLnBrk="1" latinLnBrk="0" hangingPunct="1">
+                        <a:defRPr sz="1800" kern="1200">
+                          <a:solidFill>
+                            <a:schemeClr val="tx1"/>
+                          </a:solidFill>
+                          <a:latin typeface="Calibri"/>
+                        </a:defRPr>
+                      </a:lvl3pPr>
+                      <a:lvl4pPr marL="1371600" algn="l" defTabSz="914400" rtl="0" eaLnBrk="1" latinLnBrk="0" hangingPunct="1">
+                        <a:defRPr sz="1800" kern="1200">
+                          <a:solidFill>
+                            <a:schemeClr val="tx1"/>
+                          </a:solidFill>
+                          <a:latin typeface="Calibri"/>
+                        </a:defRPr>
+                      </a:lvl4pPr>
+                      <a:lvl5pPr marL="1828800" algn="l" defTabSz="914400" rtl="0" eaLnBrk="1" latinLnBrk="0" hangingPunct="1">
+                        <a:defRPr sz="1800" kern="1200">
+                          <a:solidFill>
+                            <a:schemeClr val="tx1"/>
+                          </a:solidFill>
+                          <a:latin typeface="Calibri"/>
+                        </a:defRPr>
+                      </a:lvl5pPr>
+                      <a:lvl6pPr marL="2286000" algn="l" defTabSz="914400" rtl="0" eaLnBrk="1" latinLnBrk="0" hangingPunct="1">
+                        <a:defRPr sz="1800" kern="1200">
+                          <a:solidFill>
+                            <a:schemeClr val="tx1"/>
+                          </a:solidFill>
+                          <a:latin typeface="Calibri"/>
+                        </a:defRPr>
+                      </a:lvl6pPr>
+                      <a:lvl7pPr marL="2743200" algn="l" defTabSz="914400" rtl="0" eaLnBrk="1" latinLnBrk="0" hangingPunct="1">
+                        <a:defRPr sz="1800" kern="1200">
+                          <a:solidFill>
+                            <a:schemeClr val="tx1"/>
+                          </a:solidFill>
+                          <a:latin typeface="Calibri"/>
+                        </a:defRPr>
+                      </a:lvl7pPr>
+                      <a:lvl8pPr marL="3200400" algn="l" defTabSz="914400" rtl="0" eaLnBrk="1" latinLnBrk="0" hangingPunct="1">
+                        <a:defRPr sz="1800" kern="1200">
+                          <a:solidFill>
+                            <a:schemeClr val="tx1"/>
+                          </a:solidFill>
+                          <a:latin typeface="Calibri"/>
+                        </a:defRPr>
+                      </a:lvl8pPr>
+                      <a:lvl9pPr marL="3657600" algn="l" defTabSz="914400" rtl="0" eaLnBrk="1" latinLnBrk="0" hangingPunct="1">
+                        <a:defRPr sz="1800" kern="1200">
+                          <a:solidFill>
+                            <a:schemeClr val="tx1"/>
+                          </a:solidFill>
+                          <a:latin typeface="Calibri"/>
+                        </a:defRPr>
+                      </a:lvl9pPr>
+                    </a:lstStyle>
+                    <a:p>
+                      <a:pPr algn="l" fontAlgn="b"/>
+                      <a:r>
+                        <a:rPr lang="ru-RU" sz="1400" b="0" i="0" u="none" strike="noStrike" dirty="0" smtClean="0">
+                          <a:solidFill>
+                            <a:schemeClr val="bg1"/>
+                          </a:solidFill>
+                          <a:effectLst/>
+                          <a:latin typeface="+mn-lt"/>
+                          <a:cs typeface="Consolas" panose="020B0609020204030204" pitchFamily="49" charset="0"/>
+                        </a:rPr>
+                        <a:t>Текущее кол-во</a:t>
+                      </a:r>
+                      <a:r>
+                        <a:rPr lang="ru-RU" sz="1400" b="0" i="0" u="none" strike="noStrike" baseline="0" dirty="0" smtClean="0">
+                          <a:solidFill>
+                            <a:schemeClr val="bg1"/>
+                          </a:solidFill>
+                          <a:effectLst/>
+                          <a:latin typeface="+mn-lt"/>
+                          <a:cs typeface="Consolas" panose="020B0609020204030204" pitchFamily="49" charset="0"/>
+                        </a:rPr>
+                        <a:t> прикрепленных </a:t>
+                      </a:r>
+                      <a:r>
+                        <a:rPr lang="en-US" sz="1400" b="0" i="0" u="none" strike="noStrike" baseline="0" dirty="0" smtClean="0">
+                          <a:solidFill>
+                            <a:schemeClr val="bg1"/>
+                          </a:solidFill>
+                          <a:effectLst/>
+                          <a:latin typeface="+mn-lt"/>
+                          <a:cs typeface="Consolas" panose="020B0609020204030204" pitchFamily="49" charset="0"/>
+                        </a:rPr>
+                        <a:t>(fixed </a:t>
+                      </a:r>
+                      <a:r>
+                        <a:rPr lang="ru-RU" sz="1400" b="0" i="0" u="none" strike="noStrike" baseline="0" dirty="0" smtClean="0">
+                          <a:solidFill>
+                            <a:schemeClr val="bg1"/>
+                          </a:solidFill>
+                          <a:effectLst/>
+                          <a:latin typeface="+mn-lt"/>
+                          <a:cs typeface="Consolas" panose="020B0609020204030204" pitchFamily="49" charset="0"/>
+                        </a:rPr>
+                        <a:t>в </a:t>
+                      </a:r>
+                      <a:r>
+                        <a:rPr lang="en-US" sz="1400" b="0" i="0" u="none" strike="noStrike" baseline="0" dirty="0" smtClean="0">
+                          <a:solidFill>
+                            <a:schemeClr val="bg1"/>
+                          </a:solidFill>
+                          <a:effectLst/>
+                          <a:latin typeface="+mn-lt"/>
+                          <a:cs typeface="Consolas" panose="020B0609020204030204" pitchFamily="49" charset="0"/>
+                        </a:rPr>
+                        <a:t>C#) </a:t>
+                      </a:r>
+                      <a:r>
+                        <a:rPr lang="ru-RU" sz="1400" b="0" i="0" u="none" strike="noStrike" baseline="0" dirty="0" smtClean="0">
+                          <a:solidFill>
+                            <a:schemeClr val="bg1"/>
+                          </a:solidFill>
+                          <a:effectLst/>
+                          <a:latin typeface="+mn-lt"/>
+                          <a:cs typeface="Consolas" panose="020B0609020204030204" pitchFamily="49" charset="0"/>
+                        </a:rPr>
+                        <a:t>объектов</a:t>
+                      </a:r>
+                      <a:endParaRPr lang="en-US" sz="1400" b="0" i="0" u="none" strike="noStrike" dirty="0">
+                        <a:solidFill>
+                          <a:schemeClr val="bg1"/>
+                        </a:solidFill>
+                        <a:effectLst/>
+                        <a:latin typeface="+mn-lt"/>
+                        <a:cs typeface="Consolas" panose="020B0609020204030204" pitchFamily="49" charset="0"/>
+                      </a:endParaRPr>
+                    </a:p>
+                  </a:txBody>
+                  <a:tcPr marL="45720" marR="45720" anchor="b">
+                    <a:lnL w="12700" cap="flat" cmpd="sng" algn="ctr">
+                      <a:solidFill>
+                        <a:srgbClr val="FFFFFF"/>
+                      </a:solidFill>
+                      <a:prstDash val="solid"/>
+                      <a:round/>
+                      <a:headEnd type="none" w="med" len="med"/>
+                      <a:tailEnd type="none" w="med" len="med"/>
+                    </a:lnL>
+                    <a:lnR w="12700" cap="flat" cmpd="sng" algn="ctr">
+                      <a:solidFill>
+                        <a:srgbClr val="FFFFFF"/>
+                      </a:solidFill>
+                      <a:prstDash val="solid"/>
+                      <a:round/>
+                      <a:headEnd type="none" w="med" len="med"/>
+                      <a:tailEnd type="none" w="med" len="med"/>
+                    </a:lnR>
+                    <a:lnT w="12700" cap="flat" cmpd="sng" algn="ctr">
+                      <a:solidFill>
+                        <a:srgbClr val="FFFFFF"/>
+                      </a:solidFill>
+                      <a:prstDash val="solid"/>
+                      <a:round/>
+                      <a:headEnd type="none" w="med" len="med"/>
+                      <a:tailEnd type="none" w="med" len="med"/>
+                    </a:lnT>
+                    <a:lnB w="12700" cap="flat" cmpd="sng" algn="ctr">
+                      <a:solidFill>
+                        <a:srgbClr val="FFFFFF"/>
+                      </a:solidFill>
+                      <a:prstDash val="solid"/>
+                      <a:round/>
+                      <a:headEnd type="none" w="med" len="med"/>
+                      <a:tailEnd type="none" w="med" len="med"/>
+                    </a:lnB>
+                    <a:lnTlToBr w="12700" cmpd="sng">
+                      <a:noFill/>
+                      <a:prstDash val="solid"/>
+                    </a:lnTlToBr>
+                    <a:lnBlToTr w="12700" cmpd="sng">
+                      <a:noFill/>
+                      <a:prstDash val="solid"/>
+                    </a:lnBlToTr>
+                    <a:noFill/>
+                  </a:tcPr>
+                </a:tc>
+              </a:tr>
+              <a:tr h="0">
+                <a:tc>
+                  <a:txBody>
+                    <a:bodyPr/>
+                    <a:lstStyle>
+                      <a:lvl1pPr marL="0" algn="l" defTabSz="914400" rtl="0" eaLnBrk="1" latinLnBrk="0" hangingPunct="1">
+                        <a:defRPr sz="1800" kern="1200">
+                          <a:solidFill>
+                            <a:schemeClr val="tx1"/>
+                          </a:solidFill>
+                          <a:latin typeface="Calibri"/>
+                        </a:defRPr>
+                      </a:lvl1pPr>
+                      <a:lvl2pPr marL="457200" algn="l" defTabSz="914400" rtl="0" eaLnBrk="1" latinLnBrk="0" hangingPunct="1">
+                        <a:defRPr sz="1800" kern="1200">
+                          <a:solidFill>
+                            <a:schemeClr val="tx1"/>
+                          </a:solidFill>
+                          <a:latin typeface="Calibri"/>
+                        </a:defRPr>
+                      </a:lvl2pPr>
+                      <a:lvl3pPr marL="914400" algn="l" defTabSz="914400" rtl="0" eaLnBrk="1" latinLnBrk="0" hangingPunct="1">
+                        <a:defRPr sz="1800" kern="1200">
+                          <a:solidFill>
+                            <a:schemeClr val="tx1"/>
+                          </a:solidFill>
+                          <a:latin typeface="Calibri"/>
+                        </a:defRPr>
+                      </a:lvl3pPr>
+                      <a:lvl4pPr marL="1371600" algn="l" defTabSz="914400" rtl="0" eaLnBrk="1" latinLnBrk="0" hangingPunct="1">
+                        <a:defRPr sz="1800" kern="1200">
+                          <a:solidFill>
+                            <a:schemeClr val="tx1"/>
+                          </a:solidFill>
+                          <a:latin typeface="Calibri"/>
+                        </a:defRPr>
+                      </a:lvl4pPr>
+                      <a:lvl5pPr marL="1828800" algn="l" defTabSz="914400" rtl="0" eaLnBrk="1" latinLnBrk="0" hangingPunct="1">
+                        <a:defRPr sz="1800" kern="1200">
+                          <a:solidFill>
+                            <a:schemeClr val="tx1"/>
+                          </a:solidFill>
+                          <a:latin typeface="Calibri"/>
+                        </a:defRPr>
+                      </a:lvl5pPr>
+                      <a:lvl6pPr marL="2286000" algn="l" defTabSz="914400" rtl="0" eaLnBrk="1" latinLnBrk="0" hangingPunct="1">
+                        <a:defRPr sz="1800" kern="1200">
+                          <a:solidFill>
+                            <a:schemeClr val="tx1"/>
+                          </a:solidFill>
+                          <a:latin typeface="Calibri"/>
+                        </a:defRPr>
+                      </a:lvl6pPr>
+                      <a:lvl7pPr marL="2743200" algn="l" defTabSz="914400" rtl="0" eaLnBrk="1" latinLnBrk="0" hangingPunct="1">
+                        <a:defRPr sz="1800" kern="1200">
+                          <a:solidFill>
+                            <a:schemeClr val="tx1"/>
+                          </a:solidFill>
+                          <a:latin typeface="Calibri"/>
+                        </a:defRPr>
+                      </a:lvl7pPr>
+                      <a:lvl8pPr marL="3200400" algn="l" defTabSz="914400" rtl="0" eaLnBrk="1" latinLnBrk="0" hangingPunct="1">
+                        <a:defRPr sz="1800" kern="1200">
+                          <a:solidFill>
+                            <a:schemeClr val="tx1"/>
+                          </a:solidFill>
+                          <a:latin typeface="Calibri"/>
+                        </a:defRPr>
+                      </a:lvl8pPr>
+                      <a:lvl9pPr marL="3657600" algn="l" defTabSz="914400" rtl="0" eaLnBrk="1" latinLnBrk="0" hangingPunct="1">
+                        <a:defRPr sz="1800" kern="1200">
+                          <a:solidFill>
+                            <a:schemeClr val="tx1"/>
+                          </a:solidFill>
+                          <a:latin typeface="Calibri"/>
+                        </a:defRPr>
+                      </a:lvl9pPr>
+                    </a:lstStyle>
+                    <a:p>
+                      <a:pPr algn="l" fontAlgn="b"/>
+                      <a:r>
+                        <a:rPr lang="en-US" sz="1400" b="1" i="0" u="none" strike="noStrike" kern="1200" dirty="0" smtClean="0">
+                          <a:solidFill>
+                            <a:schemeClr val="bg1"/>
+                          </a:solidFill>
+                          <a:effectLst/>
+                          <a:latin typeface="Calibri"/>
+                          <a:ea typeface="+mn-ea"/>
+                          <a:cs typeface="Consolas" panose="020B0609020204030204" pitchFamily="49" charset="0"/>
+                        </a:rPr>
+                        <a:t># of Sink Blocks in use</a:t>
+                      </a:r>
+                      <a:endParaRPr lang="en-US" sz="1400" b="1" i="0" u="none" strike="noStrike" dirty="0">
+                        <a:solidFill>
+                          <a:schemeClr val="bg1"/>
+                        </a:solidFill>
+                        <a:effectLst/>
+                        <a:latin typeface="+mn-lt"/>
+                        <a:cs typeface="Consolas" panose="020B0609020204030204" pitchFamily="49" charset="0"/>
+                      </a:endParaRPr>
+                    </a:p>
+                  </a:txBody>
+                  <a:tcPr marL="45720" marR="45720" anchor="b">
+                    <a:lnL w="12700" cap="flat" cmpd="sng" algn="ctr">
+                      <a:solidFill>
+                        <a:srgbClr val="FFFFFF"/>
+                      </a:solidFill>
+                      <a:prstDash val="solid"/>
+                      <a:round/>
+                      <a:headEnd type="none" w="med" len="med"/>
+                      <a:tailEnd type="none" w="med" len="med"/>
+                    </a:lnL>
+                    <a:lnR w="12700" cap="flat" cmpd="sng" algn="ctr">
+                      <a:solidFill>
+                        <a:srgbClr val="FFFFFF"/>
+                      </a:solidFill>
+                      <a:prstDash val="solid"/>
+                      <a:round/>
+                      <a:headEnd type="none" w="med" len="med"/>
+                      <a:tailEnd type="none" w="med" len="med"/>
+                    </a:lnR>
+                    <a:lnT w="12700" cap="flat" cmpd="sng" algn="ctr">
+                      <a:solidFill>
+                        <a:srgbClr val="FFFFFF"/>
+                      </a:solidFill>
+                      <a:prstDash val="solid"/>
+                      <a:round/>
+                      <a:headEnd type="none" w="med" len="med"/>
+                      <a:tailEnd type="none" w="med" len="med"/>
+                    </a:lnT>
+                    <a:lnB w="12700" cap="flat" cmpd="sng" algn="ctr">
+                      <a:solidFill>
+                        <a:srgbClr val="FFFFFF"/>
+                      </a:solidFill>
+                      <a:prstDash val="solid"/>
+                      <a:round/>
+                      <a:headEnd type="none" w="med" len="med"/>
+                      <a:tailEnd type="none" w="med" len="med"/>
+                    </a:lnB>
+                    <a:lnTlToBr w="12700" cmpd="sng">
+                      <a:noFill/>
+                      <a:prstDash val="solid"/>
+                    </a:lnTlToBr>
+                    <a:lnBlToTr w="12700" cmpd="sng">
+                      <a:noFill/>
+                      <a:prstDash val="solid"/>
+                    </a:lnBlToTr>
+                    <a:noFill/>
+                  </a:tcPr>
+                </a:tc>
+                <a:tc>
+                  <a:txBody>
+                    <a:bodyPr/>
+                    <a:lstStyle>
+                      <a:lvl1pPr marL="0" algn="l" defTabSz="914400" rtl="0" eaLnBrk="1" latinLnBrk="0" hangingPunct="1">
+                        <a:defRPr sz="1800" kern="1200">
+                          <a:solidFill>
+                            <a:schemeClr val="tx1"/>
+                          </a:solidFill>
+                          <a:latin typeface="Calibri"/>
+                        </a:defRPr>
+                      </a:lvl1pPr>
+                      <a:lvl2pPr marL="457200" algn="l" defTabSz="914400" rtl="0" eaLnBrk="1" latinLnBrk="0" hangingPunct="1">
+                        <a:defRPr sz="1800" kern="1200">
+                          <a:solidFill>
+                            <a:schemeClr val="tx1"/>
+                          </a:solidFill>
+                          <a:latin typeface="Calibri"/>
+                        </a:defRPr>
+                      </a:lvl2pPr>
+                      <a:lvl3pPr marL="914400" algn="l" defTabSz="914400" rtl="0" eaLnBrk="1" latinLnBrk="0" hangingPunct="1">
+                        <a:defRPr sz="1800" kern="1200">
+                          <a:solidFill>
+                            <a:schemeClr val="tx1"/>
+                          </a:solidFill>
+                          <a:latin typeface="Calibri"/>
+                        </a:defRPr>
+                      </a:lvl3pPr>
+                      <a:lvl4pPr marL="1371600" algn="l" defTabSz="914400" rtl="0" eaLnBrk="1" latinLnBrk="0" hangingPunct="1">
+                        <a:defRPr sz="1800" kern="1200">
+                          <a:solidFill>
+                            <a:schemeClr val="tx1"/>
+                          </a:solidFill>
+                          <a:latin typeface="Calibri"/>
+                        </a:defRPr>
+                      </a:lvl4pPr>
+                      <a:lvl5pPr marL="1828800" algn="l" defTabSz="914400" rtl="0" eaLnBrk="1" latinLnBrk="0" hangingPunct="1">
+                        <a:defRPr sz="1800" kern="1200">
+                          <a:solidFill>
+                            <a:schemeClr val="tx1"/>
+                          </a:solidFill>
+                          <a:latin typeface="Calibri"/>
+                        </a:defRPr>
+                      </a:lvl5pPr>
+                      <a:lvl6pPr marL="2286000" algn="l" defTabSz="914400" rtl="0" eaLnBrk="1" latinLnBrk="0" hangingPunct="1">
+                        <a:defRPr sz="1800" kern="1200">
+                          <a:solidFill>
+                            <a:schemeClr val="tx1"/>
+                          </a:solidFill>
+                          <a:latin typeface="Calibri"/>
+                        </a:defRPr>
+                      </a:lvl6pPr>
+                      <a:lvl7pPr marL="2743200" algn="l" defTabSz="914400" rtl="0" eaLnBrk="1" latinLnBrk="0" hangingPunct="1">
+                        <a:defRPr sz="1800" kern="1200">
+                          <a:solidFill>
+                            <a:schemeClr val="tx1"/>
+                          </a:solidFill>
+                          <a:latin typeface="Calibri"/>
+                        </a:defRPr>
+                      </a:lvl7pPr>
+                      <a:lvl8pPr marL="3200400" algn="l" defTabSz="914400" rtl="0" eaLnBrk="1" latinLnBrk="0" hangingPunct="1">
+                        <a:defRPr sz="1800" kern="1200">
+                          <a:solidFill>
+                            <a:schemeClr val="tx1"/>
+                          </a:solidFill>
+                          <a:latin typeface="Calibri"/>
+                        </a:defRPr>
+                      </a:lvl8pPr>
+                      <a:lvl9pPr marL="3657600" algn="l" defTabSz="914400" rtl="0" eaLnBrk="1" latinLnBrk="0" hangingPunct="1">
+                        <a:defRPr sz="1800" kern="1200">
+                          <a:solidFill>
+                            <a:schemeClr val="tx1"/>
+                          </a:solidFill>
+                          <a:latin typeface="Calibri"/>
+                        </a:defRPr>
+                      </a:lvl9pPr>
+                    </a:lstStyle>
+                    <a:p>
+                      <a:pPr algn="l" fontAlgn="b"/>
+                      <a:r>
+                        <a:rPr lang="ru-RU" sz="1400" b="0" i="0" u="none" strike="noStrike" dirty="0" smtClean="0">
+                          <a:solidFill>
+                            <a:schemeClr val="bg1"/>
+                          </a:solidFill>
+                          <a:effectLst/>
+                          <a:latin typeface="+mn-lt"/>
+                          <a:cs typeface="Consolas" panose="020B0609020204030204" pitchFamily="49" charset="0"/>
+                        </a:rPr>
+                        <a:t>Текущее вол-во объектов синхронизации</a:t>
+                      </a:r>
+                      <a:endParaRPr lang="en-US" sz="1400" b="0" i="0" u="none" strike="noStrike" dirty="0">
+                        <a:solidFill>
+                          <a:schemeClr val="bg1"/>
+                        </a:solidFill>
+                        <a:effectLst/>
+                        <a:latin typeface="+mn-lt"/>
+                        <a:cs typeface="Consolas" panose="020B0609020204030204" pitchFamily="49" charset="0"/>
+                      </a:endParaRPr>
+                    </a:p>
+                  </a:txBody>
+                  <a:tcPr marL="45720" marR="45720" anchor="b">
+                    <a:lnL w="12700" cap="flat" cmpd="sng" algn="ctr">
+                      <a:solidFill>
+                        <a:srgbClr val="FFFFFF"/>
+                      </a:solidFill>
+                      <a:prstDash val="solid"/>
+                      <a:round/>
+                      <a:headEnd type="none" w="med" len="med"/>
+                      <a:tailEnd type="none" w="med" len="med"/>
+                    </a:lnL>
+                    <a:lnR w="12700" cap="flat" cmpd="sng" algn="ctr">
+                      <a:solidFill>
+                        <a:srgbClr val="FFFFFF"/>
+                      </a:solidFill>
+                      <a:prstDash val="solid"/>
+                      <a:round/>
+                      <a:headEnd type="none" w="med" len="med"/>
+                      <a:tailEnd type="none" w="med" len="med"/>
+                    </a:lnR>
+                    <a:lnT w="12700" cap="flat" cmpd="sng" algn="ctr">
+                      <a:solidFill>
+                        <a:srgbClr val="FFFFFF"/>
+                      </a:solidFill>
+                      <a:prstDash val="solid"/>
+                      <a:round/>
+                      <a:headEnd type="none" w="med" len="med"/>
+                      <a:tailEnd type="none" w="med" len="med"/>
+                    </a:lnT>
+                    <a:lnB w="12700" cap="flat" cmpd="sng" algn="ctr">
+                      <a:solidFill>
+                        <a:srgbClr val="FFFFFF"/>
+                      </a:solidFill>
+                      <a:prstDash val="solid"/>
+                      <a:round/>
+                      <a:headEnd type="none" w="med" len="med"/>
+                      <a:tailEnd type="none" w="med" len="med"/>
+                    </a:lnB>
+                    <a:lnTlToBr w="12700" cmpd="sng">
+                      <a:noFill/>
+                      <a:prstDash val="solid"/>
+                    </a:lnTlToBr>
+                    <a:lnBlToTr w="12700" cmpd="sng">
+                      <a:noFill/>
+                      <a:prstDash val="solid"/>
+                    </a:lnBlToTr>
+                    <a:noFill/>
+                  </a:tcPr>
+                </a:tc>
+              </a:tr>
+              <a:tr h="0">
+                <a:tc>
+                  <a:txBody>
+                    <a:bodyPr/>
+                    <a:lstStyle>
+                      <a:lvl1pPr marL="0" algn="l" defTabSz="914400" rtl="0" eaLnBrk="1" latinLnBrk="0" hangingPunct="1">
+                        <a:defRPr sz="1800" kern="1200">
+                          <a:solidFill>
+                            <a:schemeClr val="tx1"/>
+                          </a:solidFill>
+                          <a:latin typeface="Calibri"/>
+                        </a:defRPr>
+                      </a:lvl1pPr>
+                      <a:lvl2pPr marL="457200" algn="l" defTabSz="914400" rtl="0" eaLnBrk="1" latinLnBrk="0" hangingPunct="1">
+                        <a:defRPr sz="1800" kern="1200">
+                          <a:solidFill>
+                            <a:schemeClr val="tx1"/>
+                          </a:solidFill>
+                          <a:latin typeface="Calibri"/>
+                        </a:defRPr>
+                      </a:lvl2pPr>
+                      <a:lvl3pPr marL="914400" algn="l" defTabSz="914400" rtl="0" eaLnBrk="1" latinLnBrk="0" hangingPunct="1">
+                        <a:defRPr sz="1800" kern="1200">
+                          <a:solidFill>
+                            <a:schemeClr val="tx1"/>
+                          </a:solidFill>
+                          <a:latin typeface="Calibri"/>
+                        </a:defRPr>
+                      </a:lvl3pPr>
+                      <a:lvl4pPr marL="1371600" algn="l" defTabSz="914400" rtl="0" eaLnBrk="1" latinLnBrk="0" hangingPunct="1">
+                        <a:defRPr sz="1800" kern="1200">
+                          <a:solidFill>
+                            <a:schemeClr val="tx1"/>
+                          </a:solidFill>
+                          <a:latin typeface="Calibri"/>
+                        </a:defRPr>
+                      </a:lvl4pPr>
+                      <a:lvl5pPr marL="1828800" algn="l" defTabSz="914400" rtl="0" eaLnBrk="1" latinLnBrk="0" hangingPunct="1">
+                        <a:defRPr sz="1800" kern="1200">
+                          <a:solidFill>
+                            <a:schemeClr val="tx1"/>
+                          </a:solidFill>
+                          <a:latin typeface="Calibri"/>
+                        </a:defRPr>
+                      </a:lvl5pPr>
+                      <a:lvl6pPr marL="2286000" algn="l" defTabSz="914400" rtl="0" eaLnBrk="1" latinLnBrk="0" hangingPunct="1">
+                        <a:defRPr sz="1800" kern="1200">
+                          <a:solidFill>
+                            <a:schemeClr val="tx1"/>
+                          </a:solidFill>
+                          <a:latin typeface="Calibri"/>
+                        </a:defRPr>
+                      </a:lvl6pPr>
+                      <a:lvl7pPr marL="2743200" algn="l" defTabSz="914400" rtl="0" eaLnBrk="1" latinLnBrk="0" hangingPunct="1">
+                        <a:defRPr sz="1800" kern="1200">
+                          <a:solidFill>
+                            <a:schemeClr val="tx1"/>
+                          </a:solidFill>
+                          <a:latin typeface="Calibri"/>
+                        </a:defRPr>
+                      </a:lvl7pPr>
+                      <a:lvl8pPr marL="3200400" algn="l" defTabSz="914400" rtl="0" eaLnBrk="1" latinLnBrk="0" hangingPunct="1">
+                        <a:defRPr sz="1800" kern="1200">
+                          <a:solidFill>
+                            <a:schemeClr val="tx1"/>
+                          </a:solidFill>
+                          <a:latin typeface="Calibri"/>
+                        </a:defRPr>
+                      </a:lvl8pPr>
+                      <a:lvl9pPr marL="3657600" algn="l" defTabSz="914400" rtl="0" eaLnBrk="1" latinLnBrk="0" hangingPunct="1">
+                        <a:defRPr sz="1800" kern="1200">
+                          <a:solidFill>
+                            <a:schemeClr val="tx1"/>
+                          </a:solidFill>
+                          <a:latin typeface="Calibri"/>
+                        </a:defRPr>
+                      </a:lvl9pPr>
+                    </a:lstStyle>
+                    <a:p>
+                      <a:pPr algn="l" fontAlgn="b"/>
+                      <a:r>
+                        <a:rPr lang="en-US" sz="1400" b="1" i="0" u="none" strike="noStrike" kern="1200" dirty="0" smtClean="0">
+                          <a:solidFill>
+                            <a:schemeClr val="bg1"/>
+                          </a:solidFill>
+                          <a:effectLst/>
+                          <a:latin typeface="Calibri"/>
+                          <a:ea typeface="+mn-ea"/>
+                          <a:cs typeface="Consolas" panose="020B0609020204030204" pitchFamily="49" charset="0"/>
+                        </a:rPr>
+                        <a:t>% Time in GC</a:t>
+                      </a:r>
+                      <a:endParaRPr lang="en-US" sz="1400" b="1" i="0" u="none" strike="noStrike" dirty="0">
+                        <a:solidFill>
+                          <a:schemeClr val="bg1"/>
+                        </a:solidFill>
+                        <a:effectLst/>
+                        <a:latin typeface="+mn-lt"/>
+                        <a:cs typeface="Consolas" panose="020B0609020204030204" pitchFamily="49" charset="0"/>
+                      </a:endParaRPr>
+                    </a:p>
+                  </a:txBody>
+                  <a:tcPr marL="45720" marR="45720" anchor="b">
+                    <a:lnL w="12700" cap="flat" cmpd="sng" algn="ctr">
+                      <a:solidFill>
+                        <a:srgbClr val="FFFFFF"/>
+                      </a:solidFill>
+                      <a:prstDash val="solid"/>
+                      <a:round/>
+                      <a:headEnd type="none" w="med" len="med"/>
+                      <a:tailEnd type="none" w="med" len="med"/>
+                    </a:lnL>
+                    <a:lnR w="12700" cap="flat" cmpd="sng" algn="ctr">
+                      <a:solidFill>
+                        <a:srgbClr val="FFFFFF"/>
+                      </a:solidFill>
+                      <a:prstDash val="solid"/>
+                      <a:round/>
+                      <a:headEnd type="none" w="med" len="med"/>
+                      <a:tailEnd type="none" w="med" len="med"/>
+                    </a:lnR>
+                    <a:lnT w="12700" cap="flat" cmpd="sng" algn="ctr">
+                      <a:solidFill>
+                        <a:srgbClr val="FFFFFF"/>
+                      </a:solidFill>
+                      <a:prstDash val="solid"/>
+                      <a:round/>
+                      <a:headEnd type="none" w="med" len="med"/>
+                      <a:tailEnd type="none" w="med" len="med"/>
+                    </a:lnT>
+                    <a:lnB w="12700" cap="flat" cmpd="sng" algn="ctr">
+                      <a:solidFill>
+                        <a:srgbClr val="FFFFFF"/>
+                      </a:solidFill>
+                      <a:prstDash val="solid"/>
+                      <a:round/>
+                      <a:headEnd type="none" w="med" len="med"/>
+                      <a:tailEnd type="none" w="med" len="med"/>
+                    </a:lnB>
+                    <a:lnTlToBr w="12700" cmpd="sng">
+                      <a:noFill/>
+                      <a:prstDash val="solid"/>
+                    </a:lnTlToBr>
+                    <a:lnBlToTr w="12700" cmpd="sng">
+                      <a:noFill/>
+                      <a:prstDash val="solid"/>
+                    </a:lnBlToTr>
+                    <a:noFill/>
+                  </a:tcPr>
+                </a:tc>
+                <a:tc>
+                  <a:txBody>
+                    <a:bodyPr/>
+                    <a:lstStyle>
+                      <a:lvl1pPr marL="0" algn="l" defTabSz="914400" rtl="0" eaLnBrk="1" latinLnBrk="0" hangingPunct="1">
+                        <a:defRPr sz="1800" kern="1200">
+                          <a:solidFill>
+                            <a:schemeClr val="tx1"/>
+                          </a:solidFill>
+                          <a:latin typeface="Calibri"/>
+                        </a:defRPr>
+                      </a:lvl1pPr>
+                      <a:lvl2pPr marL="457200" algn="l" defTabSz="914400" rtl="0" eaLnBrk="1" latinLnBrk="0" hangingPunct="1">
+                        <a:defRPr sz="1800" kern="1200">
+                          <a:solidFill>
+                            <a:schemeClr val="tx1"/>
+                          </a:solidFill>
+                          <a:latin typeface="Calibri"/>
+                        </a:defRPr>
+                      </a:lvl2pPr>
+                      <a:lvl3pPr marL="914400" algn="l" defTabSz="914400" rtl="0" eaLnBrk="1" latinLnBrk="0" hangingPunct="1">
+                        <a:defRPr sz="1800" kern="1200">
+                          <a:solidFill>
+                            <a:schemeClr val="tx1"/>
+                          </a:solidFill>
+                          <a:latin typeface="Calibri"/>
+                        </a:defRPr>
+                      </a:lvl3pPr>
+                      <a:lvl4pPr marL="1371600" algn="l" defTabSz="914400" rtl="0" eaLnBrk="1" latinLnBrk="0" hangingPunct="1">
+                        <a:defRPr sz="1800" kern="1200">
+                          <a:solidFill>
+                            <a:schemeClr val="tx1"/>
+                          </a:solidFill>
+                          <a:latin typeface="Calibri"/>
+                        </a:defRPr>
+                      </a:lvl4pPr>
+                      <a:lvl5pPr marL="1828800" algn="l" defTabSz="914400" rtl="0" eaLnBrk="1" latinLnBrk="0" hangingPunct="1">
+                        <a:defRPr sz="1800" kern="1200">
+                          <a:solidFill>
+                            <a:schemeClr val="tx1"/>
+                          </a:solidFill>
+                          <a:latin typeface="Calibri"/>
+                        </a:defRPr>
+                      </a:lvl5pPr>
+                      <a:lvl6pPr marL="2286000" algn="l" defTabSz="914400" rtl="0" eaLnBrk="1" latinLnBrk="0" hangingPunct="1">
+                        <a:defRPr sz="1800" kern="1200">
+                          <a:solidFill>
+                            <a:schemeClr val="tx1"/>
+                          </a:solidFill>
+                          <a:latin typeface="Calibri"/>
+                        </a:defRPr>
+                      </a:lvl6pPr>
+                      <a:lvl7pPr marL="2743200" algn="l" defTabSz="914400" rtl="0" eaLnBrk="1" latinLnBrk="0" hangingPunct="1">
+                        <a:defRPr sz="1800" kern="1200">
+                          <a:solidFill>
+                            <a:schemeClr val="tx1"/>
+                          </a:solidFill>
+                          <a:latin typeface="Calibri"/>
+                        </a:defRPr>
+                      </a:lvl7pPr>
+                      <a:lvl8pPr marL="3200400" algn="l" defTabSz="914400" rtl="0" eaLnBrk="1" latinLnBrk="0" hangingPunct="1">
+                        <a:defRPr sz="1800" kern="1200">
+                          <a:solidFill>
+                            <a:schemeClr val="tx1"/>
+                          </a:solidFill>
+                          <a:latin typeface="Calibri"/>
+                        </a:defRPr>
+                      </a:lvl8pPr>
+                      <a:lvl9pPr marL="3657600" algn="l" defTabSz="914400" rtl="0" eaLnBrk="1" latinLnBrk="0" hangingPunct="1">
+                        <a:defRPr sz="1800" kern="1200">
+                          <a:solidFill>
+                            <a:schemeClr val="tx1"/>
+                          </a:solidFill>
+                          <a:latin typeface="Calibri"/>
+                        </a:defRPr>
+                      </a:lvl9pPr>
+                    </a:lstStyle>
+                    <a:p>
+                      <a:pPr algn="l" fontAlgn="b"/>
+                      <a:r>
+                        <a:rPr lang="ru-RU" sz="1400" b="0" i="0" u="none" strike="noStrike" dirty="0" smtClean="0">
+                          <a:solidFill>
+                            <a:schemeClr val="bg1"/>
+                          </a:solidFill>
+                          <a:effectLst/>
+                          <a:latin typeface="+mn-lt"/>
+                          <a:cs typeface="Consolas" panose="020B0609020204030204" pitchFamily="49" charset="0"/>
+                        </a:rPr>
+                        <a:t>Сколько в % заняла последняя сборка мусора</a:t>
+                      </a:r>
+                      <a:endParaRPr lang="en-US" sz="1400" b="0" i="0" u="none" strike="noStrike" dirty="0">
+                        <a:solidFill>
+                          <a:schemeClr val="bg1"/>
+                        </a:solidFill>
+                        <a:effectLst/>
+                        <a:latin typeface="+mn-lt"/>
+                        <a:cs typeface="Consolas" panose="020B0609020204030204" pitchFamily="49" charset="0"/>
+                      </a:endParaRPr>
+                    </a:p>
+                  </a:txBody>
+                  <a:tcPr marL="45720" marR="45720" anchor="b">
+                    <a:lnL w="12700" cap="flat" cmpd="sng" algn="ctr">
+                      <a:solidFill>
+                        <a:srgbClr val="FFFFFF"/>
+                      </a:solidFill>
+                      <a:prstDash val="solid"/>
+                      <a:round/>
+                      <a:headEnd type="none" w="med" len="med"/>
+                      <a:tailEnd type="none" w="med" len="med"/>
+                    </a:lnL>
+                    <a:lnR w="12700" cap="flat" cmpd="sng" algn="ctr">
+                      <a:solidFill>
+                        <a:srgbClr val="FFFFFF"/>
+                      </a:solidFill>
+                      <a:prstDash val="solid"/>
+                      <a:round/>
+                      <a:headEnd type="none" w="med" len="med"/>
+                      <a:tailEnd type="none" w="med" len="med"/>
+                    </a:lnR>
+                    <a:lnT w="12700" cap="flat" cmpd="sng" algn="ctr">
+                      <a:solidFill>
+                        <a:srgbClr val="FFFFFF"/>
+                      </a:solidFill>
+                      <a:prstDash val="solid"/>
+                      <a:round/>
+                      <a:headEnd type="none" w="med" len="med"/>
+                      <a:tailEnd type="none" w="med" len="med"/>
+                    </a:lnT>
+                    <a:lnB w="12700" cap="flat" cmpd="sng" algn="ctr">
+                      <a:solidFill>
+                        <a:srgbClr val="FFFFFF"/>
+                      </a:solidFill>
+                      <a:prstDash val="solid"/>
+                      <a:round/>
+                      <a:headEnd type="none" w="med" len="med"/>
+                      <a:tailEnd type="none" w="med" len="med"/>
+                    </a:lnB>
+                    <a:lnTlToBr w="12700" cmpd="sng">
+                      <a:noFill/>
+                      <a:prstDash val="solid"/>
+                    </a:lnTlToBr>
+                    <a:lnBlToTr w="12700" cmpd="sng">
+                      <a:noFill/>
+                      <a:prstDash val="solid"/>
+                    </a:lnBlToTr>
+                    <a:noFill/>
+                  </a:tcPr>
+                </a:tc>
+              </a:tr>
+              <a:tr h="0">
+                <a:tc>
+                  <a:txBody>
+                    <a:bodyPr/>
+                    <a:lstStyle/>
+                    <a:p>
+                      <a:pPr algn="l" fontAlgn="b"/>
+                      <a:r>
+                        <a:rPr lang="en-US" sz="1400" b="1" i="0" u="none" strike="noStrike" dirty="0" smtClean="0">
+                          <a:solidFill>
+                            <a:schemeClr val="bg1"/>
+                          </a:solidFill>
+                          <a:effectLst/>
+                          <a:latin typeface="+mn-lt"/>
+                          <a:cs typeface="Consolas" panose="020B0609020204030204" pitchFamily="49" charset="0"/>
+                        </a:rPr>
+                        <a:t>Allocated Bytes/sec</a:t>
+                      </a:r>
+                      <a:endParaRPr lang="en-US" sz="1400" b="1" i="0" u="none" strike="noStrike" dirty="0">
+                        <a:solidFill>
+                          <a:schemeClr val="bg1"/>
+                        </a:solidFill>
+                        <a:effectLst/>
+                        <a:latin typeface="+mn-lt"/>
+                        <a:cs typeface="Consolas" panose="020B0609020204030204" pitchFamily="49" charset="0"/>
+                      </a:endParaRPr>
+                    </a:p>
+                  </a:txBody>
+                  <a:tcPr marL="45720" marR="45720" anchor="b">
+                    <a:lnL w="12700" cap="flat" cmpd="sng" algn="ctr">
+                      <a:solidFill>
+                        <a:srgbClr val="FFFFFF"/>
+                      </a:solidFill>
+                      <a:prstDash val="solid"/>
+                      <a:round/>
+                      <a:headEnd type="none" w="med" len="med"/>
+                      <a:tailEnd type="none" w="med" len="med"/>
+                    </a:lnL>
+                    <a:lnR w="12700" cap="flat" cmpd="sng" algn="ctr">
+                      <a:solidFill>
+                        <a:srgbClr val="FFFFFF"/>
+                      </a:solidFill>
+                      <a:prstDash val="solid"/>
+                      <a:round/>
+                      <a:headEnd type="none" w="med" len="med"/>
+                      <a:tailEnd type="none" w="med" len="med"/>
+                    </a:lnR>
+                    <a:lnT w="12700" cap="flat" cmpd="sng" algn="ctr">
+                      <a:solidFill>
+                        <a:srgbClr val="FFFFFF"/>
+                      </a:solidFill>
+                      <a:prstDash val="solid"/>
+                      <a:round/>
+                      <a:headEnd type="none" w="med" len="med"/>
+                      <a:tailEnd type="none" w="med" len="med"/>
+                    </a:lnT>
+                    <a:lnB w="12700" cap="flat" cmpd="sng" algn="ctr">
+                      <a:solidFill>
+                        <a:srgbClr val="FFFFFF"/>
+                      </a:solidFill>
+                      <a:prstDash val="solid"/>
+                      <a:round/>
+                      <a:headEnd type="none" w="med" len="med"/>
+                      <a:tailEnd type="none" w="med" len="med"/>
+                    </a:lnB>
+                    <a:lnTlToBr w="12700" cmpd="sng">
+                      <a:noFill/>
+                      <a:prstDash val="solid"/>
+                    </a:lnTlToBr>
+                    <a:lnBlToTr w="12700" cmpd="sng">
+                      <a:noFill/>
+                      <a:prstDash val="solid"/>
+                    </a:lnBlToTr>
+                    <a:noFill/>
+                  </a:tcPr>
+                </a:tc>
+                <a:tc>
+                  <a:txBody>
+                    <a:bodyPr/>
+                    <a:lstStyle/>
+                    <a:p>
+                      <a:pPr algn="l" fontAlgn="b"/>
+                      <a:r>
+                        <a:rPr lang="ru-RU" sz="1400" b="0" i="0" u="none" strike="noStrike" dirty="0" smtClean="0">
+                          <a:solidFill>
+                            <a:schemeClr val="bg1"/>
+                          </a:solidFill>
+                          <a:effectLst/>
+                          <a:latin typeface="+mn-lt"/>
+                          <a:cs typeface="Consolas" panose="020B0609020204030204" pitchFamily="49" charset="0"/>
+                        </a:rPr>
+                        <a:t>Скорость выделения</a:t>
+                      </a:r>
+                      <a:r>
+                        <a:rPr lang="ru-RU" sz="1400" b="0" i="0" u="none" strike="noStrike" baseline="0" dirty="0" smtClean="0">
+                          <a:solidFill>
+                            <a:schemeClr val="bg1"/>
+                          </a:solidFill>
+                          <a:effectLst/>
+                          <a:latin typeface="+mn-lt"/>
+                          <a:cs typeface="Consolas" panose="020B0609020204030204" pitchFamily="49" charset="0"/>
+                        </a:rPr>
+                        <a:t> Два последних значения / интервал</a:t>
+                      </a:r>
+                      <a:endParaRPr lang="en-US" sz="1400" b="0" i="0" u="none" strike="noStrike" dirty="0">
+                        <a:solidFill>
+                          <a:schemeClr val="bg1"/>
+                        </a:solidFill>
+                        <a:effectLst/>
+                        <a:latin typeface="+mn-lt"/>
+                        <a:cs typeface="Consolas" panose="020B0609020204030204" pitchFamily="49" charset="0"/>
+                      </a:endParaRPr>
+                    </a:p>
+                  </a:txBody>
+                  <a:tcPr marL="45720" marR="45720" anchor="b">
+                    <a:lnL w="12700" cap="flat" cmpd="sng" algn="ctr">
+                      <a:solidFill>
+                        <a:srgbClr val="FFFFFF"/>
+                      </a:solidFill>
+                      <a:prstDash val="solid"/>
+                      <a:round/>
+                      <a:headEnd type="none" w="med" len="med"/>
+                      <a:tailEnd type="none" w="med" len="med"/>
+                    </a:lnL>
+                    <a:lnR w="12700" cap="flat" cmpd="sng" algn="ctr">
+                      <a:solidFill>
+                        <a:srgbClr val="FFFFFF"/>
+                      </a:solidFill>
+                      <a:prstDash val="solid"/>
+                      <a:round/>
+                      <a:headEnd type="none" w="med" len="med"/>
+                      <a:tailEnd type="none" w="med" len="med"/>
+                    </a:lnR>
+                    <a:lnT w="12700" cap="flat" cmpd="sng" algn="ctr">
+                      <a:solidFill>
+                        <a:srgbClr val="FFFFFF"/>
+                      </a:solidFill>
+                      <a:prstDash val="solid"/>
+                      <a:round/>
+                      <a:headEnd type="none" w="med" len="med"/>
+                      <a:tailEnd type="none" w="med" len="med"/>
+                    </a:lnT>
+                    <a:lnB w="12700" cap="flat" cmpd="sng" algn="ctr">
+                      <a:solidFill>
+                        <a:srgbClr val="FFFFFF"/>
+                      </a:solidFill>
+                      <a:prstDash val="solid"/>
+                      <a:round/>
+                      <a:headEnd type="none" w="med" len="med"/>
+                      <a:tailEnd type="none" w="med" len="med"/>
+                    </a:lnB>
+                    <a:lnTlToBr w="12700" cmpd="sng">
+                      <a:noFill/>
+                      <a:prstDash val="solid"/>
+                    </a:lnTlToBr>
+                    <a:lnBlToTr w="12700" cmpd="sng">
+                      <a:noFill/>
+                      <a:prstDash val="solid"/>
+                    </a:lnBlToTr>
+                    <a:noFill/>
+                  </a:tcPr>
+                </a:tc>
+              </a:tr>
+              <a:tr h="0">
+                <a:tc>
+                  <a:txBody>
+                    <a:bodyPr/>
+                    <a:lstStyle/>
+                    <a:p>
+                      <a:pPr algn="l" fontAlgn="b"/>
+                      <a:r>
+                        <a:rPr lang="en-US" sz="1400" b="1" i="0" u="none" strike="noStrike" dirty="0" smtClean="0">
+                          <a:solidFill>
+                            <a:schemeClr val="bg1"/>
+                          </a:solidFill>
+                          <a:effectLst/>
+                          <a:latin typeface="+mn-lt"/>
+                          <a:cs typeface="Consolas" panose="020B0609020204030204" pitchFamily="49" charset="0"/>
+                        </a:rPr>
+                        <a:t>Finalization Survivors</a:t>
+                      </a:r>
+                      <a:endParaRPr lang="en-US" sz="1400" b="1" i="0" u="none" strike="noStrike" dirty="0">
+                        <a:solidFill>
+                          <a:schemeClr val="bg1"/>
+                        </a:solidFill>
+                        <a:effectLst/>
+                        <a:latin typeface="+mn-lt"/>
+                        <a:cs typeface="Consolas" panose="020B0609020204030204" pitchFamily="49" charset="0"/>
+                      </a:endParaRPr>
+                    </a:p>
+                  </a:txBody>
+                  <a:tcPr marL="45720" marR="45720" anchor="b">
+                    <a:lnL w="12700" cap="flat" cmpd="sng" algn="ctr">
+                      <a:solidFill>
+                        <a:srgbClr val="FFFFFF"/>
+                      </a:solidFill>
+                      <a:prstDash val="solid"/>
+                      <a:round/>
+                      <a:headEnd type="none" w="med" len="med"/>
+                      <a:tailEnd type="none" w="med" len="med"/>
+                    </a:lnL>
+                    <a:lnR w="12700" cap="flat" cmpd="sng" algn="ctr">
+                      <a:solidFill>
+                        <a:srgbClr val="FFFFFF"/>
+                      </a:solidFill>
+                      <a:prstDash val="solid"/>
+                      <a:round/>
+                      <a:headEnd type="none" w="med" len="med"/>
+                      <a:tailEnd type="none" w="med" len="med"/>
+                    </a:lnR>
+                    <a:lnT w="12700" cap="flat" cmpd="sng" algn="ctr">
+                      <a:solidFill>
+                        <a:srgbClr val="FFFFFF"/>
+                      </a:solidFill>
+                      <a:prstDash val="solid"/>
+                      <a:round/>
+                      <a:headEnd type="none" w="med" len="med"/>
+                      <a:tailEnd type="none" w="med" len="med"/>
+                    </a:lnT>
+                    <a:lnB w="12700" cap="flat" cmpd="sng" algn="ctr">
+                      <a:solidFill>
+                        <a:srgbClr val="FFFFFF"/>
+                      </a:solidFill>
+                      <a:prstDash val="solid"/>
+                      <a:round/>
+                      <a:headEnd type="none" w="med" len="med"/>
+                      <a:tailEnd type="none" w="med" len="med"/>
+                    </a:lnB>
+                    <a:lnTlToBr w="12700" cmpd="sng">
+                      <a:noFill/>
+                      <a:prstDash val="solid"/>
+                    </a:lnTlToBr>
+                    <a:lnBlToTr w="12700" cmpd="sng">
+                      <a:noFill/>
+                      <a:prstDash val="solid"/>
+                    </a:lnBlToTr>
+                    <a:noFill/>
+                  </a:tcPr>
+                </a:tc>
+                <a:tc>
+                  <a:txBody>
+                    <a:bodyPr/>
+                    <a:lstStyle/>
+                    <a:p>
+                      <a:pPr algn="l" fontAlgn="b"/>
+                      <a:r>
+                        <a:rPr lang="ru-RU" sz="1400" b="0" i="0" u="none" strike="noStrike" dirty="0" smtClean="0">
+                          <a:solidFill>
+                            <a:schemeClr val="bg1"/>
+                          </a:solidFill>
+                          <a:effectLst/>
+                          <a:latin typeface="+mn-lt"/>
+                          <a:cs typeface="Consolas" panose="020B0609020204030204" pitchFamily="49" charset="0"/>
+                        </a:rPr>
+                        <a:t>Сколько объектов не были удалены т.к. нужно вызывать </a:t>
+                      </a:r>
+                      <a:r>
+                        <a:rPr lang="en-US" sz="1400" b="0" i="0" u="none" strike="noStrike" dirty="0" smtClean="0">
+                          <a:solidFill>
+                            <a:schemeClr val="bg1"/>
+                          </a:solidFill>
+                          <a:effectLst/>
+                          <a:latin typeface="+mn-lt"/>
+                          <a:cs typeface="Consolas" panose="020B0609020204030204" pitchFamily="49" charset="0"/>
+                        </a:rPr>
+                        <a:t>~Fin</a:t>
+                      </a:r>
+                      <a:endParaRPr lang="en-US" sz="1400" b="0" i="0" u="none" strike="noStrike" dirty="0">
+                        <a:solidFill>
+                          <a:schemeClr val="bg1"/>
+                        </a:solidFill>
+                        <a:effectLst/>
+                        <a:latin typeface="+mn-lt"/>
+                        <a:cs typeface="Consolas" panose="020B0609020204030204" pitchFamily="49" charset="0"/>
+                      </a:endParaRPr>
+                    </a:p>
+                  </a:txBody>
+                  <a:tcPr marL="45720" marR="45720" anchor="b">
+                    <a:lnL w="12700" cap="flat" cmpd="sng" algn="ctr">
+                      <a:solidFill>
+                        <a:srgbClr val="FFFFFF"/>
+                      </a:solidFill>
+                      <a:prstDash val="solid"/>
+                      <a:round/>
+                      <a:headEnd type="none" w="med" len="med"/>
+                      <a:tailEnd type="none" w="med" len="med"/>
+                    </a:lnL>
+                    <a:lnR w="12700" cap="flat" cmpd="sng" algn="ctr">
+                      <a:solidFill>
+                        <a:srgbClr val="FFFFFF"/>
+                      </a:solidFill>
+                      <a:prstDash val="solid"/>
+                      <a:round/>
+                      <a:headEnd type="none" w="med" len="med"/>
+                      <a:tailEnd type="none" w="med" len="med"/>
+                    </a:lnR>
+                    <a:lnT w="12700" cap="flat" cmpd="sng" algn="ctr">
+                      <a:solidFill>
+                        <a:srgbClr val="FFFFFF"/>
+                      </a:solidFill>
+                      <a:prstDash val="solid"/>
+                      <a:round/>
+                      <a:headEnd type="none" w="med" len="med"/>
+                      <a:tailEnd type="none" w="med" len="med"/>
+                    </a:lnT>
+                    <a:lnB w="12700" cap="flat" cmpd="sng" algn="ctr">
+                      <a:solidFill>
+                        <a:srgbClr val="FFFFFF"/>
+                      </a:solidFill>
+                      <a:prstDash val="solid"/>
+                      <a:round/>
+                      <a:headEnd type="none" w="med" len="med"/>
+                      <a:tailEnd type="none" w="med" len="med"/>
+                    </a:lnB>
+                    <a:lnTlToBr w="12700" cmpd="sng">
+                      <a:noFill/>
+                      <a:prstDash val="solid"/>
+                    </a:lnTlToBr>
+                    <a:lnBlToTr w="12700" cmpd="sng">
+                      <a:noFill/>
+                      <a:prstDash val="solid"/>
+                    </a:lnBlToTr>
+                    <a:noFill/>
+                  </a:tcPr>
+                </a:tc>
+              </a:tr>
+              <a:tr h="0">
+                <a:tc>
+                  <a:txBody>
+                    <a:bodyPr/>
+                    <a:lstStyle/>
+                    <a:p>
+                      <a:pPr algn="l" fontAlgn="b"/>
+                      <a:r>
+                        <a:rPr lang="en-US" sz="1400" b="1" i="0" u="none" strike="noStrike" dirty="0" smtClean="0">
+                          <a:solidFill>
+                            <a:schemeClr val="bg1"/>
+                          </a:solidFill>
+                          <a:effectLst/>
+                          <a:latin typeface="+mn-lt"/>
+                          <a:cs typeface="Consolas" panose="020B0609020204030204" pitchFamily="49" charset="0"/>
+                        </a:rPr>
+                        <a:t>Gen 0,1 Promoted Bytes/Sec</a:t>
+                      </a:r>
+                      <a:endParaRPr lang="en-US" sz="1400" b="1" i="0" u="none" strike="noStrike" dirty="0">
+                        <a:solidFill>
+                          <a:schemeClr val="bg1"/>
+                        </a:solidFill>
+                        <a:effectLst/>
+                        <a:latin typeface="+mn-lt"/>
+                        <a:cs typeface="Consolas" panose="020B0609020204030204" pitchFamily="49" charset="0"/>
+                      </a:endParaRPr>
+                    </a:p>
+                  </a:txBody>
+                  <a:tcPr marL="45720" marR="45720" anchor="b">
+                    <a:lnL w="12700" cap="flat" cmpd="sng" algn="ctr">
+                      <a:solidFill>
+                        <a:srgbClr val="FFFFFF"/>
+                      </a:solidFill>
+                      <a:prstDash val="solid"/>
+                      <a:round/>
+                      <a:headEnd type="none" w="med" len="med"/>
+                      <a:tailEnd type="none" w="med" len="med"/>
+                    </a:lnL>
+                    <a:lnR w="12700" cap="flat" cmpd="sng" algn="ctr">
+                      <a:solidFill>
+                        <a:srgbClr val="FFFFFF"/>
+                      </a:solidFill>
+                      <a:prstDash val="solid"/>
+                      <a:round/>
+                      <a:headEnd type="none" w="med" len="med"/>
+                      <a:tailEnd type="none" w="med" len="med"/>
+                    </a:lnR>
+                    <a:lnT w="12700" cap="flat" cmpd="sng" algn="ctr">
+                      <a:solidFill>
+                        <a:srgbClr val="FFFFFF"/>
+                      </a:solidFill>
+                      <a:prstDash val="solid"/>
+                      <a:round/>
+                      <a:headEnd type="none" w="med" len="med"/>
+                      <a:tailEnd type="none" w="med" len="med"/>
+                    </a:lnT>
+                    <a:lnB w="12700" cap="flat" cmpd="sng" algn="ctr">
+                      <a:solidFill>
+                        <a:srgbClr val="FFFFFF"/>
+                      </a:solidFill>
+                      <a:prstDash val="solid"/>
+                      <a:round/>
+                      <a:headEnd type="none" w="med" len="med"/>
+                      <a:tailEnd type="none" w="med" len="med"/>
+                    </a:lnB>
+                    <a:lnTlToBr w="12700" cmpd="sng">
+                      <a:noFill/>
+                      <a:prstDash val="solid"/>
+                    </a:lnTlToBr>
+                    <a:lnBlToTr w="12700" cmpd="sng">
+                      <a:noFill/>
+                      <a:prstDash val="solid"/>
+                    </a:lnBlToTr>
+                    <a:noFill/>
+                  </a:tcPr>
+                </a:tc>
+                <a:tc>
+                  <a:txBody>
+                    <a:bodyPr/>
+                    <a:lstStyle/>
+                    <a:p>
+                      <a:pPr algn="l" fontAlgn="b"/>
+                      <a:r>
+                        <a:rPr lang="ru-RU" sz="1400" b="0" i="0" u="none" strike="noStrike" dirty="0" smtClean="0">
+                          <a:solidFill>
+                            <a:schemeClr val="bg1"/>
+                          </a:solidFill>
+                          <a:effectLst/>
+                          <a:latin typeface="+mn-lt"/>
+                          <a:cs typeface="Consolas" panose="020B0609020204030204" pitchFamily="49" charset="0"/>
+                        </a:rPr>
+                        <a:t>Сколько байт/сек</a:t>
+                      </a:r>
+                      <a:r>
+                        <a:rPr lang="ru-RU" sz="1400" b="0" i="0" u="none" strike="noStrike" baseline="0" dirty="0" smtClean="0">
+                          <a:solidFill>
+                            <a:schemeClr val="bg1"/>
+                          </a:solidFill>
+                          <a:effectLst/>
+                          <a:latin typeface="+mn-lt"/>
+                          <a:cs typeface="Consolas" panose="020B0609020204030204" pitchFamily="49" charset="0"/>
+                        </a:rPr>
+                        <a:t> меняет поколение</a:t>
+                      </a:r>
+                      <a:endParaRPr lang="en-US" sz="1400" b="0" i="0" u="none" strike="noStrike" dirty="0">
+                        <a:solidFill>
+                          <a:schemeClr val="bg1"/>
+                        </a:solidFill>
+                        <a:effectLst/>
+                        <a:latin typeface="+mn-lt"/>
+                        <a:cs typeface="Consolas" panose="020B0609020204030204" pitchFamily="49" charset="0"/>
+                      </a:endParaRPr>
+                    </a:p>
+                  </a:txBody>
+                  <a:tcPr marL="45720" marR="45720" anchor="b">
+                    <a:lnL w="12700" cap="flat" cmpd="sng" algn="ctr">
+                      <a:solidFill>
+                        <a:srgbClr val="FFFFFF"/>
+                      </a:solidFill>
+                      <a:prstDash val="solid"/>
+                      <a:round/>
+                      <a:headEnd type="none" w="med" len="med"/>
+                      <a:tailEnd type="none" w="med" len="med"/>
+                    </a:lnL>
+                    <a:lnR w="12700" cap="flat" cmpd="sng" algn="ctr">
+                      <a:solidFill>
+                        <a:srgbClr val="FFFFFF"/>
+                      </a:solidFill>
+                      <a:prstDash val="solid"/>
+                      <a:round/>
+                      <a:headEnd type="none" w="med" len="med"/>
+                      <a:tailEnd type="none" w="med" len="med"/>
+                    </a:lnR>
+                    <a:lnT w="12700" cap="flat" cmpd="sng" algn="ctr">
+                      <a:solidFill>
+                        <a:srgbClr val="FFFFFF"/>
+                      </a:solidFill>
+                      <a:prstDash val="solid"/>
+                      <a:round/>
+                      <a:headEnd type="none" w="med" len="med"/>
+                      <a:tailEnd type="none" w="med" len="med"/>
+                    </a:lnT>
+                    <a:lnB w="12700" cap="flat" cmpd="sng" algn="ctr">
+                      <a:solidFill>
+                        <a:srgbClr val="FFFFFF"/>
+                      </a:solidFill>
+                      <a:prstDash val="solid"/>
+                      <a:round/>
+                      <a:headEnd type="none" w="med" len="med"/>
+                      <a:tailEnd type="none" w="med" len="med"/>
+                    </a:lnB>
+                    <a:lnTlToBr w="12700" cmpd="sng">
+                      <a:noFill/>
+                      <a:prstDash val="solid"/>
+                    </a:lnTlToBr>
+                    <a:lnBlToTr w="12700" cmpd="sng">
+                      <a:noFill/>
+                      <a:prstDash val="solid"/>
+                    </a:lnBlToTr>
+                    <a:noFill/>
+                  </a:tcPr>
+                </a:tc>
+              </a:tr>
+              <a:tr h="0">
+                <a:tc>
+                  <a:txBody>
+                    <a:bodyPr/>
+                    <a:lstStyle/>
+                    <a:p>
+                      <a:pPr algn="l" fontAlgn="b"/>
+                      <a:r>
+                        <a:rPr lang="en-US" sz="1400" b="1" i="0" u="none" strike="noStrike" dirty="0" smtClean="0">
+                          <a:solidFill>
+                            <a:schemeClr val="bg1"/>
+                          </a:solidFill>
+                          <a:effectLst/>
+                          <a:latin typeface="+mn-lt"/>
+                          <a:cs typeface="Consolas" panose="020B0609020204030204" pitchFamily="49" charset="0"/>
+                        </a:rPr>
+                        <a:t>Gen 0</a:t>
+                      </a:r>
+                      <a:endParaRPr lang="en-US" sz="1400" b="1" i="0" u="none" strike="noStrike" dirty="0">
+                        <a:solidFill>
+                          <a:schemeClr val="bg1"/>
+                        </a:solidFill>
+                        <a:effectLst/>
+                        <a:latin typeface="+mn-lt"/>
+                        <a:cs typeface="Consolas" panose="020B0609020204030204" pitchFamily="49" charset="0"/>
+                      </a:endParaRPr>
+                    </a:p>
+                  </a:txBody>
+                  <a:tcPr marL="45720" marR="45720" anchor="b">
+                    <a:lnL w="12700" cap="flat" cmpd="sng" algn="ctr">
+                      <a:solidFill>
+                        <a:srgbClr val="FFFFFF"/>
+                      </a:solidFill>
+                      <a:prstDash val="solid"/>
+                      <a:round/>
+                      <a:headEnd type="none" w="med" len="med"/>
+                      <a:tailEnd type="none" w="med" len="med"/>
+                    </a:lnL>
+                    <a:lnR w="12700" cap="flat" cmpd="sng" algn="ctr">
+                      <a:solidFill>
+                        <a:srgbClr val="FFFFFF"/>
+                      </a:solidFill>
+                      <a:prstDash val="solid"/>
+                      <a:round/>
+                      <a:headEnd type="none" w="med" len="med"/>
+                      <a:tailEnd type="none" w="med" len="med"/>
+                    </a:lnR>
+                    <a:lnT w="12700" cap="flat" cmpd="sng" algn="ctr">
+                      <a:solidFill>
+                        <a:srgbClr val="FFFFFF"/>
+                      </a:solidFill>
+                      <a:prstDash val="solid"/>
+                      <a:round/>
+                      <a:headEnd type="none" w="med" len="med"/>
+                      <a:tailEnd type="none" w="med" len="med"/>
+                    </a:lnT>
+                    <a:lnB w="12700" cap="flat" cmpd="sng" algn="ctr">
+                      <a:solidFill>
+                        <a:srgbClr val="FFFFFF"/>
+                      </a:solidFill>
+                      <a:prstDash val="solid"/>
+                      <a:round/>
+                      <a:headEnd type="none" w="med" len="med"/>
+                      <a:tailEnd type="none" w="med" len="med"/>
+                    </a:lnB>
+                    <a:lnTlToBr w="12700" cmpd="sng">
+                      <a:noFill/>
+                      <a:prstDash val="solid"/>
+                    </a:lnTlToBr>
+                    <a:lnBlToTr w="12700" cmpd="sng">
+                      <a:noFill/>
+                      <a:prstDash val="solid"/>
+                    </a:lnBlToTr>
+                    <a:noFill/>
+                  </a:tcPr>
+                </a:tc>
+                <a:tc>
+                  <a:txBody>
+                    <a:bodyPr/>
+                    <a:lstStyle/>
+                    <a:p>
+                      <a:pPr algn="l" fontAlgn="b"/>
+                      <a:r>
+                        <a:rPr lang="ru-RU" sz="1400" b="0" i="0" u="none" strike="noStrike" dirty="0" smtClean="0">
+                          <a:solidFill>
+                            <a:schemeClr val="bg1"/>
+                          </a:solidFill>
+                          <a:effectLst/>
+                          <a:latin typeface="+mn-lt"/>
+                          <a:cs typeface="Consolas" panose="020B0609020204030204" pitchFamily="49" charset="0"/>
+                        </a:rPr>
+                        <a:t>Максимальный размер поколения</a:t>
+                      </a:r>
+                      <a:r>
+                        <a:rPr lang="en-US" sz="1400" b="0" i="0" u="none" strike="noStrike" baseline="0" dirty="0" smtClean="0">
+                          <a:solidFill>
+                            <a:schemeClr val="bg1"/>
+                          </a:solidFill>
+                          <a:effectLst/>
+                          <a:latin typeface="+mn-lt"/>
+                          <a:cs typeface="Consolas" panose="020B0609020204030204" pitchFamily="49" charset="0"/>
+                        </a:rPr>
+                        <a:t>-0</a:t>
+                      </a:r>
+                      <a:endParaRPr lang="en-US" sz="1400" b="0" i="0" u="none" strike="noStrike" dirty="0">
+                        <a:solidFill>
+                          <a:schemeClr val="bg1"/>
+                        </a:solidFill>
+                        <a:effectLst/>
+                        <a:latin typeface="+mn-lt"/>
+                        <a:cs typeface="Consolas" panose="020B0609020204030204" pitchFamily="49" charset="0"/>
+                      </a:endParaRPr>
+                    </a:p>
+                  </a:txBody>
+                  <a:tcPr marL="45720" marR="45720" anchor="b">
+                    <a:lnL w="12700" cap="flat" cmpd="sng" algn="ctr">
+                      <a:solidFill>
+                        <a:srgbClr val="FFFFFF"/>
+                      </a:solidFill>
+                      <a:prstDash val="solid"/>
+                      <a:round/>
+                      <a:headEnd type="none" w="med" len="med"/>
+                      <a:tailEnd type="none" w="med" len="med"/>
+                    </a:lnL>
+                    <a:lnR w="12700" cap="flat" cmpd="sng" algn="ctr">
+                      <a:solidFill>
+                        <a:srgbClr val="FFFFFF"/>
+                      </a:solidFill>
+                      <a:prstDash val="solid"/>
+                      <a:round/>
+                      <a:headEnd type="none" w="med" len="med"/>
+                      <a:tailEnd type="none" w="med" len="med"/>
+                    </a:lnR>
+                    <a:lnT w="12700" cap="flat" cmpd="sng" algn="ctr">
+                      <a:solidFill>
+                        <a:srgbClr val="FFFFFF"/>
+                      </a:solidFill>
+                      <a:prstDash val="solid"/>
+                      <a:round/>
+                      <a:headEnd type="none" w="med" len="med"/>
+                      <a:tailEnd type="none" w="med" len="med"/>
+                    </a:lnT>
+                    <a:lnB w="12700" cap="flat" cmpd="sng" algn="ctr">
+                      <a:solidFill>
+                        <a:srgbClr val="FFFFFF"/>
+                      </a:solidFill>
+                      <a:prstDash val="solid"/>
+                      <a:round/>
+                      <a:headEnd type="none" w="med" len="med"/>
+                      <a:tailEnd type="none" w="med" len="med"/>
+                    </a:lnB>
+                    <a:lnTlToBr w="12700" cmpd="sng">
+                      <a:noFill/>
+                      <a:prstDash val="solid"/>
+                    </a:lnTlToBr>
+                    <a:lnBlToTr w="12700" cmpd="sng">
+                      <a:noFill/>
+                      <a:prstDash val="solid"/>
+                    </a:lnBlToTr>
+                    <a:noFill/>
+                  </a:tcPr>
+                </a:tc>
+              </a:tr>
+              <a:tr h="0">
+                <a:tc>
+                  <a:txBody>
+                    <a:bodyPr/>
+                    <a:lstStyle/>
+                    <a:p>
+                      <a:pPr marL="0" marR="0" indent="0" algn="l" defTabSz="914400" rtl="0" eaLnBrk="1" fontAlgn="b" latinLnBrk="0" hangingPunct="1">
+                        <a:lnSpc>
+                          <a:spcPct val="100000"/>
+                        </a:lnSpc>
+                        <a:spcBef>
+                          <a:spcPts val="0"/>
+                        </a:spcBef>
+                        <a:spcAft>
+                          <a:spcPts val="0"/>
+                        </a:spcAft>
+                        <a:buClrTx/>
+                        <a:buSzTx/>
+                        <a:buFontTx/>
+                        <a:buNone/>
+                        <a:tabLst/>
+                        <a:defRPr/>
+                      </a:pPr>
+                      <a:r>
+                        <a:rPr lang="en-US" sz="1400" b="1" i="0" u="none" strike="noStrike" dirty="0" smtClean="0">
+                          <a:solidFill>
+                            <a:schemeClr val="bg1"/>
+                          </a:solidFill>
+                          <a:effectLst/>
+                          <a:latin typeface="+mn-lt"/>
+                          <a:cs typeface="Consolas" panose="020B0609020204030204" pitchFamily="49" charset="0"/>
+                        </a:rPr>
+                        <a:t>Gen 1,2 heap size</a:t>
+                      </a:r>
+                      <a:r>
+                        <a:rPr lang="ru-RU" sz="1400" b="1" i="0" u="none" strike="noStrike" dirty="0" smtClean="0">
+                          <a:solidFill>
+                            <a:schemeClr val="bg1"/>
+                          </a:solidFill>
+                          <a:effectLst/>
+                          <a:latin typeface="+mn-lt"/>
+                          <a:cs typeface="Consolas" panose="020B0609020204030204" pitchFamily="49" charset="0"/>
+                        </a:rPr>
+                        <a:t/>
+                      </a:r>
+                      <a:br>
+                        <a:rPr lang="ru-RU" sz="1400" b="1" i="0" u="none" strike="noStrike" dirty="0" smtClean="0">
+                          <a:solidFill>
+                            <a:schemeClr val="bg1"/>
+                          </a:solidFill>
+                          <a:effectLst/>
+                          <a:latin typeface="+mn-lt"/>
+                          <a:cs typeface="Consolas" panose="020B0609020204030204" pitchFamily="49" charset="0"/>
+                        </a:rPr>
+                      </a:br>
+                      <a:r>
+                        <a:rPr lang="en-US" sz="1400" b="1" i="0" u="none" strike="noStrike" dirty="0" smtClean="0">
+                          <a:solidFill>
+                            <a:schemeClr val="bg1"/>
+                          </a:solidFill>
+                          <a:effectLst/>
+                          <a:latin typeface="+mn-lt"/>
+                          <a:cs typeface="Consolas" panose="020B0609020204030204" pitchFamily="49" charset="0"/>
+                        </a:rPr>
+                        <a:t>Large Object Heap size</a:t>
+                      </a:r>
+                      <a:endParaRPr lang="en-US" sz="1400" b="1" i="0" u="none" strike="noStrike" dirty="0">
+                        <a:solidFill>
+                          <a:schemeClr val="bg1"/>
+                        </a:solidFill>
+                        <a:effectLst/>
+                        <a:latin typeface="+mn-lt"/>
+                        <a:cs typeface="Consolas" panose="020B0609020204030204" pitchFamily="49" charset="0"/>
+                      </a:endParaRPr>
+                    </a:p>
+                  </a:txBody>
+                  <a:tcPr marL="45720" marR="45720" anchor="b">
+                    <a:lnL w="12700" cap="flat" cmpd="sng" algn="ctr">
+                      <a:solidFill>
+                        <a:srgbClr val="FFFFFF"/>
+                      </a:solidFill>
+                      <a:prstDash val="solid"/>
+                      <a:round/>
+                      <a:headEnd type="none" w="med" len="med"/>
+                      <a:tailEnd type="none" w="med" len="med"/>
+                    </a:lnL>
+                    <a:lnR w="12700" cap="flat" cmpd="sng" algn="ctr">
+                      <a:solidFill>
+                        <a:srgbClr val="FFFFFF"/>
+                      </a:solidFill>
+                      <a:prstDash val="solid"/>
+                      <a:round/>
+                      <a:headEnd type="none" w="med" len="med"/>
+                      <a:tailEnd type="none" w="med" len="med"/>
+                    </a:lnR>
+                    <a:lnT w="12700" cap="flat" cmpd="sng" algn="ctr">
+                      <a:solidFill>
+                        <a:srgbClr val="FFFFFF"/>
+                      </a:solidFill>
+                      <a:prstDash val="solid"/>
+                      <a:round/>
+                      <a:headEnd type="none" w="med" len="med"/>
+                      <a:tailEnd type="none" w="med" len="med"/>
+                    </a:lnT>
+                    <a:lnB w="12700" cap="flat" cmpd="sng" algn="ctr">
+                      <a:solidFill>
+                        <a:srgbClr val="FFFFFF"/>
+                      </a:solidFill>
+                      <a:prstDash val="solid"/>
+                      <a:round/>
+                      <a:headEnd type="none" w="med" len="med"/>
+                      <a:tailEnd type="none" w="med" len="med"/>
+                    </a:lnB>
+                    <a:lnTlToBr w="12700" cmpd="sng">
+                      <a:noFill/>
+                      <a:prstDash val="solid"/>
+                    </a:lnTlToBr>
+                    <a:lnBlToTr w="12700" cmpd="sng">
+                      <a:noFill/>
+                      <a:prstDash val="solid"/>
+                    </a:lnBlToTr>
+                    <a:noFill/>
+                  </a:tcPr>
+                </a:tc>
+                <a:tc>
+                  <a:txBody>
+                    <a:bodyPr/>
+                    <a:lstStyle/>
+                    <a:p>
+                      <a:pPr algn="l" fontAlgn="b"/>
+                      <a:r>
+                        <a:rPr lang="ru-RU" sz="1400" b="0" i="0" u="none" strike="noStrike" dirty="0" smtClean="0">
+                          <a:solidFill>
+                            <a:schemeClr val="bg1"/>
+                          </a:solidFill>
+                          <a:effectLst/>
+                          <a:latin typeface="+mn-lt"/>
+                          <a:cs typeface="Consolas" panose="020B0609020204030204" pitchFamily="49" charset="0"/>
+                        </a:rPr>
+                        <a:t>Текущее</a:t>
+                      </a:r>
+                      <a:r>
+                        <a:rPr lang="ru-RU" sz="1400" b="0" i="0" u="none" strike="noStrike" baseline="0" dirty="0" smtClean="0">
+                          <a:solidFill>
+                            <a:schemeClr val="bg1"/>
+                          </a:solidFill>
+                          <a:effectLst/>
+                          <a:latin typeface="+mn-lt"/>
+                          <a:cs typeface="Consolas" panose="020B0609020204030204" pitchFamily="49" charset="0"/>
+                        </a:rPr>
+                        <a:t> кол-во байтов в поколениях 1</a:t>
+                      </a:r>
+                      <a:r>
+                        <a:rPr lang="en-US" sz="1400" b="0" i="0" u="none" strike="noStrike" baseline="0" dirty="0" smtClean="0">
+                          <a:solidFill>
+                            <a:schemeClr val="bg1"/>
+                          </a:solidFill>
+                          <a:effectLst/>
+                          <a:latin typeface="+mn-lt"/>
+                          <a:cs typeface="Consolas" panose="020B0609020204030204" pitchFamily="49" charset="0"/>
+                        </a:rPr>
+                        <a:t> </a:t>
+                      </a:r>
+                      <a:r>
+                        <a:rPr lang="ru-RU" sz="1400" b="0" i="0" u="none" strike="noStrike" baseline="0" dirty="0" smtClean="0">
+                          <a:solidFill>
+                            <a:schemeClr val="bg1"/>
+                          </a:solidFill>
+                          <a:effectLst/>
+                          <a:latin typeface="+mn-lt"/>
+                          <a:cs typeface="Consolas" panose="020B0609020204030204" pitchFamily="49" charset="0"/>
+                        </a:rPr>
+                        <a:t>и 2, а также </a:t>
+                      </a:r>
+                      <a:r>
+                        <a:rPr lang="en-US" sz="1400" b="0" i="0" u="none" strike="noStrike" baseline="0" dirty="0" smtClean="0">
+                          <a:solidFill>
+                            <a:schemeClr val="bg1"/>
+                          </a:solidFill>
+                          <a:effectLst/>
+                          <a:latin typeface="+mn-lt"/>
+                          <a:cs typeface="Consolas" panose="020B0609020204030204" pitchFamily="49" charset="0"/>
+                        </a:rPr>
+                        <a:t>LOH</a:t>
+                      </a:r>
+                      <a:endParaRPr lang="en-US" sz="1400" b="0" i="0" u="none" strike="noStrike" dirty="0">
+                        <a:solidFill>
+                          <a:schemeClr val="bg1"/>
+                        </a:solidFill>
+                        <a:effectLst/>
+                        <a:latin typeface="+mn-lt"/>
+                        <a:cs typeface="Consolas" panose="020B0609020204030204" pitchFamily="49" charset="0"/>
+                      </a:endParaRPr>
+                    </a:p>
+                  </a:txBody>
+                  <a:tcPr marL="45720" marR="45720" anchor="ctr">
+                    <a:lnL w="12700" cap="flat" cmpd="sng" algn="ctr">
+                      <a:solidFill>
+                        <a:srgbClr val="FFFFFF"/>
+                      </a:solidFill>
+                      <a:prstDash val="solid"/>
+                      <a:round/>
+                      <a:headEnd type="none" w="med" len="med"/>
+                      <a:tailEnd type="none" w="med" len="med"/>
+                    </a:lnL>
+                    <a:lnR w="12700" cap="flat" cmpd="sng" algn="ctr">
+                      <a:solidFill>
+                        <a:srgbClr val="FFFFFF"/>
+                      </a:solidFill>
+                      <a:prstDash val="solid"/>
+                      <a:round/>
+                      <a:headEnd type="none" w="med" len="med"/>
+                      <a:tailEnd type="none" w="med" len="med"/>
+                    </a:lnR>
+                    <a:lnT w="12700" cap="flat" cmpd="sng" algn="ctr">
+                      <a:solidFill>
+                        <a:srgbClr val="FFFFFF"/>
+                      </a:solidFill>
+                      <a:prstDash val="solid"/>
+                      <a:round/>
+                      <a:headEnd type="none" w="med" len="med"/>
+                      <a:tailEnd type="none" w="med" len="med"/>
+                    </a:lnT>
+                    <a:lnB w="12700" cap="flat" cmpd="sng" algn="ctr">
+                      <a:solidFill>
+                        <a:srgbClr val="FFFFFF"/>
+                      </a:solidFill>
+                      <a:prstDash val="solid"/>
+                      <a:round/>
+                      <a:headEnd type="none" w="med" len="med"/>
+                      <a:tailEnd type="none" w="med" len="med"/>
+                    </a:lnB>
+                    <a:lnTlToBr w="12700" cmpd="sng">
+                      <a:noFill/>
+                      <a:prstDash val="solid"/>
+                    </a:lnTlToBr>
+                    <a:lnBlToTr w="12700" cmpd="sng">
+                      <a:noFill/>
+                      <a:prstDash val="solid"/>
+                    </a:lnBlToTr>
+                    <a:noFill/>
+                  </a:tcPr>
+                </a:tc>
+              </a:tr>
+              <a:tr h="0">
+                <a:tc>
+                  <a:txBody>
+                    <a:bodyPr/>
+                    <a:lstStyle/>
+                    <a:p>
+                      <a:pPr algn="l" fontAlgn="b"/>
+                      <a:r>
+                        <a:rPr lang="en-US" sz="1400" b="1" i="0" u="none" strike="noStrike" dirty="0" smtClean="0">
+                          <a:solidFill>
+                            <a:schemeClr val="bg1"/>
+                          </a:solidFill>
+                          <a:effectLst/>
+                          <a:latin typeface="+mn-lt"/>
+                          <a:cs typeface="Consolas" panose="020B0609020204030204" pitchFamily="49" charset="0"/>
+                        </a:rPr>
+                        <a:t>Promoted Finalization-Memory from Gen 0</a:t>
+                      </a:r>
+                      <a:endParaRPr lang="en-US" sz="1400" b="1" i="0" u="none" strike="noStrike" dirty="0">
+                        <a:solidFill>
+                          <a:schemeClr val="bg1"/>
+                        </a:solidFill>
+                        <a:effectLst/>
+                        <a:latin typeface="+mn-lt"/>
+                        <a:cs typeface="Consolas" panose="020B0609020204030204" pitchFamily="49" charset="0"/>
+                      </a:endParaRPr>
+                    </a:p>
+                  </a:txBody>
+                  <a:tcPr marL="45720" marR="45720" anchor="b">
+                    <a:lnL w="12700" cap="flat" cmpd="sng" algn="ctr">
+                      <a:solidFill>
+                        <a:srgbClr val="FFFFFF"/>
+                      </a:solidFill>
+                      <a:prstDash val="solid"/>
+                      <a:round/>
+                      <a:headEnd type="none" w="med" len="med"/>
+                      <a:tailEnd type="none" w="med" len="med"/>
+                    </a:lnL>
+                    <a:lnR w="12700" cap="flat" cmpd="sng" algn="ctr">
+                      <a:solidFill>
+                        <a:srgbClr val="FFFFFF"/>
+                      </a:solidFill>
+                      <a:prstDash val="solid"/>
+                      <a:round/>
+                      <a:headEnd type="none" w="med" len="med"/>
+                      <a:tailEnd type="none" w="med" len="med"/>
+                    </a:lnR>
+                    <a:lnT w="12700" cap="flat" cmpd="sng" algn="ctr">
+                      <a:solidFill>
+                        <a:srgbClr val="FFFFFF"/>
+                      </a:solidFill>
+                      <a:prstDash val="solid"/>
+                      <a:round/>
+                      <a:headEnd type="none" w="med" len="med"/>
+                      <a:tailEnd type="none" w="med" len="med"/>
+                    </a:lnT>
+                    <a:lnB w="12700" cap="flat" cmpd="sng" algn="ctr">
+                      <a:solidFill>
+                        <a:srgbClr val="FFFFFF"/>
+                      </a:solidFill>
+                      <a:prstDash val="solid"/>
+                      <a:round/>
+                      <a:headEnd type="none" w="med" len="med"/>
+                      <a:tailEnd type="none" w="med" len="med"/>
+                    </a:lnB>
+                    <a:lnTlToBr w="12700" cmpd="sng">
+                      <a:noFill/>
+                      <a:prstDash val="solid"/>
+                    </a:lnTlToBr>
+                    <a:lnBlToTr w="12700" cmpd="sng">
+                      <a:noFill/>
+                      <a:prstDash val="solid"/>
+                    </a:lnBlToTr>
+                    <a:noFill/>
+                  </a:tcPr>
+                </a:tc>
+                <a:tc>
+                  <a:txBody>
+                    <a:bodyPr/>
+                    <a:lstStyle/>
+                    <a:p>
+                      <a:pPr algn="l" fontAlgn="b"/>
+                      <a:r>
+                        <a:rPr lang="ru-RU" sz="1400" b="0" i="0" u="none" strike="noStrike" dirty="0" smtClean="0">
+                          <a:solidFill>
+                            <a:schemeClr val="bg1"/>
+                          </a:solidFill>
+                          <a:effectLst/>
+                          <a:latin typeface="+mn-lt"/>
+                          <a:cs typeface="Consolas" panose="020B0609020204030204" pitchFamily="49" charset="0"/>
+                        </a:rPr>
+                        <a:t>Сколько байтов перешло из 0 в 1 т.к. нужен вызов </a:t>
+                      </a:r>
+                      <a:r>
+                        <a:rPr lang="en-US" sz="1400" b="0" i="0" u="none" strike="noStrike" dirty="0" smtClean="0">
+                          <a:solidFill>
+                            <a:schemeClr val="bg1"/>
+                          </a:solidFill>
+                          <a:effectLst/>
+                          <a:latin typeface="+mn-lt"/>
+                          <a:cs typeface="Consolas" panose="020B0609020204030204" pitchFamily="49" charset="0"/>
+                        </a:rPr>
+                        <a:t>~Fin</a:t>
+                      </a:r>
+                      <a:endParaRPr lang="en-US" sz="1400" b="0" i="0" u="none" strike="noStrike" dirty="0">
+                        <a:solidFill>
+                          <a:schemeClr val="bg1"/>
+                        </a:solidFill>
+                        <a:effectLst/>
+                        <a:latin typeface="+mn-lt"/>
+                        <a:cs typeface="Consolas" panose="020B0609020204030204" pitchFamily="49" charset="0"/>
+                      </a:endParaRPr>
+                    </a:p>
+                  </a:txBody>
+                  <a:tcPr marL="45720" marR="45720" anchor="b">
+                    <a:lnL w="12700" cap="flat" cmpd="sng" algn="ctr">
+                      <a:solidFill>
+                        <a:srgbClr val="FFFFFF"/>
+                      </a:solidFill>
+                      <a:prstDash val="solid"/>
+                      <a:round/>
+                      <a:headEnd type="none" w="med" len="med"/>
+                      <a:tailEnd type="none" w="med" len="med"/>
+                    </a:lnL>
+                    <a:lnR w="12700" cap="flat" cmpd="sng" algn="ctr">
+                      <a:solidFill>
+                        <a:srgbClr val="FFFFFF"/>
+                      </a:solidFill>
+                      <a:prstDash val="solid"/>
+                      <a:round/>
+                      <a:headEnd type="none" w="med" len="med"/>
+                      <a:tailEnd type="none" w="med" len="med"/>
+                    </a:lnR>
+                    <a:lnT w="12700" cap="flat" cmpd="sng" algn="ctr">
+                      <a:solidFill>
+                        <a:srgbClr val="FFFFFF"/>
+                      </a:solidFill>
+                      <a:prstDash val="solid"/>
+                      <a:round/>
+                      <a:headEnd type="none" w="med" len="med"/>
+                      <a:tailEnd type="none" w="med" len="med"/>
+                    </a:lnT>
+                    <a:lnB w="12700" cap="flat" cmpd="sng" algn="ctr">
+                      <a:solidFill>
+                        <a:srgbClr val="FFFFFF"/>
+                      </a:solidFill>
+                      <a:prstDash val="solid"/>
+                      <a:round/>
+                      <a:headEnd type="none" w="med" len="med"/>
+                      <a:tailEnd type="none" w="med" len="med"/>
+                    </a:lnB>
+                    <a:lnTlToBr w="12700" cmpd="sng">
+                      <a:noFill/>
+                      <a:prstDash val="solid"/>
+                    </a:lnTlToBr>
+                    <a:lnBlToTr w="12700" cmpd="sng">
+                      <a:noFill/>
+                      <a:prstDash val="solid"/>
+                    </a:lnBlToTr>
+                    <a:noFill/>
+                  </a:tcPr>
+                </a:tc>
+              </a:tr>
+              <a:tr h="0">
+                <a:tc>
+                  <a:txBody>
+                    <a:bodyPr/>
+                    <a:lstStyle/>
+                    <a:p>
+                      <a:pPr algn="l" fontAlgn="b"/>
+                      <a:r>
+                        <a:rPr lang="en-US" sz="1400" b="1" i="0" u="none" strike="noStrike" dirty="0" smtClean="0">
+                          <a:solidFill>
+                            <a:schemeClr val="bg1"/>
+                          </a:solidFill>
+                          <a:effectLst/>
+                          <a:latin typeface="+mn-lt"/>
+                          <a:cs typeface="Consolas" panose="020B0609020204030204" pitchFamily="49" charset="0"/>
+                        </a:rPr>
+                        <a:t>Promoted Memory from Gen 0, 1</a:t>
+                      </a:r>
+                      <a:endParaRPr lang="en-US" sz="1400" b="1" i="0" u="none" strike="noStrike" dirty="0">
+                        <a:solidFill>
+                          <a:schemeClr val="bg1"/>
+                        </a:solidFill>
+                        <a:effectLst/>
+                        <a:latin typeface="+mn-lt"/>
+                        <a:cs typeface="Consolas" panose="020B0609020204030204" pitchFamily="49" charset="0"/>
+                      </a:endParaRPr>
+                    </a:p>
+                  </a:txBody>
+                  <a:tcPr marL="45720" marR="45720" anchor="b">
+                    <a:lnL w="12700" cap="flat" cmpd="sng" algn="ctr">
+                      <a:solidFill>
+                        <a:srgbClr val="FFFFFF"/>
+                      </a:solidFill>
+                      <a:prstDash val="solid"/>
+                      <a:round/>
+                      <a:headEnd type="none" w="med" len="med"/>
+                      <a:tailEnd type="none" w="med" len="med"/>
+                    </a:lnL>
+                    <a:lnR w="12700" cap="flat" cmpd="sng" algn="ctr">
+                      <a:solidFill>
+                        <a:srgbClr val="FFFFFF"/>
+                      </a:solidFill>
+                      <a:prstDash val="solid"/>
+                      <a:round/>
+                      <a:headEnd type="none" w="med" len="med"/>
+                      <a:tailEnd type="none" w="med" len="med"/>
+                    </a:lnR>
+                    <a:lnT w="12700" cap="flat" cmpd="sng" algn="ctr">
+                      <a:solidFill>
+                        <a:srgbClr val="FFFFFF"/>
+                      </a:solidFill>
+                      <a:prstDash val="solid"/>
+                      <a:round/>
+                      <a:headEnd type="none" w="med" len="med"/>
+                      <a:tailEnd type="none" w="med" len="med"/>
+                    </a:lnT>
+                    <a:lnB w="12700" cap="flat" cmpd="sng" algn="ctr">
+                      <a:solidFill>
+                        <a:srgbClr val="FFFFFF"/>
+                      </a:solidFill>
+                      <a:prstDash val="solid"/>
+                      <a:round/>
+                      <a:headEnd type="none" w="med" len="med"/>
+                      <a:tailEnd type="none" w="med" len="med"/>
+                    </a:lnB>
+                    <a:lnTlToBr w="12700" cmpd="sng">
+                      <a:noFill/>
+                      <a:prstDash val="solid"/>
+                    </a:lnTlToBr>
+                    <a:lnBlToTr w="12700" cmpd="sng">
+                      <a:noFill/>
+                      <a:prstDash val="solid"/>
+                    </a:lnBlToTr>
+                    <a:noFill/>
+                  </a:tcPr>
+                </a:tc>
+                <a:tc>
+                  <a:txBody>
+                    <a:bodyPr/>
+                    <a:lstStyle/>
+                    <a:p>
+                      <a:pPr algn="l" fontAlgn="b"/>
+                      <a:r>
+                        <a:rPr lang="ru-RU" sz="1400" b="0" i="0" u="none" strike="noStrike" dirty="0" smtClean="0">
+                          <a:solidFill>
+                            <a:schemeClr val="bg1"/>
+                          </a:solidFill>
+                          <a:effectLst/>
+                          <a:latin typeface="+mn-lt"/>
+                          <a:cs typeface="Consolas" panose="020B0609020204030204" pitchFamily="49" charset="0"/>
+                        </a:rPr>
+                        <a:t>Сколько байтов пережило </a:t>
+                      </a:r>
+                      <a:r>
+                        <a:rPr lang="en-US" sz="1400" b="0" i="0" u="none" strike="noStrike" dirty="0" smtClean="0">
+                          <a:solidFill>
+                            <a:schemeClr val="bg1"/>
+                          </a:solidFill>
+                          <a:effectLst/>
+                          <a:latin typeface="+mn-lt"/>
+                          <a:cs typeface="Consolas" panose="020B0609020204030204" pitchFamily="49" charset="0"/>
+                        </a:rPr>
+                        <a:t>GC</a:t>
+                      </a:r>
+                      <a:r>
+                        <a:rPr lang="ru-RU" sz="1400" b="0" i="0" u="none" strike="noStrike" baseline="0" dirty="0" smtClean="0">
+                          <a:solidFill>
+                            <a:schemeClr val="bg1"/>
+                          </a:solidFill>
+                          <a:effectLst/>
+                          <a:latin typeface="+mn-lt"/>
+                          <a:cs typeface="Consolas" panose="020B0609020204030204" pitchFamily="49" charset="0"/>
+                        </a:rPr>
+                        <a:t> в данном поколении</a:t>
+                      </a:r>
+                      <a:endParaRPr lang="en-US" sz="1400" b="0" i="0" u="none" strike="noStrike" dirty="0">
+                        <a:solidFill>
+                          <a:schemeClr val="bg1"/>
+                        </a:solidFill>
+                        <a:effectLst/>
+                        <a:latin typeface="+mn-lt"/>
+                        <a:cs typeface="Consolas" panose="020B0609020204030204" pitchFamily="49" charset="0"/>
+                      </a:endParaRPr>
+                    </a:p>
+                  </a:txBody>
+                  <a:tcPr marL="45720" marR="45720" anchor="b">
+                    <a:lnL w="12700" cap="flat" cmpd="sng" algn="ctr">
+                      <a:solidFill>
+                        <a:srgbClr val="FFFFFF"/>
+                      </a:solidFill>
+                      <a:prstDash val="solid"/>
+                      <a:round/>
+                      <a:headEnd type="none" w="med" len="med"/>
+                      <a:tailEnd type="none" w="med" len="med"/>
+                    </a:lnL>
+                    <a:lnR w="12700" cap="flat" cmpd="sng" algn="ctr">
+                      <a:solidFill>
+                        <a:srgbClr val="FFFFFF"/>
+                      </a:solidFill>
+                      <a:prstDash val="solid"/>
+                      <a:round/>
+                      <a:headEnd type="none" w="med" len="med"/>
+                      <a:tailEnd type="none" w="med" len="med"/>
+                    </a:lnR>
+                    <a:lnT w="12700" cap="flat" cmpd="sng" algn="ctr">
+                      <a:solidFill>
+                        <a:srgbClr val="FFFFFF"/>
+                      </a:solidFill>
+                      <a:prstDash val="solid"/>
+                      <a:round/>
+                      <a:headEnd type="none" w="med" len="med"/>
+                      <a:tailEnd type="none" w="med" len="med"/>
+                    </a:lnT>
+                    <a:lnB w="12700" cap="flat" cmpd="sng" algn="ctr">
+                      <a:solidFill>
+                        <a:srgbClr val="FFFFFF"/>
+                      </a:solidFill>
+                      <a:prstDash val="solid"/>
+                      <a:round/>
+                      <a:headEnd type="none" w="med" len="med"/>
+                      <a:tailEnd type="none" w="med" len="med"/>
+                    </a:lnB>
+                    <a:lnTlToBr w="12700" cmpd="sng">
+                      <a:noFill/>
+                      <a:prstDash val="solid"/>
+                    </a:lnTlToBr>
+                    <a:lnBlToTr w="12700" cmpd="sng">
+                      <a:noFill/>
+                      <a:prstDash val="solid"/>
+                    </a:lnBlToTr>
+                    <a:noFill/>
+                  </a:tcPr>
+                </a:tc>
+              </a:tr>
+            </a:tbl>
+          </a:graphicData>
+        </a:graphic>
+      </p:graphicFrame>
+    </p:spTree>
+    <p:extLst>
+      <p:ext uri="{BB962C8B-B14F-4D97-AF65-F5344CB8AC3E}">
+        <p14:creationId xmlns:p14="http://schemas.microsoft.com/office/powerpoint/2010/main" val="81790670"/>
+      </p:ext>
+    </p:extLst>
+  </p:cSld>
+  <p:clrMapOvr>
+    <a:masterClrMapping/>
+  </p:clrMapOvr>
+  <p:timing>
+    <p:tnLst>
+      <p:par>
+        <p:cTn id="1" dur="indefinite" restart="never" nodeType="tmRoot"/>
+      </p:par>
+    </p:tnLst>
+  </p:timing>
+</p:sld>
+</file>
+
+<file path=ppt/slides/slide27.xml><?xml version="1.0" encoding="utf-8"?>
+<p:sld xmlns:a="http://schemas.openxmlformats.org/drawingml/2006/main" xmlns:r="http://schemas.openxmlformats.org/officeDocument/2006/relationships" xmlns:p="http://schemas.openxmlformats.org/presentationml/2006/main">
+  <p:cSld>
+    <p:spTree>
+      <p:nvGrpSpPr>
+        <p:cNvPr id="1" name=""/>
+        <p:cNvGrpSpPr/>
+        <p:nvPr/>
+      </p:nvGrpSpPr>
+      <p:grpSpPr>
+        <a:xfrm>
+          <a:off x="0" y="0"/>
+          <a:ext cx="0" cy="0"/>
+          <a:chOff x="0" y="0"/>
+          <a:chExt cx="0" cy="0"/>
+        </a:xfrm>
+      </p:grpSpPr>
+      <p:sp>
+        <p:nvSpPr>
+          <p:cNvPr id="2" name="Title 1"/>
+          <p:cNvSpPr>
+            <a:spLocks noGrp="1"/>
+          </p:cNvSpPr>
+          <p:nvPr>
+            <p:ph type="title"/>
+          </p:nvPr>
+        </p:nvSpPr>
         <p:spPr/>
         <p:txBody>
           <a:bodyPr>
@@ -14605,11 +19221,7 @@
           <a:p>
             <a:r>
               <a:rPr lang="ru-RU" sz="2800" dirty="0" smtClean="0"/>
-              <a:t>Поставить на паузу все </a:t>
-            </a:r>
-            <a:r>
-              <a:rPr lang="ru-RU" sz="2800" dirty="0" smtClean="0"/>
-              <a:t>потоки процесса (</a:t>
+              <a:t>Поставить на паузу все потоки процесса (</a:t>
             </a:r>
             <a:r>
               <a:rPr lang="en-US" sz="2800" dirty="0" smtClean="0"/>
@@ -14660,11 +19272,7 @@
           <a:p>
             <a:r>
               <a:rPr lang="ru-RU" sz="2800" dirty="0" smtClean="0"/>
-              <a:t>Выполняем дефрагментацию кучи чтобы свободное пространство шло непрерывным блоком в конце кучи. Одновременно исправляем адреса ссылок</a:t>
-            </a:r>
-            <a:r>
-              <a:rPr lang="ru-RU" sz="2800" dirty="0" smtClean="0"/>
-              <a:t>.</a:t>
+              <a:t>Выполняем дефрагментацию кучи чтобы свободное пространство шло непрерывным блоком в конце кучи. Одновременно исправляем адреса ссылок.</a:t>
             </a:r>
             <a:endParaRPr lang="en-US" sz="2800" dirty="0" smtClean="0"/>
           </a:p>
@@ -14682,7 +19290,6 @@
               <a:rPr lang="ru-RU" sz="2400" dirty="0" smtClean="0"/>
               <a:t> дефрагментация не выполняется</a:t>
             </a:r>
-            <a:endParaRPr lang="ru-RU" sz="2400" dirty="0" smtClean="0"/>
           </a:p>
           <a:p>
             <a:r>

</xml_diff>

<commit_message>
Updated presentations (GAC & IDisposable)
</commit_message>
<xml_diff>
--- a/Presentation/memory-management-and-gc.pptx
+++ b/Presentation/memory-management-and-gc.pptx
@@ -5,7 +5,7 @@
     <p:sldMasterId id="2147483648" r:id="rId1"/>
   </p:sldMasterIdLst>
   <p:notesMasterIdLst>
-    <p:notesMasterId r:id="rId37"/>
+    <p:notesMasterId r:id="rId39"/>
   </p:notesMasterIdLst>
   <p:sldIdLst>
     <p:sldId id="261" r:id="rId2"/>
@@ -25,24 +25,26 @@
     <p:sldId id="279" r:id="rId16"/>
     <p:sldId id="280" r:id="rId17"/>
     <p:sldId id="281" r:id="rId18"/>
-    <p:sldId id="287" r:id="rId19"/>
-    <p:sldId id="288" r:id="rId20"/>
-    <p:sldId id="272" r:id="rId21"/>
-    <p:sldId id="275" r:id="rId22"/>
-    <p:sldId id="289" r:id="rId23"/>
-    <p:sldId id="276" r:id="rId24"/>
-    <p:sldId id="271" r:id="rId25"/>
-    <p:sldId id="263" r:id="rId26"/>
-    <p:sldId id="284" r:id="rId27"/>
-    <p:sldId id="262" r:id="rId28"/>
-    <p:sldId id="278" r:id="rId29"/>
-    <p:sldId id="282" r:id="rId30"/>
-    <p:sldId id="277" r:id="rId31"/>
-    <p:sldId id="258" r:id="rId32"/>
-    <p:sldId id="259" r:id="rId33"/>
-    <p:sldId id="290" r:id="rId34"/>
-    <p:sldId id="283" r:id="rId35"/>
-    <p:sldId id="260" r:id="rId36"/>
+    <p:sldId id="292" r:id="rId19"/>
+    <p:sldId id="287" r:id="rId20"/>
+    <p:sldId id="288" r:id="rId21"/>
+    <p:sldId id="293" r:id="rId22"/>
+    <p:sldId id="272" r:id="rId23"/>
+    <p:sldId id="275" r:id="rId24"/>
+    <p:sldId id="289" r:id="rId25"/>
+    <p:sldId id="276" r:id="rId26"/>
+    <p:sldId id="271" r:id="rId27"/>
+    <p:sldId id="263" r:id="rId28"/>
+    <p:sldId id="284" r:id="rId29"/>
+    <p:sldId id="262" r:id="rId30"/>
+    <p:sldId id="278" r:id="rId31"/>
+    <p:sldId id="282" r:id="rId32"/>
+    <p:sldId id="277" r:id="rId33"/>
+    <p:sldId id="258" r:id="rId34"/>
+    <p:sldId id="259" r:id="rId35"/>
+    <p:sldId id="290" r:id="rId36"/>
+    <p:sldId id="283" r:id="rId37"/>
+    <p:sldId id="260" r:id="rId38"/>
   </p:sldIdLst>
   <p:sldSz cx="9144000" cy="6858000" type="screen4x3"/>
   <p:notesSz cx="6858000" cy="9144000"/>
@@ -141,6 +143,36 @@
       </a:defRPr>
     </a:lvl9pPr>
   </p:defaultTextStyle>
+  <p:extLst>
+    <p:ext uri="{EFAFB233-063F-42B5-8137-9DF3F51BA10A}">
+      <p15:sldGuideLst xmlns:p15="http://schemas.microsoft.com/office/powerpoint/2012/main">
+        <p15:guide id="1" orient="horz" pos="2160">
+          <p15:clr>
+            <a:srgbClr val="A4A3A4"/>
+          </p15:clr>
+        </p15:guide>
+        <p15:guide id="2" pos="2880">
+          <p15:clr>
+            <a:srgbClr val="A4A3A4"/>
+          </p15:clr>
+        </p15:guide>
+      </p15:sldGuideLst>
+    </p:ext>
+    <p:ext uri="{2D200454-40CA-4A62-9FC3-DE9A4176ACB9}">
+      <p15:notesGuideLst xmlns:p15="http://schemas.microsoft.com/office/powerpoint/2012/main">
+        <p15:guide id="1" orient="horz" pos="2880">
+          <p15:clr>
+            <a:srgbClr val="A4A3A4"/>
+          </p15:clr>
+        </p15:guide>
+        <p15:guide id="2" pos="2160">
+          <p15:clr>
+            <a:srgbClr val="A4A3A4"/>
+          </p15:clr>
+        </p15:guide>
+      </p15:notesGuideLst>
+    </p:ext>
+  </p:extLst>
 </p:presentation>
 </file>
 
@@ -226,7 +258,7 @@
           <a:p>
             <a:fld id="{B24A7054-7FFB-49F4-A126-5DF6E687FF53}" type="datetimeFigureOut">
               <a:rPr lang="ru-RU" smtClean="0"/>
-              <a:t>05.08.2016</a:t>
+              <a:t>03.02.2017</a:t>
             </a:fld>
             <a:endParaRPr lang="ru-RU"/>
           </a:p>
@@ -1592,7 +1624,7 @@
           <a:p>
             <a:fld id="{8E6E6A2A-E9D3-4A0D-B04A-ABDD367A1E08}" type="datetimeFigureOut">
               <a:rPr lang="ru-RU" smtClean="0"/>
-              <a:t>05.08.2016</a:t>
+              <a:t>03.02.2017</a:t>
             </a:fld>
             <a:endParaRPr lang="ru-RU"/>
           </a:p>
@@ -3044,7 +3076,7 @@
           <a:p>
             <a:fld id="{AC3D3127-B7C4-45E3-9797-C527EC9FDD78}" type="datetimeFigureOut">
               <a:rPr lang="ru-RU" smtClean="0"/>
-              <a:t>05.08.2016</a:t>
+              <a:t>03.02.2017</a:t>
             </a:fld>
             <a:endParaRPr lang="ru-RU"/>
           </a:p>
@@ -10299,12 +10331,18 @@
         </p:nvSpPr>
         <p:spPr/>
         <p:txBody>
-          <a:bodyPr/>
+          <a:bodyPr>
+            <a:normAutofit fontScale="90000"/>
+          </a:bodyPr>
           <a:lstStyle/>
           <a:p>
             <a:r>
               <a:rPr lang="en-US" dirty="0" smtClean="0"/>
-              <a:t>using</a:t>
+              <a:t>IDisposable: </a:t>
+            </a:r>
+            <a:r>
+              <a:rPr lang="ru-RU" dirty="0" smtClean="0"/>
+              <a:t>управление ресурсами</a:t>
             </a:r>
             <a:endParaRPr lang="ru-RU" dirty="0"/>
           </a:p>
@@ -10322,36 +10360,81 @@
         </p:nvSpPr>
         <p:spPr/>
         <p:txBody>
-          <a:bodyPr/>
+          <a:bodyPr>
+            <a:normAutofit fontScale="85000" lnSpcReduction="20000"/>
+          </a:bodyPr>
           <a:lstStyle/>
           <a:p>
+            <a:pPr marL="0" indent="0">
+              <a:buNone/>
+            </a:pPr>
             <a:r>
               <a:rPr lang="ru-RU" dirty="0" smtClean="0"/>
-              <a:t>Переменная видна только внутри блока</a:t>
-            </a:r>
-          </a:p>
-          <a:p>
+              <a:t>В </a:t>
+            </a:r>
+            <a:r>
+              <a:rPr lang="en-US" dirty="0" smtClean="0"/>
+              <a:t>.NET </a:t>
+            </a:r>
             <a:r>
               <a:rPr lang="ru-RU" dirty="0" smtClean="0"/>
-              <a:t>Автоматически вызывается </a:t>
+              <a:t>используется недетерминированная модель управления памятью. Это означает что программист не контролирует момент освобождения памяти. Данный подход годится для памяти, но не годится для «объектов» которые находятся вне контроля </a:t>
             </a:r>
             <a:r>
               <a:rPr lang="en-US" dirty="0" smtClean="0"/>
-              <a:t>Dispose() </a:t>
+              <a:t>.NET – </a:t>
             </a:r>
             <a:r>
               <a:rPr lang="ru-RU" dirty="0" smtClean="0"/>
-              <a:t>внутри блока </a:t>
+              <a:t>например, файлы. Создавая объект типа </a:t>
             </a:r>
             <a:r>
               <a:rPr lang="en-US" dirty="0" smtClean="0"/>
-              <a:t>finally</a:t>
-            </a:r>
-          </a:p>
-          <a:p>
+              <a:t>FileStream </a:t>
+            </a:r>
             <a:r>
               <a:rPr lang="ru-RU" dirty="0" smtClean="0"/>
-              <a:t>Переменная доступна только для чтения</a:t>
+              <a:t>мы одновременно создаем т.н. дескриптор (</a:t>
+            </a:r>
+            <a:r>
+              <a:rPr lang="en-US" dirty="0" smtClean="0"/>
+              <a:t>handle</a:t>
+            </a:r>
+            <a:r>
+              <a:rPr lang="ru-RU" dirty="0" smtClean="0"/>
+              <a:t>)</a:t>
+            </a:r>
+            <a:r>
+              <a:rPr lang="en-US" dirty="0" smtClean="0"/>
+              <a:t> – </a:t>
+            </a:r>
+            <a:r>
+              <a:rPr lang="ru-RU" dirty="0" smtClean="0"/>
+              <a:t>системный объект который контролируется ОС </a:t>
+            </a:r>
+            <a:r>
+              <a:rPr lang="en-US" dirty="0" smtClean="0"/>
+              <a:t>Windows. </a:t>
+            </a:r>
+            <a:r>
+              <a:rPr lang="ru-RU" dirty="0" smtClean="0"/>
+              <a:t>Этот дескритор нужно закрывать для корректной работы приложения и экономии системных ресурсов. Интерфейс </a:t>
+            </a:r>
+            <a:r>
+              <a:rPr lang="en-US" dirty="0" smtClean="0"/>
+              <a:t>IDisposable </a:t>
+            </a:r>
+            <a:r>
+              <a:rPr lang="ru-RU" dirty="0" smtClean="0"/>
+              <a:t>с одним методом </a:t>
+            </a:r>
+            <a:r>
+              <a:rPr lang="en-US" dirty="0" smtClean="0"/>
+              <a:t>void Dispose()</a:t>
+            </a:r>
+            <a:r>
+              <a:rPr lang="ru-RU" dirty="0" smtClean="0"/>
+              <a:t> позволяет точно упралять моментом когда нужно освобождать такие ресурсы.</a:t>
             </a:r>
             <a:endParaRPr lang="ru-RU" dirty="0"/>
           </a:p>
@@ -10360,7 +10443,7 @@
     </p:spTree>
     <p:extLst>
       <p:ext uri="{BB962C8B-B14F-4D97-AF65-F5344CB8AC3E}">
-        <p14:creationId xmlns:p14="http://schemas.microsoft.com/office/powerpoint/2010/main" val="1354930669"/>
+        <p14:creationId xmlns:p14="http://schemas.microsoft.com/office/powerpoint/2010/main" val="674408421"/>
       </p:ext>
     </p:extLst>
   </p:cSld>
@@ -10403,12 +10486,8 @@
           <a:lstStyle/>
           <a:p>
             <a:r>
-              <a:rPr lang="ru-RU" dirty="0" smtClean="0"/>
-              <a:t>Своя реализация </a:t>
-            </a:r>
-            <a:r>
-              <a:rPr lang="en-US" dirty="0" err="1" smtClean="0"/>
-              <a:t>IDisposable</a:t>
+              <a:rPr lang="en-US" dirty="0" smtClean="0"/>
+              <a:t>using</a:t>
             </a:r>
             <a:endParaRPr lang="ru-RU" dirty="0"/>
           </a:p>
@@ -10431,13 +10510,31 @@
           <a:p>
             <a:r>
               <a:rPr lang="ru-RU" dirty="0" smtClean="0"/>
-              <a:t>Должна быть реентерабельной</a:t>
+              <a:t>Переменная видна только внутри блока</a:t>
             </a:r>
           </a:p>
           <a:p>
             <a:r>
               <a:rPr lang="ru-RU" dirty="0" smtClean="0"/>
-              <a:t>Не должна генерировать исключений при повторном вызове</a:t>
+              <a:t>Автоматически вызывается </a:t>
+            </a:r>
+            <a:r>
+              <a:rPr lang="en-US" dirty="0" smtClean="0"/>
+              <a:t>Dispose() </a:t>
+            </a:r>
+            <a:r>
+              <a:rPr lang="ru-RU" dirty="0" smtClean="0"/>
+              <a:t>внутри блока </a:t>
+            </a:r>
+            <a:r>
+              <a:rPr lang="en-US" dirty="0" smtClean="0"/>
+              <a:t>finally</a:t>
+            </a:r>
+          </a:p>
+          <a:p>
+            <a:r>
+              <a:rPr lang="ru-RU" dirty="0" smtClean="0"/>
+              <a:t>Переменная доступна только для чтения</a:t>
             </a:r>
             <a:endParaRPr lang="ru-RU" dirty="0"/>
           </a:p>
@@ -10446,7 +10543,7 @@
     </p:spTree>
     <p:extLst>
       <p:ext uri="{BB962C8B-B14F-4D97-AF65-F5344CB8AC3E}">
-        <p14:creationId xmlns:p14="http://schemas.microsoft.com/office/powerpoint/2010/main" val="3947807755"/>
+        <p14:creationId xmlns:p14="http://schemas.microsoft.com/office/powerpoint/2010/main" val="1354930669"/>
       </p:ext>
     </p:extLst>
   </p:cSld>
@@ -11065,21 +11162,16 @@
         </p:nvSpPr>
         <p:spPr/>
         <p:txBody>
-          <a:bodyPr>
-            <a:normAutofit fontScale="90000"/>
-          </a:bodyPr>
+          <a:bodyPr/>
           <a:lstStyle/>
           <a:p>
             <a:r>
               <a:rPr lang="ru-RU" dirty="0" smtClean="0"/>
-              <a:t>Куча для больших объектов</a:t>
-            </a:r>
-            <a:br>
-              <a:rPr lang="ru-RU" dirty="0" smtClean="0"/>
-            </a:br>
-            <a:r>
-              <a:rPr lang="en-US" dirty="0" smtClean="0"/>
-              <a:t>(Large Object Heap – LOH)</a:t>
+              <a:t>Своя реализация </a:t>
+            </a:r>
+            <a:r>
+              <a:rPr lang="en-US" dirty="0" err="1" smtClean="0"/>
+              <a:t>IDisposable</a:t>
             </a:r>
             <a:endParaRPr lang="ru-RU" dirty="0"/>
           </a:p>
@@ -11097,26 +11189,18 @@
         </p:nvSpPr>
         <p:spPr/>
         <p:txBody>
-          <a:bodyPr>
-            <a:normAutofit fontScale="92500" lnSpcReduction="10000"/>
-          </a:bodyPr>
+          <a:bodyPr/>
           <a:lstStyle/>
           <a:p>
             <a:r>
               <a:rPr lang="ru-RU" dirty="0" smtClean="0"/>
-              <a:t>Объекты с размером примерно больше 85 килобайт находятся в отдельной куче</a:t>
+              <a:t>Должна быть реентерабельной</a:t>
             </a:r>
           </a:p>
           <a:p>
             <a:r>
               <a:rPr lang="ru-RU" dirty="0" smtClean="0"/>
-              <a:t>Данная куча не дефрагментируется т.к. это бы создало большую нагрузку. Фрагментация может возникнуть при интенсивном использовании памяти (сотни мегабайт) и программа выделяет большие временные объекты.</a:t>
-            </a:r>
-          </a:p>
-          <a:p>
-            <a:r>
-              <a:rPr lang="ru-RU" dirty="0" smtClean="0"/>
-              <a:t>Объекты в данной куче считаются принадлежащими второму поколению</a:t>
+              <a:t>Не должна генерировать исключений при повторном вызове</a:t>
             </a:r>
             <a:endParaRPr lang="ru-RU" dirty="0"/>
           </a:p>
@@ -11125,7 +11209,7 @@
     </p:spTree>
     <p:extLst>
       <p:ext uri="{BB962C8B-B14F-4D97-AF65-F5344CB8AC3E}">
-        <p14:creationId xmlns:p14="http://schemas.microsoft.com/office/powerpoint/2010/main" val="3103245170"/>
+        <p14:creationId xmlns:p14="http://schemas.microsoft.com/office/powerpoint/2010/main" val="3947807755"/>
       </p:ext>
     </p:extLst>
   </p:cSld>
@@ -11171,33 +11255,20 @@
         </p:nvSpPr>
         <p:spPr/>
         <p:txBody>
-          <a:bodyPr>
-            <a:normAutofit fontScale="90000"/>
-          </a:bodyPr>
+          <a:bodyPr/>
           <a:lstStyle/>
           <a:p>
             <a:r>
               <a:rPr lang="en-US" dirty="0" smtClean="0"/>
-              <a:t>Large Object Heap </a:t>
+              <a:t>IDisposable </a:t>
             </a:r>
             <a:r>
               <a:rPr lang="ru-RU" dirty="0" smtClean="0"/>
-              <a:t>в </a:t>
+              <a:t>и </a:t>
             </a:r>
             <a:r>
               <a:rPr lang="en-US" dirty="0" smtClean="0"/>
-              <a:t>.NET 4.5.1</a:t>
-            </a:r>
-            <a:r>
-              <a:rPr lang="ru-RU" dirty="0" smtClean="0"/>
-              <a:t/>
-            </a:r>
-            <a:br>
-              <a:rPr lang="ru-RU" dirty="0" smtClean="0"/>
-            </a:br>
-            <a:r>
-              <a:rPr lang="ru-RU" dirty="0" smtClean="0"/>
-              <a:t>и выше</a:t>
+              <a:t>foreach</a:t>
             </a:r>
             <a:endParaRPr lang="ru-RU" dirty="0"/>
           </a:p>
@@ -11213,10 +11284,15 @@
             <p:ph idx="1"/>
           </p:nvPr>
         </p:nvSpPr>
-        <p:spPr/>
+        <p:spPr>
+          <a:xfrm>
+            <a:off x="457200" y="1412776"/>
+            <a:ext cx="8229600" cy="1252736"/>
+          </a:xfrm>
+        </p:spPr>
         <p:txBody>
           <a:bodyPr>
-            <a:normAutofit lnSpcReduction="10000"/>
+            <a:normAutofit/>
           </a:bodyPr>
           <a:lstStyle/>
           <a:p>
@@ -11224,142 +11300,614 @@
               <a:buNone/>
             </a:pPr>
             <a:r>
-              <a:rPr lang="ru-RU" dirty="0" smtClean="0"/>
-              <a:t>Добавлена возможность дефрагментации </a:t>
-            </a:r>
-            <a:r>
-              <a:rPr lang="en-US" dirty="0" smtClean="0"/>
-              <a:t>LOH </a:t>
-            </a:r>
-            <a:r>
-              <a:rPr lang="ru-RU" dirty="0" smtClean="0"/>
-              <a:t>по запросу.</a:t>
-            </a:r>
-          </a:p>
+              <a:rPr lang="ru-RU" sz="2800" dirty="0" smtClean="0"/>
+              <a:t>Компилятор автоматически генерирует вызов </a:t>
+            </a:r>
+            <a:r>
+              <a:rPr lang="en-US" sz="2800" dirty="0" smtClean="0"/>
+              <a:t>Dispose() </a:t>
+            </a:r>
+            <a:r>
+              <a:rPr lang="ru-RU" sz="2800" dirty="0" smtClean="0"/>
+              <a:t>для цикла </a:t>
+            </a:r>
+            <a:r>
+              <a:rPr lang="en-US" sz="2800" dirty="0" smtClean="0"/>
+              <a:t>foreach. </a:t>
+            </a:r>
+            <a:r>
+              <a:rPr lang="ru-RU" sz="2800" dirty="0" smtClean="0"/>
+              <a:t>Цикл:</a:t>
+            </a:r>
+            <a:endParaRPr lang="ru-RU" sz="2800" dirty="0"/>
+          </a:p>
+        </p:txBody>
+      </p:sp>
+      <p:sp>
+        <p:nvSpPr>
+          <p:cNvPr id="5" name="Rectangle 4"/>
+          <p:cNvSpPr/>
+          <p:nvPr/>
+        </p:nvSpPr>
+        <p:spPr>
+          <a:xfrm>
+            <a:off x="457200" y="2449487"/>
+            <a:ext cx="8229600" cy="307777"/>
+          </a:xfrm>
+          <a:prstGeom prst="rect">
+            <a:avLst/>
+          </a:prstGeom>
+          <a:solidFill>
+            <a:schemeClr val="bg1"/>
+          </a:solidFill>
+        </p:spPr>
+        <p:txBody>
+          <a:bodyPr wrap="square">
+            <a:spAutoFit/>
+          </a:bodyPr>
+          <a:lstStyle/>
+          <a:p>
+            <a:r>
+              <a:rPr lang="en-US" sz="1400" dirty="0">
+                <a:solidFill>
+                  <a:srgbClr val="0000FF"/>
+                </a:solidFill>
+                <a:latin typeface="Consolas" panose="020B0609020204030204" pitchFamily="49" charset="0"/>
+              </a:rPr>
+              <a:t>foreach</a:t>
+            </a:r>
+            <a:r>
+              <a:rPr lang="en-US" sz="1400" dirty="0">
+                <a:solidFill>
+                  <a:srgbClr val="000000"/>
+                </a:solidFill>
+                <a:latin typeface="Consolas" panose="020B0609020204030204" pitchFamily="49" charset="0"/>
+              </a:rPr>
+              <a:t> (ElementType element </a:t>
+            </a:r>
+            <a:r>
+              <a:rPr lang="en-US" sz="1400" dirty="0">
+                <a:solidFill>
+                  <a:srgbClr val="0000FF"/>
+                </a:solidFill>
+                <a:latin typeface="Consolas" panose="020B0609020204030204" pitchFamily="49" charset="0"/>
+              </a:rPr>
+              <a:t>in</a:t>
+            </a:r>
+            <a:r>
+              <a:rPr lang="en-US" sz="1400" dirty="0">
+                <a:solidFill>
+                  <a:srgbClr val="000000"/>
+                </a:solidFill>
+                <a:latin typeface="Consolas" panose="020B0609020204030204" pitchFamily="49" charset="0"/>
+              </a:rPr>
+              <a:t> collection) statement</a:t>
+            </a:r>
+            <a:endParaRPr lang="ru-RU" sz="1400" dirty="0"/>
+          </a:p>
+        </p:txBody>
+      </p:sp>
+      <p:sp>
+        <p:nvSpPr>
+          <p:cNvPr id="6" name="Content Placeholder 2"/>
+          <p:cNvSpPr txBox="1">
+            <a:spLocks/>
+          </p:cNvSpPr>
+          <p:nvPr/>
+        </p:nvSpPr>
+        <p:spPr>
+          <a:xfrm>
+            <a:off x="457200" y="2881535"/>
+            <a:ext cx="8229600" cy="576064"/>
+          </a:xfrm>
+          <a:prstGeom prst="rect">
+            <a:avLst/>
+          </a:prstGeom>
+        </p:spPr>
+        <p:txBody>
+          <a:bodyPr vert="horz" lIns="91440" tIns="45720" rIns="91440" bIns="45720" rtlCol="0">
+            <a:normAutofit/>
+          </a:bodyPr>
+          <a:lstStyle>
+            <a:lvl1pPr marL="342900" indent="-342900" algn="l" defTabSz="914400" rtl="0" eaLnBrk="1" latinLnBrk="0" hangingPunct="1">
+              <a:spcBef>
+                <a:spcPct val="20000"/>
+              </a:spcBef>
+              <a:buFont typeface="Arial" pitchFamily="34" charset="0"/>
+              <a:buChar char="•"/>
+              <a:defRPr sz="3200" kern="1200">
+                <a:solidFill>
+                  <a:schemeClr val="tx1"/>
+                </a:solidFill>
+                <a:latin typeface="+mn-lt"/>
+                <a:ea typeface="+mn-ea"/>
+                <a:cs typeface="+mn-cs"/>
+              </a:defRPr>
+            </a:lvl1pPr>
+            <a:lvl2pPr marL="742950" indent="-285750" algn="l" defTabSz="914400" rtl="0" eaLnBrk="1" latinLnBrk="0" hangingPunct="1">
+              <a:spcBef>
+                <a:spcPct val="20000"/>
+              </a:spcBef>
+              <a:buFont typeface="Arial" pitchFamily="34" charset="0"/>
+              <a:buChar char="–"/>
+              <a:defRPr sz="2800" kern="1200">
+                <a:solidFill>
+                  <a:schemeClr val="tx1"/>
+                </a:solidFill>
+                <a:latin typeface="+mn-lt"/>
+                <a:ea typeface="+mn-ea"/>
+                <a:cs typeface="+mn-cs"/>
+              </a:defRPr>
+            </a:lvl2pPr>
+            <a:lvl3pPr marL="1143000" indent="-228600" algn="l" defTabSz="914400" rtl="0" eaLnBrk="1" latinLnBrk="0" hangingPunct="1">
+              <a:spcBef>
+                <a:spcPct val="20000"/>
+              </a:spcBef>
+              <a:buFont typeface="Arial" pitchFamily="34" charset="0"/>
+              <a:buChar char="•"/>
+              <a:defRPr sz="2400" kern="1200">
+                <a:solidFill>
+                  <a:schemeClr val="tx1"/>
+                </a:solidFill>
+                <a:latin typeface="+mn-lt"/>
+                <a:ea typeface="+mn-ea"/>
+                <a:cs typeface="+mn-cs"/>
+              </a:defRPr>
+            </a:lvl3pPr>
+            <a:lvl4pPr marL="1600200" indent="-228600" algn="l" defTabSz="914400" rtl="0" eaLnBrk="1" latinLnBrk="0" hangingPunct="1">
+              <a:spcBef>
+                <a:spcPct val="20000"/>
+              </a:spcBef>
+              <a:buFont typeface="Arial" pitchFamily="34" charset="0"/>
+              <a:buChar char="–"/>
+              <a:defRPr sz="2000" kern="1200">
+                <a:solidFill>
+                  <a:schemeClr val="tx1"/>
+                </a:solidFill>
+                <a:latin typeface="+mn-lt"/>
+                <a:ea typeface="+mn-ea"/>
+                <a:cs typeface="+mn-cs"/>
+              </a:defRPr>
+            </a:lvl4pPr>
+            <a:lvl5pPr marL="2057400" indent="-228600" algn="l" defTabSz="914400" rtl="0" eaLnBrk="1" latinLnBrk="0" hangingPunct="1">
+              <a:spcBef>
+                <a:spcPct val="20000"/>
+              </a:spcBef>
+              <a:buFont typeface="Arial" pitchFamily="34" charset="0"/>
+              <a:buChar char="»"/>
+              <a:defRPr sz="2000" kern="1200">
+                <a:solidFill>
+                  <a:schemeClr val="tx1"/>
+                </a:solidFill>
+                <a:latin typeface="+mn-lt"/>
+                <a:ea typeface="+mn-ea"/>
+                <a:cs typeface="+mn-cs"/>
+              </a:defRPr>
+            </a:lvl5pPr>
+            <a:lvl6pPr marL="2514600" indent="-228600" algn="l" defTabSz="914400" rtl="0" eaLnBrk="1" latinLnBrk="0" hangingPunct="1">
+              <a:spcBef>
+                <a:spcPct val="20000"/>
+              </a:spcBef>
+              <a:buFont typeface="Arial" pitchFamily="34" charset="0"/>
+              <a:buChar char="•"/>
+              <a:defRPr sz="2000" kern="1200">
+                <a:solidFill>
+                  <a:schemeClr val="tx1"/>
+                </a:solidFill>
+                <a:latin typeface="+mn-lt"/>
+                <a:ea typeface="+mn-ea"/>
+                <a:cs typeface="+mn-cs"/>
+              </a:defRPr>
+            </a:lvl6pPr>
+            <a:lvl7pPr marL="2971800" indent="-228600" algn="l" defTabSz="914400" rtl="0" eaLnBrk="1" latinLnBrk="0" hangingPunct="1">
+              <a:spcBef>
+                <a:spcPct val="20000"/>
+              </a:spcBef>
+              <a:buFont typeface="Arial" pitchFamily="34" charset="0"/>
+              <a:buChar char="•"/>
+              <a:defRPr sz="2000" kern="1200">
+                <a:solidFill>
+                  <a:schemeClr val="tx1"/>
+                </a:solidFill>
+                <a:latin typeface="+mn-lt"/>
+                <a:ea typeface="+mn-ea"/>
+                <a:cs typeface="+mn-cs"/>
+              </a:defRPr>
+            </a:lvl7pPr>
+            <a:lvl8pPr marL="3429000" indent="-228600" algn="l" defTabSz="914400" rtl="0" eaLnBrk="1" latinLnBrk="0" hangingPunct="1">
+              <a:spcBef>
+                <a:spcPct val="20000"/>
+              </a:spcBef>
+              <a:buFont typeface="Arial" pitchFamily="34" charset="0"/>
+              <a:buChar char="•"/>
+              <a:defRPr sz="2000" kern="1200">
+                <a:solidFill>
+                  <a:schemeClr val="tx1"/>
+                </a:solidFill>
+                <a:latin typeface="+mn-lt"/>
+                <a:ea typeface="+mn-ea"/>
+                <a:cs typeface="+mn-cs"/>
+              </a:defRPr>
+            </a:lvl8pPr>
+            <a:lvl9pPr marL="3886200" indent="-228600" algn="l" defTabSz="914400" rtl="0" eaLnBrk="1" latinLnBrk="0" hangingPunct="1">
+              <a:spcBef>
+                <a:spcPct val="20000"/>
+              </a:spcBef>
+              <a:buFont typeface="Arial" pitchFamily="34" charset="0"/>
+              <a:buChar char="•"/>
+              <a:defRPr sz="2000" kern="1200">
+                <a:solidFill>
+                  <a:schemeClr val="tx1"/>
+                </a:solidFill>
+                <a:latin typeface="+mn-lt"/>
+                <a:ea typeface="+mn-ea"/>
+                <a:cs typeface="+mn-cs"/>
+              </a:defRPr>
+            </a:lvl9pPr>
+          </a:lstStyle>
           <a:p>
             <a:pPr marL="0" indent="0">
+              <a:buFont typeface="Arial" pitchFamily="34" charset="0"/>
               <a:buNone/>
             </a:pPr>
-            <a:endParaRPr lang="ru-RU" dirty="0"/>
-          </a:p>
-          <a:p>
-            <a:pPr marL="0" indent="0">
-              <a:buNone/>
-            </a:pPr>
-            <a:r>
-              <a:rPr lang="en-US" sz="1600" dirty="0" err="1">
+            <a:r>
+              <a:rPr lang="ru-RU" sz="2800" dirty="0"/>
+              <a:t>п</a:t>
+            </a:r>
+            <a:r>
+              <a:rPr lang="ru-RU" sz="2800" dirty="0" smtClean="0"/>
+              <a:t>реобразуется компилятором в (один из вариантов):</a:t>
+            </a:r>
+            <a:endParaRPr lang="ru-RU" sz="2800" dirty="0"/>
+          </a:p>
+        </p:txBody>
+      </p:sp>
+      <p:sp>
+        <p:nvSpPr>
+          <p:cNvPr id="9" name="Rectangle 8"/>
+          <p:cNvSpPr/>
+          <p:nvPr/>
+        </p:nvSpPr>
+        <p:spPr>
+          <a:xfrm>
+            <a:off x="457200" y="3457599"/>
+            <a:ext cx="8229600" cy="2893100"/>
+          </a:xfrm>
+          <a:prstGeom prst="rect">
+            <a:avLst/>
+          </a:prstGeom>
+          <a:solidFill>
+            <a:schemeClr val="bg1"/>
+          </a:solidFill>
+        </p:spPr>
+        <p:txBody>
+          <a:bodyPr wrap="square">
+            <a:spAutoFit/>
+          </a:bodyPr>
+          <a:lstStyle/>
+          <a:p>
+            <a:r>
+              <a:rPr lang="en-US" sz="1400" dirty="0">
+                <a:solidFill>
+                  <a:srgbClr val="000000"/>
+                </a:solidFill>
                 <a:latin typeface="Consolas" panose="020B0609020204030204" pitchFamily="49" charset="0"/>
-                <a:cs typeface="Consolas" panose="020B0609020204030204" pitchFamily="49" charset="0"/>
               </a:rPr>
-              <a:t>GCSettings.LargeObjectHeapCompactionMode</a:t>
-            </a:r>
-            <a:r>
-              <a:rPr lang="en-US" sz="1600" dirty="0">
+              <a:t>E enumerator = (collection).GetEnumerator();</a:t>
+            </a:r>
+          </a:p>
+          <a:p>
+            <a:r>
+              <a:rPr lang="en-US" sz="1400" dirty="0">
+                <a:solidFill>
+                  <a:srgbClr val="0000FF"/>
+                </a:solidFill>
                 <a:latin typeface="Consolas" panose="020B0609020204030204" pitchFamily="49" charset="0"/>
-                <a:cs typeface="Consolas" panose="020B0609020204030204" pitchFamily="49" charset="0"/>
               </a:rPr>
-              <a:t> </a:t>
-            </a:r>
-            <a:r>
-              <a:rPr lang="en-US" sz="1600" dirty="0" smtClean="0">
+              <a:t>try</a:t>
+            </a:r>
+            <a:endParaRPr lang="en-US" sz="1400" dirty="0">
+              <a:solidFill>
+                <a:srgbClr val="000000"/>
+              </a:solidFill>
+              <a:latin typeface="Consolas" panose="020B0609020204030204" pitchFamily="49" charset="0"/>
+            </a:endParaRPr>
+          </a:p>
+          <a:p>
+            <a:r>
+              <a:rPr lang="ru-RU" sz="1400" dirty="0">
+                <a:solidFill>
+                  <a:srgbClr val="000000"/>
+                </a:solidFill>
                 <a:latin typeface="Consolas" panose="020B0609020204030204" pitchFamily="49" charset="0"/>
-                <a:cs typeface="Consolas" panose="020B0609020204030204" pitchFamily="49" charset="0"/>
               </a:rPr>
-              <a:t>=</a:t>
-            </a:r>
-            <a:br>
-              <a:rPr lang="en-US" sz="1600" dirty="0" smtClean="0">
+              <a:t>{</a:t>
+            </a:r>
+          </a:p>
+          <a:p>
+            <a:r>
+              <a:rPr lang="en-US" sz="1400" dirty="0">
+                <a:solidFill>
+                  <a:srgbClr val="000000"/>
+                </a:solidFill>
                 <a:latin typeface="Consolas" panose="020B0609020204030204" pitchFamily="49" charset="0"/>
-                <a:cs typeface="Consolas" panose="020B0609020204030204" pitchFamily="49" charset="0"/>
               </a:rPr>
-            </a:br>
-            <a:r>
-              <a:rPr lang="en-US" sz="1600" dirty="0" smtClean="0">
+              <a:t>    </a:t>
+            </a:r>
+            <a:r>
+              <a:rPr lang="en-US" sz="1400" dirty="0">
+                <a:solidFill>
+                  <a:srgbClr val="0000FF"/>
+                </a:solidFill>
                 <a:latin typeface="Consolas" panose="020B0609020204030204" pitchFamily="49" charset="0"/>
-                <a:cs typeface="Consolas" panose="020B0609020204030204" pitchFamily="49" charset="0"/>
               </a:rPr>
-              <a:t>              </a:t>
-            </a:r>
-            <a:r>
-              <a:rPr lang="en-US" sz="1600" dirty="0" err="1" smtClean="0">
+              <a:t>while</a:t>
+            </a:r>
+            <a:r>
+              <a:rPr lang="en-US" sz="1400" dirty="0">
+                <a:solidFill>
+                  <a:srgbClr val="000000"/>
+                </a:solidFill>
                 <a:latin typeface="Consolas" panose="020B0609020204030204" pitchFamily="49" charset="0"/>
-                <a:cs typeface="Consolas" panose="020B0609020204030204" pitchFamily="49" charset="0"/>
               </a:rPr>
-              <a:t>GCLargeObjectHeapCompactionMode.CompactOnce</a:t>
-            </a:r>
-            <a:r>
-              <a:rPr lang="en-US" sz="1600" dirty="0" smtClean="0">
+              <a:t> (enumerator.MoveNext())</a:t>
+            </a:r>
+          </a:p>
+          <a:p>
+            <a:r>
+              <a:rPr lang="ru-RU" sz="1400" dirty="0">
+                <a:solidFill>
+                  <a:srgbClr val="000000"/>
+                </a:solidFill>
                 <a:latin typeface="Consolas" panose="020B0609020204030204" pitchFamily="49" charset="0"/>
-                <a:cs typeface="Consolas" panose="020B0609020204030204" pitchFamily="49" charset="0"/>
               </a:rPr>
-              <a:t>;</a:t>
-            </a:r>
-            <a:r>
-              <a:rPr lang="ru-RU" sz="1600" dirty="0" smtClean="0">
+              <a:t>    {</a:t>
+            </a:r>
+          </a:p>
+          <a:p>
+            <a:r>
+              <a:rPr lang="en-US" sz="1400" dirty="0">
+                <a:solidFill>
+                  <a:srgbClr val="000000"/>
+                </a:solidFill>
                 <a:latin typeface="Consolas" panose="020B0609020204030204" pitchFamily="49" charset="0"/>
-                <a:cs typeface="Consolas" panose="020B0609020204030204" pitchFamily="49" charset="0"/>
               </a:rPr>
-              <a:t/>
-            </a:r>
-            <a:br>
-              <a:rPr lang="ru-RU" sz="1600" dirty="0" smtClean="0">
+              <a:t>        ElementType element = (ElementType)enumerator.Current;</a:t>
+            </a:r>
+          </a:p>
+          <a:p>
+            <a:r>
+              <a:rPr lang="en-US" sz="1400" dirty="0">
+                <a:solidFill>
+                  <a:srgbClr val="000000"/>
+                </a:solidFill>
                 <a:latin typeface="Consolas" panose="020B0609020204030204" pitchFamily="49" charset="0"/>
-                <a:cs typeface="Consolas" panose="020B0609020204030204" pitchFamily="49" charset="0"/>
               </a:rPr>
-            </a:br>
-            <a:r>
-              <a:rPr lang="en-US" sz="1600" dirty="0" err="1" smtClean="0">
+              <a:t>        statement;</a:t>
+            </a:r>
+          </a:p>
+          <a:p>
+            <a:r>
+              <a:rPr lang="ru-RU" sz="1400" dirty="0">
+                <a:solidFill>
+                  <a:srgbClr val="000000"/>
+                </a:solidFill>
                 <a:latin typeface="Consolas" panose="020B0609020204030204" pitchFamily="49" charset="0"/>
-                <a:cs typeface="Consolas" panose="020B0609020204030204" pitchFamily="49" charset="0"/>
               </a:rPr>
-              <a:t>GC.Collect</a:t>
-            </a:r>
-            <a:r>
-              <a:rPr lang="en-US" sz="1600" dirty="0" smtClean="0">
+              <a:t>    }</a:t>
+            </a:r>
+          </a:p>
+          <a:p>
+            <a:r>
+              <a:rPr lang="ru-RU" sz="1400" dirty="0">
+                <a:solidFill>
+                  <a:srgbClr val="000000"/>
+                </a:solidFill>
                 <a:latin typeface="Consolas" panose="020B0609020204030204" pitchFamily="49" charset="0"/>
-                <a:cs typeface="Consolas" panose="020B0609020204030204" pitchFamily="49" charset="0"/>
               </a:rPr>
-              <a:t>();</a:t>
-            </a:r>
-            <a:endParaRPr lang="ru-RU" sz="1600" dirty="0" smtClean="0">
+              <a:t>}</a:t>
+            </a:r>
+          </a:p>
+          <a:p>
+            <a:r>
+              <a:rPr lang="en-US" sz="1400" dirty="0">
+                <a:solidFill>
+                  <a:srgbClr val="0000FF"/>
+                </a:solidFill>
+                <a:latin typeface="Consolas" panose="020B0609020204030204" pitchFamily="49" charset="0"/>
+              </a:rPr>
+              <a:t>finally</a:t>
+            </a:r>
+            <a:endParaRPr lang="en-US" sz="1400" dirty="0">
+              <a:solidFill>
+                <a:srgbClr val="000000"/>
+              </a:solidFill>
               <a:latin typeface="Consolas" panose="020B0609020204030204" pitchFamily="49" charset="0"/>
-              <a:cs typeface="Consolas" panose="020B0609020204030204" pitchFamily="49" charset="0"/>
             </a:endParaRPr>
           </a:p>
           <a:p>
-            <a:pPr marL="0" indent="0">
-              <a:buNone/>
-            </a:pPr>
-            <a:endParaRPr lang="ru-RU" dirty="0"/>
-          </a:p>
-          <a:p>
-            <a:pPr marL="0" indent="0">
-              <a:buNone/>
-            </a:pPr>
-            <a:r>
-              <a:rPr lang="ru-RU" dirty="0" smtClean="0"/>
-              <a:t>После полной сборки мусора свойство </a:t>
-            </a:r>
-            <a:r>
-              <a:rPr lang="en-US" dirty="0" err="1" smtClean="0"/>
-              <a:t>LargeObjectHeapCompactionMode</a:t>
-            </a:r>
-            <a:r>
-              <a:rPr lang="ru-RU" dirty="0" smtClean="0"/>
-              <a:t> принимает значение </a:t>
-            </a:r>
-            <a:r>
-              <a:rPr lang="en-US" dirty="0" smtClean="0"/>
-              <a:t>Default.</a:t>
-            </a:r>
-            <a:endParaRPr lang="ru-RU" dirty="0"/>
+            <a:r>
+              <a:rPr lang="ru-RU" sz="1400" dirty="0">
+                <a:solidFill>
+                  <a:srgbClr val="000000"/>
+                </a:solidFill>
+                <a:latin typeface="Consolas" panose="020B0609020204030204" pitchFamily="49" charset="0"/>
+              </a:rPr>
+              <a:t>{</a:t>
+            </a:r>
+          </a:p>
+          <a:p>
+            <a:r>
+              <a:rPr lang="en-US" sz="1400" dirty="0" smtClean="0">
+                <a:solidFill>
+                  <a:srgbClr val="000000"/>
+                </a:solidFill>
+                <a:latin typeface="Consolas" panose="020B0609020204030204" pitchFamily="49" charset="0"/>
+              </a:rPr>
+              <a:t>    </a:t>
+            </a:r>
+            <a:r>
+              <a:rPr lang="en-US" sz="1400" dirty="0" smtClean="0">
+                <a:solidFill>
+                  <a:srgbClr val="0000FF"/>
+                </a:solidFill>
+                <a:latin typeface="Consolas" panose="020B0609020204030204" pitchFamily="49" charset="0"/>
+              </a:rPr>
+              <a:t>if</a:t>
+            </a:r>
+            <a:r>
+              <a:rPr lang="en-US" sz="1400" dirty="0" smtClean="0">
+                <a:solidFill>
+                  <a:srgbClr val="000000"/>
+                </a:solidFill>
+                <a:latin typeface="Consolas" panose="020B0609020204030204" pitchFamily="49" charset="0"/>
+              </a:rPr>
+              <a:t> (enumerator != </a:t>
+            </a:r>
+            <a:r>
+              <a:rPr lang="en-US" sz="1400" dirty="0" smtClean="0">
+                <a:solidFill>
+                  <a:srgbClr val="0000FF"/>
+                </a:solidFill>
+                <a:latin typeface="Consolas" panose="020B0609020204030204" pitchFamily="49" charset="0"/>
+              </a:rPr>
+              <a:t>null</a:t>
+            </a:r>
+            <a:r>
+              <a:rPr lang="en-US" sz="1400" dirty="0" smtClean="0">
+                <a:solidFill>
+                  <a:srgbClr val="000000"/>
+                </a:solidFill>
+                <a:latin typeface="Consolas" panose="020B0609020204030204" pitchFamily="49" charset="0"/>
+              </a:rPr>
+              <a:t>) (</a:t>
+            </a:r>
+            <a:r>
+              <a:rPr lang="ru-RU" sz="1400" dirty="0" smtClean="0">
+                <a:solidFill>
+                  <a:srgbClr val="000000"/>
+                </a:solidFill>
+                <a:latin typeface="Consolas" panose="020B0609020204030204" pitchFamily="49" charset="0"/>
+              </a:rPr>
+              <a:t>(</a:t>
+            </a:r>
+            <a:r>
+              <a:rPr lang="en-US" sz="1400" dirty="0" smtClean="0">
+                <a:solidFill>
+                  <a:srgbClr val="000000"/>
+                </a:solidFill>
+                <a:latin typeface="Consolas" panose="020B0609020204030204" pitchFamily="49" charset="0"/>
+              </a:rPr>
+              <a:t>System.</a:t>
+            </a:r>
+            <a:r>
+              <a:rPr lang="en-US" sz="1400" dirty="0" smtClean="0">
+                <a:solidFill>
+                  <a:srgbClr val="2B91AF"/>
+                </a:solidFill>
+                <a:latin typeface="Consolas" panose="020B0609020204030204" pitchFamily="49" charset="0"/>
+              </a:rPr>
+              <a:t>IDisposable</a:t>
+            </a:r>
+            <a:r>
+              <a:rPr lang="ru-RU" sz="1400" dirty="0" smtClean="0">
+                <a:solidFill>
+                  <a:srgbClr val="000000"/>
+                </a:solidFill>
+                <a:latin typeface="Consolas" panose="020B0609020204030204" pitchFamily="49" charset="0"/>
+              </a:rPr>
+              <a:t>)</a:t>
+            </a:r>
+            <a:r>
+              <a:rPr lang="en-US" sz="1400" dirty="0" smtClean="0">
+                <a:solidFill>
+                  <a:srgbClr val="000000"/>
+                </a:solidFill>
+                <a:latin typeface="Consolas" panose="020B0609020204030204" pitchFamily="49" charset="0"/>
+              </a:rPr>
+              <a:t> enumerator).Dispose();</a:t>
+            </a:r>
+          </a:p>
+          <a:p>
+            <a:r>
+              <a:rPr lang="ru-RU" sz="1400" dirty="0" smtClean="0">
+                <a:solidFill>
+                  <a:srgbClr val="000000"/>
+                </a:solidFill>
+                <a:latin typeface="Consolas" panose="020B0609020204030204" pitchFamily="49" charset="0"/>
+              </a:rPr>
+              <a:t>}</a:t>
+            </a:r>
+            <a:endParaRPr lang="ru-RU" sz="1400" dirty="0"/>
+          </a:p>
+        </p:txBody>
+      </p:sp>
+      <p:sp>
+        <p:nvSpPr>
+          <p:cNvPr id="10" name="TextBox 9"/>
+          <p:cNvSpPr txBox="1"/>
+          <p:nvPr/>
+        </p:nvSpPr>
+        <p:spPr>
+          <a:xfrm>
+            <a:off x="457200" y="6453336"/>
+            <a:ext cx="8229600" cy="307777"/>
+          </a:xfrm>
+          <a:prstGeom prst="rect">
+            <a:avLst/>
+          </a:prstGeom>
+          <a:noFill/>
+        </p:spPr>
+        <p:txBody>
+          <a:bodyPr wrap="square" rtlCol="0">
+            <a:spAutoFit/>
+          </a:bodyPr>
+          <a:lstStyle/>
+          <a:p>
+            <a:r>
+              <a:rPr lang="ru-RU" sz="1400" dirty="0" smtClean="0">
+                <a:solidFill>
+                  <a:srgbClr val="FFFF00"/>
+                </a:solidFill>
+              </a:rPr>
+              <a:t>Подробности см. в спецификации </a:t>
+            </a:r>
+            <a:r>
+              <a:rPr lang="en-US" sz="1400" dirty="0" smtClean="0">
+                <a:solidFill>
+                  <a:srgbClr val="FFFF00"/>
+                </a:solidFill>
+              </a:rPr>
+              <a:t>C# </a:t>
+            </a:r>
+            <a:r>
+              <a:rPr lang="ru-RU" sz="1400" dirty="0" smtClean="0">
+                <a:solidFill>
+                  <a:srgbClr val="FFFF00"/>
+                </a:solidFill>
+              </a:rPr>
+              <a:t>- §8</a:t>
+            </a:r>
+            <a:r>
+              <a:rPr lang="en-US" sz="1400" dirty="0" smtClean="0">
+                <a:solidFill>
+                  <a:srgbClr val="FFFF00"/>
+                </a:solidFill>
+              </a:rPr>
+              <a:t>.8.4 The foreach statement</a:t>
+            </a:r>
+            <a:endParaRPr lang="ru-RU" sz="1400" dirty="0" smtClean="0">
+              <a:solidFill>
+                <a:srgbClr val="FFFF00"/>
+              </a:solidFill>
+            </a:endParaRPr>
           </a:p>
         </p:txBody>
       </p:sp>
     </p:spTree>
     <p:extLst>
       <p:ext uri="{BB962C8B-B14F-4D97-AF65-F5344CB8AC3E}">
-        <p14:creationId xmlns:p14="http://schemas.microsoft.com/office/powerpoint/2010/main" val="4119858216"/>
+        <p14:creationId xmlns:p14="http://schemas.microsoft.com/office/powerpoint/2010/main" val="202138129"/>
       </p:ext>
     </p:extLst>
   </p:cSld>
@@ -11405,16 +11953,21 @@
         </p:nvSpPr>
         <p:spPr/>
         <p:txBody>
-          <a:bodyPr/>
+          <a:bodyPr>
+            <a:normAutofit fontScale="90000"/>
+          </a:bodyPr>
           <a:lstStyle/>
           <a:p>
             <a:r>
               <a:rPr lang="ru-RU" dirty="0" smtClean="0"/>
-              <a:t>Временный запрет </a:t>
-            </a:r>
+              <a:t>Куча для больших объектов</a:t>
+            </a:r>
+            <a:br>
+              <a:rPr lang="ru-RU" dirty="0" smtClean="0"/>
+            </a:br>
             <a:r>
               <a:rPr lang="en-US" dirty="0" smtClean="0"/>
-              <a:t>GC (.NET 4.6+)</a:t>
+              <a:t>(Large Object Heap – LOH)</a:t>
             </a:r>
             <a:endParaRPr lang="ru-RU" dirty="0"/>
           </a:p>
@@ -11432,67 +11985,26 @@
         </p:nvSpPr>
         <p:spPr/>
         <p:txBody>
-          <a:bodyPr/>
+          <a:bodyPr>
+            <a:normAutofit fontScale="92500" lnSpcReduction="10000"/>
+          </a:bodyPr>
           <a:lstStyle/>
           <a:p>
-            <a:pPr marL="0" indent="0">
-              <a:buNone/>
-            </a:pPr>
             <a:r>
               <a:rPr lang="ru-RU" dirty="0" smtClean="0"/>
-              <a:t>В </a:t>
-            </a:r>
-            <a:r>
-              <a:rPr lang="en-US" dirty="0" smtClean="0"/>
-              <a:t>.NET 4.6 </a:t>
-            </a:r>
+              <a:t>Объекты с размером примерно больше 85 килобайт находятся в отдельной куче</a:t>
+            </a:r>
+          </a:p>
+          <a:p>
             <a:r>
               <a:rPr lang="ru-RU" dirty="0" smtClean="0"/>
-              <a:t>были добавлены методы</a:t>
-            </a:r>
-            <a:endParaRPr lang="en-US" dirty="0" smtClean="0"/>
-          </a:p>
-          <a:p>
-            <a:r>
-              <a:rPr lang="en-US" dirty="0" err="1" smtClean="0"/>
-              <a:t>GC.TryStartNoGCRegion</a:t>
-            </a:r>
+              <a:t>Данная куча не дефрагментируется т.к. это бы создало большую нагрузку. Фрагментация может возникнуть при интенсивном использовании памяти (сотни мегабайт) и программа выделяет большие временные объекты.</a:t>
+            </a:r>
+          </a:p>
+          <a:p>
             <a:r>
               <a:rPr lang="ru-RU" dirty="0" smtClean="0"/>
-              <a:t>(</a:t>
-            </a:r>
-            <a:r>
-              <a:rPr lang="en-US" dirty="0" smtClean="0"/>
-              <a:t>long </a:t>
-            </a:r>
-            <a:r>
-              <a:rPr lang="en-US" dirty="0" err="1" smtClean="0"/>
-              <a:t>totalSize</a:t>
-            </a:r>
-            <a:r>
-              <a:rPr lang="ru-RU" dirty="0" smtClean="0"/>
-              <a:t>)</a:t>
-            </a:r>
-            <a:endParaRPr lang="en-US" dirty="0" smtClean="0"/>
-          </a:p>
-          <a:p>
-            <a:r>
-              <a:rPr lang="en-US" dirty="0" err="1" smtClean="0"/>
-              <a:t>GC.EndNoGCRegion</a:t>
-            </a:r>
-            <a:r>
-              <a:rPr lang="ru-RU" dirty="0" smtClean="0"/>
-              <a:t>()</a:t>
-            </a:r>
-            <a:endParaRPr lang="en-US" dirty="0" smtClean="0"/>
-          </a:p>
-          <a:p>
-            <a:pPr marL="0" indent="0">
-              <a:buNone/>
-            </a:pPr>
-            <a:r>
-              <a:rPr lang="ru-RU" dirty="0" smtClean="0"/>
-              <a:t>для временного запрета сборки мусора при условии наличия указанного объема памяти.</a:t>
+              <a:t>Объекты в данной куче считаются принадлежащими второму поколению</a:t>
             </a:r>
             <a:endParaRPr lang="ru-RU" dirty="0"/>
           </a:p>
@@ -11501,13 +12013,20 @@
     </p:spTree>
     <p:extLst>
       <p:ext uri="{BB962C8B-B14F-4D97-AF65-F5344CB8AC3E}">
-        <p14:creationId xmlns:p14="http://schemas.microsoft.com/office/powerpoint/2010/main" val="812672197"/>
+        <p14:creationId xmlns:p14="http://schemas.microsoft.com/office/powerpoint/2010/main" val="3103245170"/>
       </p:ext>
     </p:extLst>
   </p:cSld>
   <p:clrMapOvr>
     <a:masterClrMapping/>
   </p:clrMapOvr>
+  <p:timing>
+    <p:tnLst>
+      <p:par>
+        <p:cTn id="1" dur="indefinite" restart="never" nodeType="tmRoot"/>
+      </p:par>
+    </p:tnLst>
+  </p:timing>
 </p:sld>
 </file>
 
@@ -11540,24 +12059,33 @@
         </p:nvSpPr>
         <p:spPr/>
         <p:txBody>
-          <a:bodyPr/>
+          <a:bodyPr>
+            <a:normAutofit fontScale="90000"/>
+          </a:bodyPr>
           <a:lstStyle/>
           <a:p>
             <a:r>
+              <a:rPr lang="en-US" dirty="0" smtClean="0"/>
+              <a:t>Large Object Heap </a:t>
+            </a:r>
+            <a:r>
               <a:rPr lang="ru-RU" dirty="0" smtClean="0"/>
-              <a:t>Конфигурация </a:t>
+              <a:t>в </a:t>
             </a:r>
             <a:r>
               <a:rPr lang="en-US" dirty="0" smtClean="0"/>
-              <a:t>Debug </a:t>
+              <a:t>.NET 4.5.1</a:t>
             </a:r>
             <a:r>
               <a:rPr lang="ru-RU" dirty="0" smtClean="0"/>
-              <a:t>и </a:t>
-            </a:r>
-            <a:r>
-              <a:rPr lang="en-US" dirty="0" smtClean="0"/>
-              <a:t>GC</a:t>
+              <a:t/>
+            </a:r>
+            <a:br>
+              <a:rPr lang="ru-RU" dirty="0" smtClean="0"/>
+            </a:br>
+            <a:r>
+              <a:rPr lang="ru-RU" dirty="0" smtClean="0"/>
+              <a:t>и выше</a:t>
             </a:r>
             <a:endParaRPr lang="ru-RU" dirty="0"/>
           </a:p>
@@ -11575,7 +12103,9 @@
         </p:nvSpPr>
         <p:spPr/>
         <p:txBody>
-          <a:bodyPr/>
+          <a:bodyPr>
+            <a:normAutofit lnSpcReduction="10000"/>
+          </a:bodyPr>
           <a:lstStyle/>
           <a:p>
             <a:pPr marL="0" indent="0">
@@ -11583,35 +12113,132 @@
             </a:pPr>
             <a:r>
               <a:rPr lang="ru-RU" dirty="0" smtClean="0"/>
-              <a:t>При компиляции проекта в конфигурации </a:t>
+              <a:t>Добавлена возможность дефрагментации </a:t>
             </a:r>
             <a:r>
               <a:rPr lang="en-US" dirty="0" smtClean="0"/>
-              <a:t>Debug </a:t>
+              <a:t>LOH </a:t>
             </a:r>
             <a:r>
               <a:rPr lang="ru-RU" dirty="0" smtClean="0"/>
-              <a:t>к сборке добавляется атрибут </a:t>
+              <a:t>по запросу.</a:t>
+            </a:r>
+          </a:p>
+          <a:p>
+            <a:pPr marL="0" indent="0">
+              <a:buNone/>
+            </a:pPr>
+            <a:endParaRPr lang="ru-RU" dirty="0"/>
+          </a:p>
+          <a:p>
+            <a:pPr marL="0" indent="0">
+              <a:buNone/>
+            </a:pPr>
+            <a:r>
+              <a:rPr lang="en-US" sz="1600" dirty="0" err="1">
+                <a:latin typeface="Consolas" panose="020B0609020204030204" pitchFamily="49" charset="0"/>
+                <a:cs typeface="Consolas" panose="020B0609020204030204" pitchFamily="49" charset="0"/>
+              </a:rPr>
+              <a:t>GCSettings.LargeObjectHeapCompactionMode</a:t>
+            </a:r>
+            <a:r>
+              <a:rPr lang="en-US" sz="1600" dirty="0">
+                <a:latin typeface="Consolas" panose="020B0609020204030204" pitchFamily="49" charset="0"/>
+                <a:cs typeface="Consolas" panose="020B0609020204030204" pitchFamily="49" charset="0"/>
+              </a:rPr>
+              <a:t> </a:t>
+            </a:r>
+            <a:r>
+              <a:rPr lang="en-US" sz="1600" dirty="0" smtClean="0">
+                <a:latin typeface="Consolas" panose="020B0609020204030204" pitchFamily="49" charset="0"/>
+                <a:cs typeface="Consolas" panose="020B0609020204030204" pitchFamily="49" charset="0"/>
+              </a:rPr>
+              <a:t>=</a:t>
+            </a:r>
+            <a:br>
+              <a:rPr lang="en-US" sz="1600" dirty="0" smtClean="0">
+                <a:latin typeface="Consolas" panose="020B0609020204030204" pitchFamily="49" charset="0"/>
+                <a:cs typeface="Consolas" panose="020B0609020204030204" pitchFamily="49" charset="0"/>
+              </a:rPr>
+            </a:br>
+            <a:r>
+              <a:rPr lang="en-US" sz="1600" dirty="0" smtClean="0">
+                <a:latin typeface="Consolas" panose="020B0609020204030204" pitchFamily="49" charset="0"/>
+                <a:cs typeface="Consolas" panose="020B0609020204030204" pitchFamily="49" charset="0"/>
+              </a:rPr>
+              <a:t>              </a:t>
+            </a:r>
+            <a:r>
+              <a:rPr lang="en-US" sz="1600" dirty="0" err="1" smtClean="0">
+                <a:latin typeface="Consolas" panose="020B0609020204030204" pitchFamily="49" charset="0"/>
+                <a:cs typeface="Consolas" panose="020B0609020204030204" pitchFamily="49" charset="0"/>
+              </a:rPr>
+              <a:t>GCLargeObjectHeapCompactionMode.CompactOnce</a:t>
+            </a:r>
+            <a:r>
+              <a:rPr lang="en-US" sz="1600" dirty="0" smtClean="0">
+                <a:latin typeface="Consolas" panose="020B0609020204030204" pitchFamily="49" charset="0"/>
+                <a:cs typeface="Consolas" panose="020B0609020204030204" pitchFamily="49" charset="0"/>
+              </a:rPr>
+              <a:t>;</a:t>
+            </a:r>
+            <a:r>
+              <a:rPr lang="ru-RU" sz="1600" dirty="0" smtClean="0">
+                <a:latin typeface="Consolas" panose="020B0609020204030204" pitchFamily="49" charset="0"/>
+                <a:cs typeface="Consolas" panose="020B0609020204030204" pitchFamily="49" charset="0"/>
+              </a:rPr>
+              <a:t/>
+            </a:r>
+            <a:br>
+              <a:rPr lang="ru-RU" sz="1600" dirty="0" smtClean="0">
+                <a:latin typeface="Consolas" panose="020B0609020204030204" pitchFamily="49" charset="0"/>
+                <a:cs typeface="Consolas" panose="020B0609020204030204" pitchFamily="49" charset="0"/>
+              </a:rPr>
+            </a:br>
+            <a:r>
+              <a:rPr lang="en-US" sz="1600" dirty="0" err="1" smtClean="0">
+                <a:latin typeface="Consolas" panose="020B0609020204030204" pitchFamily="49" charset="0"/>
+                <a:cs typeface="Consolas" panose="020B0609020204030204" pitchFamily="49" charset="0"/>
+              </a:rPr>
+              <a:t>GC.Collect</a:t>
+            </a:r>
+            <a:r>
+              <a:rPr lang="en-US" sz="1600" dirty="0" smtClean="0">
+                <a:latin typeface="Consolas" panose="020B0609020204030204" pitchFamily="49" charset="0"/>
+                <a:cs typeface="Consolas" panose="020B0609020204030204" pitchFamily="49" charset="0"/>
+              </a:rPr>
+              <a:t>();</a:t>
+            </a:r>
+            <a:endParaRPr lang="ru-RU" sz="1600" dirty="0" smtClean="0">
+              <a:latin typeface="Consolas" panose="020B0609020204030204" pitchFamily="49" charset="0"/>
+              <a:cs typeface="Consolas" panose="020B0609020204030204" pitchFamily="49" charset="0"/>
+            </a:endParaRPr>
+          </a:p>
+          <a:p>
+            <a:pPr marL="0" indent="0">
+              <a:buNone/>
+            </a:pPr>
+            <a:endParaRPr lang="ru-RU" dirty="0"/>
+          </a:p>
+          <a:p>
+            <a:pPr marL="0" indent="0">
+              <a:buNone/>
+            </a:pPr>
+            <a:r>
+              <a:rPr lang="ru-RU" dirty="0" smtClean="0"/>
+              <a:t>После полной сборки мусора свойство </a:t>
             </a:r>
             <a:r>
               <a:rPr lang="en-US" dirty="0" err="1" smtClean="0"/>
-              <a:t>DebuggableAttribute</a:t>
+              <a:t>LargeObjectHeapCompactionMode</a:t>
             </a:r>
             <a:r>
               <a:rPr lang="ru-RU" dirty="0" smtClean="0"/>
-              <a:t>	который дает команду </a:t>
+              <a:t> принимает значение </a:t>
             </a:r>
             <a:r>
               <a:rPr lang="en-US" dirty="0" smtClean="0"/>
-              <a:t>GC </a:t>
-            </a:r>
-            <a:r>
-              <a:rPr lang="ru-RU" dirty="0" smtClean="0"/>
-              <a:t>исскуственно продлевать время жизни локальных переменных до завершения метода. </a:t>
-            </a:r>
-            <a:r>
-              <a:rPr lang="ru-RU" smtClean="0"/>
-              <a:t>Это сделано чтобы программист мог без помех заниматься отладкой.</a:t>
+              <a:t>Default.</a:t>
             </a:r>
             <a:endParaRPr lang="ru-RU" dirty="0"/>
           </a:p>
@@ -11620,7 +12247,7 @@
     </p:spTree>
     <p:extLst>
       <p:ext uri="{BB962C8B-B14F-4D97-AF65-F5344CB8AC3E}">
-        <p14:creationId xmlns:p14="http://schemas.microsoft.com/office/powerpoint/2010/main" val="1960211568"/>
+        <p14:creationId xmlns:p14="http://schemas.microsoft.com/office/powerpoint/2010/main" val="4119858216"/>
       </p:ext>
     </p:extLst>
   </p:cSld>
@@ -11661,7 +12288,7 @@
             <a:spLocks noGrp="1"/>
           </p:cNvSpPr>
           <p:nvPr>
-            <p:ph type="ctrTitle"/>
+            <p:ph type="title"/>
           </p:nvPr>
         </p:nvSpPr>
         <p:spPr/>
@@ -11671,7 +12298,11 @@
           <a:p>
             <a:r>
               <a:rPr lang="ru-RU" dirty="0" smtClean="0"/>
-              <a:t>Эффективная работа с памятью</a:t>
+              <a:t>Временный запрет </a:t>
+            </a:r>
+            <a:r>
+              <a:rPr lang="en-US" dirty="0" smtClean="0"/>
+              <a:t>GC (.NET 4.6+)</a:t>
             </a:r>
             <a:endParaRPr lang="ru-RU" dirty="0"/>
           </a:p>
@@ -11679,12 +12310,12 @@
       </p:sp>
       <p:sp>
         <p:nvSpPr>
-          <p:cNvPr id="3" name="Subtitle 2"/>
+          <p:cNvPr id="3" name="Content Placeholder 2"/>
           <p:cNvSpPr>
             <a:spLocks noGrp="1"/>
           </p:cNvSpPr>
           <p:nvPr>
-            <p:ph type="subTitle" idx="1"/>
+            <p:ph idx="1"/>
           </p:nvPr>
         </p:nvSpPr>
         <p:spPr/>
@@ -11692,27 +12323,79 @@
           <a:bodyPr/>
           <a:lstStyle/>
           <a:p>
-            <a:endParaRPr lang="ru-RU"/>
+            <a:pPr marL="0" indent="0">
+              <a:buNone/>
+            </a:pPr>
+            <a:r>
+              <a:rPr lang="ru-RU" dirty="0" smtClean="0"/>
+              <a:t>В </a:t>
+            </a:r>
+            <a:r>
+              <a:rPr lang="en-US" dirty="0" smtClean="0"/>
+              <a:t>.NET 4.6 </a:t>
+            </a:r>
+            <a:r>
+              <a:rPr lang="ru-RU" dirty="0" smtClean="0"/>
+              <a:t>были добавлены методы</a:t>
+            </a:r>
+            <a:endParaRPr lang="en-US" dirty="0" smtClean="0"/>
+          </a:p>
+          <a:p>
+            <a:r>
+              <a:rPr lang="en-US" dirty="0" err="1" smtClean="0"/>
+              <a:t>GC.TryStartNoGCRegion</a:t>
+            </a:r>
+            <a:r>
+              <a:rPr lang="ru-RU" dirty="0" smtClean="0"/>
+              <a:t>(</a:t>
+            </a:r>
+            <a:r>
+              <a:rPr lang="en-US" dirty="0" smtClean="0"/>
+              <a:t>long </a:t>
+            </a:r>
+            <a:r>
+              <a:rPr lang="en-US" dirty="0" err="1" smtClean="0"/>
+              <a:t>totalSize</a:t>
+            </a:r>
+            <a:r>
+              <a:rPr lang="ru-RU" dirty="0" smtClean="0"/>
+              <a:t>)</a:t>
+            </a:r>
+            <a:endParaRPr lang="en-US" dirty="0" smtClean="0"/>
+          </a:p>
+          <a:p>
+            <a:r>
+              <a:rPr lang="en-US" dirty="0" err="1" smtClean="0"/>
+              <a:t>GC.EndNoGCRegion</a:t>
+            </a:r>
+            <a:r>
+              <a:rPr lang="ru-RU" dirty="0" smtClean="0"/>
+              <a:t>()</a:t>
+            </a:r>
+            <a:endParaRPr lang="en-US" dirty="0" smtClean="0"/>
+          </a:p>
+          <a:p>
+            <a:pPr marL="0" indent="0">
+              <a:buNone/>
+            </a:pPr>
+            <a:r>
+              <a:rPr lang="ru-RU" dirty="0" smtClean="0"/>
+              <a:t>для временного запрета сборки мусора при условии наличия указанного объема памяти.</a:t>
+            </a:r>
+            <a:endParaRPr lang="ru-RU" dirty="0"/>
           </a:p>
         </p:txBody>
       </p:sp>
     </p:spTree>
     <p:extLst>
       <p:ext uri="{BB962C8B-B14F-4D97-AF65-F5344CB8AC3E}">
-        <p14:creationId xmlns:p14="http://schemas.microsoft.com/office/powerpoint/2010/main" val="2886455791"/>
+        <p14:creationId xmlns:p14="http://schemas.microsoft.com/office/powerpoint/2010/main" val="812672197"/>
       </p:ext>
     </p:extLst>
   </p:cSld>
   <p:clrMapOvr>
     <a:masterClrMapping/>
   </p:clrMapOvr>
-  <p:timing>
-    <p:tnLst>
-      <p:par>
-        <p:cTn id="1" dur="indefinite" restart="never" nodeType="tmRoot"/>
-      </p:par>
-    </p:tnLst>
-  </p:timing>
 </p:sld>
 </file>
 
@@ -11745,6 +12428,211 @@
         </p:nvSpPr>
         <p:spPr/>
         <p:txBody>
+          <a:bodyPr/>
+          <a:lstStyle/>
+          <a:p>
+            <a:r>
+              <a:rPr lang="ru-RU" dirty="0" smtClean="0"/>
+              <a:t>Конфигурация </a:t>
+            </a:r>
+            <a:r>
+              <a:rPr lang="en-US" dirty="0" smtClean="0"/>
+              <a:t>Debug </a:t>
+            </a:r>
+            <a:r>
+              <a:rPr lang="ru-RU" dirty="0" smtClean="0"/>
+              <a:t>и </a:t>
+            </a:r>
+            <a:r>
+              <a:rPr lang="en-US" dirty="0" smtClean="0"/>
+              <a:t>GC</a:t>
+            </a:r>
+            <a:endParaRPr lang="ru-RU" dirty="0"/>
+          </a:p>
+        </p:txBody>
+      </p:sp>
+      <p:sp>
+        <p:nvSpPr>
+          <p:cNvPr id="3" name="Content Placeholder 2"/>
+          <p:cNvSpPr>
+            <a:spLocks noGrp="1"/>
+          </p:cNvSpPr>
+          <p:nvPr>
+            <p:ph idx="1"/>
+          </p:nvPr>
+        </p:nvSpPr>
+        <p:spPr/>
+        <p:txBody>
+          <a:bodyPr/>
+          <a:lstStyle/>
+          <a:p>
+            <a:pPr marL="0" indent="0">
+              <a:buNone/>
+            </a:pPr>
+            <a:r>
+              <a:rPr lang="ru-RU" dirty="0" smtClean="0"/>
+              <a:t>При компиляции проекта в конфигурации </a:t>
+            </a:r>
+            <a:r>
+              <a:rPr lang="en-US" dirty="0" smtClean="0"/>
+              <a:t>Debug </a:t>
+            </a:r>
+            <a:r>
+              <a:rPr lang="ru-RU" dirty="0" smtClean="0"/>
+              <a:t>к сборке добавляется атрибут </a:t>
+            </a:r>
+            <a:r>
+              <a:rPr lang="en-US" dirty="0" err="1" smtClean="0"/>
+              <a:t>DebuggableAttribute</a:t>
+            </a:r>
+            <a:r>
+              <a:rPr lang="ru-RU" dirty="0" smtClean="0"/>
+              <a:t>	который дает команду </a:t>
+            </a:r>
+            <a:r>
+              <a:rPr lang="en-US" dirty="0" smtClean="0"/>
+              <a:t>GC </a:t>
+            </a:r>
+            <a:r>
+              <a:rPr lang="ru-RU" dirty="0" smtClean="0"/>
+              <a:t>исскуственно продлевать время жизни локальных переменных до завершения метода. </a:t>
+            </a:r>
+            <a:r>
+              <a:rPr lang="ru-RU" smtClean="0"/>
+              <a:t>Это сделано чтобы программист мог без помех заниматься отладкой.</a:t>
+            </a:r>
+            <a:endParaRPr lang="ru-RU" dirty="0"/>
+          </a:p>
+        </p:txBody>
+      </p:sp>
+    </p:spTree>
+    <p:extLst>
+      <p:ext uri="{BB962C8B-B14F-4D97-AF65-F5344CB8AC3E}">
+        <p14:creationId xmlns:p14="http://schemas.microsoft.com/office/powerpoint/2010/main" val="1960211568"/>
+      </p:ext>
+    </p:extLst>
+  </p:cSld>
+  <p:clrMapOvr>
+    <a:masterClrMapping/>
+  </p:clrMapOvr>
+  <p:timing>
+    <p:tnLst>
+      <p:par>
+        <p:cTn id="1" dur="indefinite" restart="never" nodeType="tmRoot"/>
+      </p:par>
+    </p:tnLst>
+  </p:timing>
+</p:sld>
+</file>
+
+<file path=ppt/slides/slide26.xml><?xml version="1.0" encoding="utf-8"?>
+<p:sld xmlns:a="http://schemas.openxmlformats.org/drawingml/2006/main" xmlns:r="http://schemas.openxmlformats.org/officeDocument/2006/relationships" xmlns:p="http://schemas.openxmlformats.org/presentationml/2006/main">
+  <p:cSld>
+    <p:spTree>
+      <p:nvGrpSpPr>
+        <p:cNvPr id="1" name=""/>
+        <p:cNvGrpSpPr/>
+        <p:nvPr/>
+      </p:nvGrpSpPr>
+      <p:grpSpPr>
+        <a:xfrm>
+          <a:off x="0" y="0"/>
+          <a:ext cx="0" cy="0"/>
+          <a:chOff x="0" y="0"/>
+          <a:chExt cx="0" cy="0"/>
+        </a:xfrm>
+      </p:grpSpPr>
+      <p:sp>
+        <p:nvSpPr>
+          <p:cNvPr id="2" name="Title 1"/>
+          <p:cNvSpPr>
+            <a:spLocks noGrp="1"/>
+          </p:cNvSpPr>
+          <p:nvPr>
+            <p:ph type="ctrTitle"/>
+          </p:nvPr>
+        </p:nvSpPr>
+        <p:spPr/>
+        <p:txBody>
+          <a:bodyPr/>
+          <a:lstStyle/>
+          <a:p>
+            <a:r>
+              <a:rPr lang="ru-RU" dirty="0" smtClean="0"/>
+              <a:t>Эффективная работа с памятью</a:t>
+            </a:r>
+            <a:endParaRPr lang="ru-RU" dirty="0"/>
+          </a:p>
+        </p:txBody>
+      </p:sp>
+      <p:sp>
+        <p:nvSpPr>
+          <p:cNvPr id="3" name="Subtitle 2"/>
+          <p:cNvSpPr>
+            <a:spLocks noGrp="1"/>
+          </p:cNvSpPr>
+          <p:nvPr>
+            <p:ph type="subTitle" idx="1"/>
+          </p:nvPr>
+        </p:nvSpPr>
+        <p:spPr/>
+        <p:txBody>
+          <a:bodyPr/>
+          <a:lstStyle/>
+          <a:p>
+            <a:endParaRPr lang="ru-RU"/>
+          </a:p>
+        </p:txBody>
+      </p:sp>
+    </p:spTree>
+    <p:extLst>
+      <p:ext uri="{BB962C8B-B14F-4D97-AF65-F5344CB8AC3E}">
+        <p14:creationId xmlns:p14="http://schemas.microsoft.com/office/powerpoint/2010/main" val="2886455791"/>
+      </p:ext>
+    </p:extLst>
+  </p:cSld>
+  <p:clrMapOvr>
+    <a:masterClrMapping/>
+  </p:clrMapOvr>
+  <p:timing>
+    <p:tnLst>
+      <p:par>
+        <p:cTn id="1" dur="indefinite" restart="never" nodeType="tmRoot"/>
+      </p:par>
+    </p:tnLst>
+  </p:timing>
+</p:sld>
+</file>
+
+<file path=ppt/slides/slide27.xml><?xml version="1.0" encoding="utf-8"?>
+<p:sld xmlns:a="http://schemas.openxmlformats.org/drawingml/2006/main" xmlns:r="http://schemas.openxmlformats.org/officeDocument/2006/relationships" xmlns:p="http://schemas.openxmlformats.org/presentationml/2006/main">
+  <p:cSld>
+    <p:spTree>
+      <p:nvGrpSpPr>
+        <p:cNvPr id="1" name=""/>
+        <p:cNvGrpSpPr/>
+        <p:nvPr/>
+      </p:nvGrpSpPr>
+      <p:grpSpPr>
+        <a:xfrm>
+          <a:off x="0" y="0"/>
+          <a:ext cx="0" cy="0"/>
+          <a:chOff x="0" y="0"/>
+          <a:chExt cx="0" cy="0"/>
+        </a:xfrm>
+      </p:grpSpPr>
+      <p:sp>
+        <p:nvSpPr>
+          <p:cNvPr id="2" name="Title 1"/>
+          <p:cNvSpPr>
+            <a:spLocks noGrp="1"/>
+          </p:cNvSpPr>
+          <p:nvPr>
+            <p:ph type="title"/>
+          </p:nvPr>
+        </p:nvSpPr>
+        <p:spPr/>
+        <p:txBody>
           <a:bodyPr>
             <a:normAutofit fontScale="90000"/>
           </a:bodyPr>
@@ -11917,7 +12805,7 @@
 </p:sld>
 </file>
 
-<file path=ppt/slides/slide26.xml><?xml version="1.0" encoding="utf-8"?>
+<file path=ppt/slides/slide28.xml><?xml version="1.0" encoding="utf-8"?>
 <p:sld xmlns:a="http://schemas.openxmlformats.org/drawingml/2006/main" xmlns:r="http://schemas.openxmlformats.org/officeDocument/2006/relationships" xmlns:p="http://schemas.openxmlformats.org/presentationml/2006/main">
   <p:cSld>
     <p:spTree>
@@ -12933,7 +13821,7 @@
 </p:sld>
 </file>
 
-<file path=ppt/slides/slide27.xml><?xml version="1.0" encoding="utf-8"?>
+<file path=ppt/slides/slide29.xml><?xml version="1.0" encoding="utf-8"?>
 <p:sld xmlns:a="http://schemas.openxmlformats.org/drawingml/2006/main" xmlns:r="http://schemas.openxmlformats.org/officeDocument/2006/relationships" xmlns:p="http://schemas.openxmlformats.org/presentationml/2006/main">
   <p:cSld>
     <p:spTree>
@@ -13001,7 +13889,86 @@
 </p:sld>
 </file>
 
-<file path=ppt/slides/slide28.xml><?xml version="1.0" encoding="utf-8"?>
+<file path=ppt/slides/slide3.xml><?xml version="1.0" encoding="utf-8"?>
+<p:sld xmlns:a="http://schemas.openxmlformats.org/drawingml/2006/main" xmlns:r="http://schemas.openxmlformats.org/officeDocument/2006/relationships" xmlns:p="http://schemas.openxmlformats.org/presentationml/2006/main">
+  <p:cSld>
+    <p:spTree>
+      <p:nvGrpSpPr>
+        <p:cNvPr id="1" name=""/>
+        <p:cNvGrpSpPr/>
+        <p:nvPr/>
+      </p:nvGrpSpPr>
+      <p:grpSpPr>
+        <a:xfrm>
+          <a:off x="0" y="0"/>
+          <a:ext cx="0" cy="0"/>
+          <a:chOff x="0" y="0"/>
+          <a:chExt cx="0" cy="0"/>
+        </a:xfrm>
+      </p:grpSpPr>
+      <p:sp>
+        <p:nvSpPr>
+          <p:cNvPr id="2" name="Title 1"/>
+          <p:cNvSpPr>
+            <a:spLocks noGrp="1"/>
+          </p:cNvSpPr>
+          <p:nvPr>
+            <p:ph type="title"/>
+          </p:nvPr>
+        </p:nvSpPr>
+        <p:spPr/>
+        <p:txBody>
+          <a:bodyPr/>
+          <a:lstStyle/>
+          <a:p>
+            <a:r>
+              <a:rPr lang="ru-RU" dirty="0" smtClean="0"/>
+              <a:t>Ссылочные типы</a:t>
+            </a:r>
+            <a:endParaRPr lang="ru-RU" dirty="0"/>
+          </a:p>
+        </p:txBody>
+      </p:sp>
+      <p:sp>
+        <p:nvSpPr>
+          <p:cNvPr id="3" name="Content Placeholder 2"/>
+          <p:cNvSpPr>
+            <a:spLocks noGrp="1"/>
+          </p:cNvSpPr>
+          <p:nvPr>
+            <p:ph idx="1"/>
+          </p:nvPr>
+        </p:nvSpPr>
+        <p:spPr/>
+        <p:txBody>
+          <a:bodyPr/>
+          <a:lstStyle/>
+          <a:p>
+            <a:endParaRPr lang="ru-RU"/>
+          </a:p>
+        </p:txBody>
+      </p:sp>
+    </p:spTree>
+    <p:extLst>
+      <p:ext uri="{BB962C8B-B14F-4D97-AF65-F5344CB8AC3E}">
+        <p14:creationId xmlns:p14="http://schemas.microsoft.com/office/powerpoint/2010/main" val="4243704484"/>
+      </p:ext>
+    </p:extLst>
+  </p:cSld>
+  <p:clrMapOvr>
+    <a:masterClrMapping/>
+  </p:clrMapOvr>
+  <p:timing>
+    <p:tnLst>
+      <p:par>
+        <p:cTn id="1" dur="indefinite" restart="never" nodeType="tmRoot"/>
+      </p:par>
+    </p:tnLst>
+  </p:timing>
+</p:sld>
+</file>
+
+<file path=ppt/slides/slide30.xml><?xml version="1.0" encoding="utf-8"?>
 <p:sld xmlns:a="http://schemas.openxmlformats.org/drawingml/2006/main" xmlns:r="http://schemas.openxmlformats.org/officeDocument/2006/relationships" xmlns:p="http://schemas.openxmlformats.org/presentationml/2006/main">
   <p:cSld>
     <p:spTree>
@@ -14195,7 +15162,7 @@
 </p:sld>
 </file>
 
-<file path=ppt/slides/slide29.xml><?xml version="1.0" encoding="utf-8"?>
+<file path=ppt/slides/slide31.xml><?xml version="1.0" encoding="utf-8"?>
 <p:sld xmlns:a="http://schemas.openxmlformats.org/drawingml/2006/main" xmlns:r="http://schemas.openxmlformats.org/officeDocument/2006/relationships" xmlns:p="http://schemas.openxmlformats.org/presentationml/2006/main">
   <p:cSld>
     <p:spTree>
@@ -15543,300 +16510,6 @@
     <p:extLst>
       <p:ext uri="{BB962C8B-B14F-4D97-AF65-F5344CB8AC3E}">
         <p14:creationId xmlns:p14="http://schemas.microsoft.com/office/powerpoint/2010/main" val="2301603699"/>
-      </p:ext>
-    </p:extLst>
-  </p:cSld>
-  <p:clrMapOvr>
-    <a:masterClrMapping/>
-  </p:clrMapOvr>
-  <p:timing>
-    <p:tnLst>
-      <p:par>
-        <p:cTn id="1" dur="indefinite" restart="never" nodeType="tmRoot"/>
-      </p:par>
-    </p:tnLst>
-  </p:timing>
-</p:sld>
-</file>
-
-<file path=ppt/slides/slide3.xml><?xml version="1.0" encoding="utf-8"?>
-<p:sld xmlns:a="http://schemas.openxmlformats.org/drawingml/2006/main" xmlns:r="http://schemas.openxmlformats.org/officeDocument/2006/relationships" xmlns:p="http://schemas.openxmlformats.org/presentationml/2006/main">
-  <p:cSld>
-    <p:spTree>
-      <p:nvGrpSpPr>
-        <p:cNvPr id="1" name=""/>
-        <p:cNvGrpSpPr/>
-        <p:nvPr/>
-      </p:nvGrpSpPr>
-      <p:grpSpPr>
-        <a:xfrm>
-          <a:off x="0" y="0"/>
-          <a:ext cx="0" cy="0"/>
-          <a:chOff x="0" y="0"/>
-          <a:chExt cx="0" cy="0"/>
-        </a:xfrm>
-      </p:grpSpPr>
-      <p:sp>
-        <p:nvSpPr>
-          <p:cNvPr id="2" name="Title 1"/>
-          <p:cNvSpPr>
-            <a:spLocks noGrp="1"/>
-          </p:cNvSpPr>
-          <p:nvPr>
-            <p:ph type="title"/>
-          </p:nvPr>
-        </p:nvSpPr>
-        <p:spPr/>
-        <p:txBody>
-          <a:bodyPr/>
-          <a:lstStyle/>
-          <a:p>
-            <a:r>
-              <a:rPr lang="ru-RU" dirty="0" smtClean="0"/>
-              <a:t>Ссылочные типы</a:t>
-            </a:r>
-            <a:endParaRPr lang="ru-RU" dirty="0"/>
-          </a:p>
-        </p:txBody>
-      </p:sp>
-      <p:sp>
-        <p:nvSpPr>
-          <p:cNvPr id="3" name="Content Placeholder 2"/>
-          <p:cNvSpPr>
-            <a:spLocks noGrp="1"/>
-          </p:cNvSpPr>
-          <p:nvPr>
-            <p:ph idx="1"/>
-          </p:nvPr>
-        </p:nvSpPr>
-        <p:spPr/>
-        <p:txBody>
-          <a:bodyPr/>
-          <a:lstStyle/>
-          <a:p>
-            <a:endParaRPr lang="ru-RU"/>
-          </a:p>
-        </p:txBody>
-      </p:sp>
-    </p:spTree>
-    <p:extLst>
-      <p:ext uri="{BB962C8B-B14F-4D97-AF65-F5344CB8AC3E}">
-        <p14:creationId xmlns:p14="http://schemas.microsoft.com/office/powerpoint/2010/main" val="4243704484"/>
-      </p:ext>
-    </p:extLst>
-  </p:cSld>
-  <p:clrMapOvr>
-    <a:masterClrMapping/>
-  </p:clrMapOvr>
-  <p:timing>
-    <p:tnLst>
-      <p:par>
-        <p:cTn id="1" dur="indefinite" restart="never" nodeType="tmRoot"/>
-      </p:par>
-    </p:tnLst>
-  </p:timing>
-</p:sld>
-</file>
-
-<file path=ppt/slides/slide30.xml><?xml version="1.0" encoding="utf-8"?>
-<p:sld xmlns:a="http://schemas.openxmlformats.org/drawingml/2006/main" xmlns:r="http://schemas.openxmlformats.org/officeDocument/2006/relationships" xmlns:p="http://schemas.openxmlformats.org/presentationml/2006/main">
-  <p:cSld>
-    <p:spTree>
-      <p:nvGrpSpPr>
-        <p:cNvPr id="1" name=""/>
-        <p:cNvGrpSpPr/>
-        <p:nvPr/>
-      </p:nvGrpSpPr>
-      <p:grpSpPr>
-        <a:xfrm>
-          <a:off x="0" y="0"/>
-          <a:ext cx="0" cy="0"/>
-          <a:chOff x="0" y="0"/>
-          <a:chExt cx="0" cy="0"/>
-        </a:xfrm>
-      </p:grpSpPr>
-      <p:sp>
-        <p:nvSpPr>
-          <p:cNvPr id="2" name="Title 1"/>
-          <p:cNvSpPr>
-            <a:spLocks noGrp="1"/>
-          </p:cNvSpPr>
-          <p:nvPr>
-            <p:ph type="ctrTitle"/>
-          </p:nvPr>
-        </p:nvSpPr>
-        <p:spPr/>
-        <p:txBody>
-          <a:bodyPr/>
-          <a:lstStyle/>
-          <a:p>
-            <a:r>
-              <a:rPr lang="ru-RU" dirty="0" smtClean="0"/>
-              <a:t>Мониторинг используемой памяти</a:t>
-            </a:r>
-            <a:endParaRPr lang="ru-RU" dirty="0"/>
-          </a:p>
-        </p:txBody>
-      </p:sp>
-    </p:spTree>
-    <p:extLst>
-      <p:ext uri="{BB962C8B-B14F-4D97-AF65-F5344CB8AC3E}">
-        <p14:creationId xmlns:p14="http://schemas.microsoft.com/office/powerpoint/2010/main" val="833686513"/>
-      </p:ext>
-    </p:extLst>
-  </p:cSld>
-  <p:clrMapOvr>
-    <a:masterClrMapping/>
-  </p:clrMapOvr>
-  <p:timing>
-    <p:tnLst>
-      <p:par>
-        <p:cTn id="1" dur="indefinite" restart="never" nodeType="tmRoot"/>
-      </p:par>
-    </p:tnLst>
-  </p:timing>
-</p:sld>
-</file>
-
-<file path=ppt/slides/slide31.xml><?xml version="1.0" encoding="utf-8"?>
-<p:sld xmlns:a="http://schemas.openxmlformats.org/drawingml/2006/main" xmlns:r="http://schemas.openxmlformats.org/officeDocument/2006/relationships" xmlns:p="http://schemas.openxmlformats.org/presentationml/2006/main">
-  <p:cSld>
-    <p:spTree>
-      <p:nvGrpSpPr>
-        <p:cNvPr id="1" name=""/>
-        <p:cNvGrpSpPr/>
-        <p:nvPr/>
-      </p:nvGrpSpPr>
-      <p:grpSpPr>
-        <a:xfrm>
-          <a:off x="0" y="0"/>
-          <a:ext cx="0" cy="0"/>
-          <a:chOff x="0" y="0"/>
-          <a:chExt cx="0" cy="0"/>
-        </a:xfrm>
-      </p:grpSpPr>
-      <p:sp>
-        <p:nvSpPr>
-          <p:cNvPr id="2" name="Title 1"/>
-          <p:cNvSpPr>
-            <a:spLocks noGrp="1"/>
-          </p:cNvSpPr>
-          <p:nvPr>
-            <p:ph type="title"/>
-          </p:nvPr>
-        </p:nvSpPr>
-        <p:spPr/>
-        <p:txBody>
-          <a:bodyPr>
-            <a:normAutofit fontScale="90000"/>
-          </a:bodyPr>
-          <a:lstStyle/>
-          <a:p>
-            <a:r>
-              <a:rPr lang="ru-RU" dirty="0" smtClean="0"/>
-              <a:t>Мониторинг используемой памяти из кода</a:t>
-            </a:r>
-            <a:endParaRPr lang="ru-RU" dirty="0"/>
-          </a:p>
-        </p:txBody>
-      </p:sp>
-      <p:sp>
-        <p:nvSpPr>
-          <p:cNvPr id="3" name="Content Placeholder 2"/>
-          <p:cNvSpPr>
-            <a:spLocks noGrp="1"/>
-          </p:cNvSpPr>
-          <p:nvPr>
-            <p:ph idx="1"/>
-          </p:nvPr>
-        </p:nvSpPr>
-        <p:spPr/>
-        <p:txBody>
-          <a:bodyPr/>
-          <a:lstStyle/>
-          <a:p>
-            <a:r>
-              <a:rPr lang="en-US" dirty="0" err="1" smtClean="0"/>
-              <a:t>GC.CollectionCount</a:t>
-            </a:r>
-            <a:r>
-              <a:rPr lang="en-US" dirty="0" smtClean="0"/>
-              <a:t>(</a:t>
-            </a:r>
-            <a:r>
-              <a:rPr lang="ru-RU" dirty="0" smtClean="0"/>
-              <a:t>номерПоколения</a:t>
-            </a:r>
-            <a:r>
-              <a:rPr lang="en-US" dirty="0" smtClean="0"/>
-              <a:t>)</a:t>
-            </a:r>
-            <a:r>
-              <a:rPr lang="ru-RU" dirty="0" smtClean="0"/>
-              <a:t> – сообщает сколько раз выполнялась сборка мусора для указанного поколения</a:t>
-            </a:r>
-          </a:p>
-          <a:p>
-            <a:r>
-              <a:rPr lang="en-US" dirty="0" err="1"/>
-              <a:t>GC.GetTotalMemory</a:t>
-            </a:r>
-            <a:r>
-              <a:rPr lang="en-US" dirty="0"/>
-              <a:t>(</a:t>
-            </a:r>
-            <a:r>
-              <a:rPr lang="en-US" dirty="0" err="1"/>
-              <a:t>bool</a:t>
-            </a:r>
-            <a:r>
-              <a:rPr lang="en-US" dirty="0"/>
-              <a:t> </a:t>
-            </a:r>
-            <a:r>
-              <a:rPr lang="en-US" dirty="0" err="1"/>
-              <a:t>forceFullCollection</a:t>
-            </a:r>
-            <a:r>
-              <a:rPr lang="en-US" dirty="0" smtClean="0"/>
-              <a:t>)</a:t>
-            </a:r>
-            <a:r>
-              <a:rPr lang="ru-RU" dirty="0" smtClean="0"/>
-              <a:t> – возвращает кол-во байтов выделенных в куче</a:t>
-            </a:r>
-          </a:p>
-          <a:p>
-            <a:r>
-              <a:rPr lang="en-US" dirty="0" err="1" smtClean="0"/>
-              <a:t>Environment.WorkingSet</a:t>
-            </a:r>
-            <a:r>
-              <a:rPr lang="en-US" dirty="0" smtClean="0"/>
-              <a:t> – </a:t>
-            </a:r>
-            <a:r>
-              <a:rPr lang="ru-RU" dirty="0" smtClean="0"/>
-              <a:t>размер в байтах рабочего множества процесса </a:t>
-            </a:r>
-            <a:r>
-              <a:rPr lang="en-US" dirty="0" smtClean="0"/>
-              <a:t>(working set)</a:t>
-            </a:r>
-            <a:endParaRPr lang="en-US" dirty="0"/>
-          </a:p>
-          <a:p>
-            <a:endParaRPr lang="en-US" dirty="0"/>
-          </a:p>
-          <a:p>
-            <a:endParaRPr lang="ru-RU" dirty="0"/>
-          </a:p>
-        </p:txBody>
-      </p:sp>
-    </p:spTree>
-    <p:extLst>
-      <p:ext uri="{BB962C8B-B14F-4D97-AF65-F5344CB8AC3E}">
-        <p14:creationId xmlns:p14="http://schemas.microsoft.com/office/powerpoint/2010/main" val="921719331"/>
       </p:ext>
     </p:extLst>
   </p:cSld>
@@ -15877,120 +16550,17 @@
             <a:spLocks noGrp="1"/>
           </p:cNvSpPr>
           <p:nvPr>
-            <p:ph type="title"/>
+            <p:ph type="ctrTitle"/>
           </p:nvPr>
         </p:nvSpPr>
         <p:spPr/>
         <p:txBody>
-          <a:bodyPr>
-            <a:normAutofit fontScale="90000"/>
-          </a:bodyPr>
+          <a:bodyPr/>
           <a:lstStyle/>
           <a:p>
             <a:r>
               <a:rPr lang="ru-RU" dirty="0" smtClean="0"/>
-              <a:t>Мониторинг используемой памяти внешними средствами</a:t>
-            </a:r>
-            <a:endParaRPr lang="ru-RU" dirty="0"/>
-          </a:p>
-        </p:txBody>
-      </p:sp>
-      <p:sp>
-        <p:nvSpPr>
-          <p:cNvPr id="3" name="Content Placeholder 2"/>
-          <p:cNvSpPr>
-            <a:spLocks noGrp="1"/>
-          </p:cNvSpPr>
-          <p:nvPr>
-            <p:ph idx="1"/>
-          </p:nvPr>
-        </p:nvSpPr>
-        <p:spPr/>
-        <p:txBody>
-          <a:bodyPr>
-            <a:normAutofit/>
-          </a:bodyPr>
-          <a:lstStyle/>
-          <a:p>
-            <a:r>
-              <a:rPr lang="ru-RU" dirty="0" smtClean="0"/>
-              <a:t>Счетчики  производительности</a:t>
-            </a:r>
-            <a:endParaRPr lang="en-US" dirty="0" smtClean="0"/>
-          </a:p>
-          <a:p>
-            <a:pPr lvl="1"/>
-            <a:r>
-              <a:rPr lang="en-US" dirty="0" smtClean="0"/>
-              <a:t>Performance Monitor</a:t>
-            </a:r>
-            <a:r>
-              <a:rPr lang="ru-RU" dirty="0" smtClean="0"/>
-              <a:t> (</a:t>
-            </a:r>
-            <a:r>
-              <a:rPr lang="en-US" dirty="0" smtClean="0"/>
-              <a:t>Control Panel </a:t>
-            </a:r>
-            <a:r>
-              <a:rPr lang="en-US" dirty="0"/>
-              <a:t>\ Administrative </a:t>
-            </a:r>
-            <a:r>
-              <a:rPr lang="en-US" dirty="0" smtClean="0"/>
-              <a:t>Tools)</a:t>
-            </a:r>
-          </a:p>
-          <a:p>
-            <a:pPr lvl="1"/>
-            <a:r>
-              <a:rPr lang="en-US" dirty="0"/>
-              <a:t>Process Explorer</a:t>
-            </a:r>
-            <a:br>
-              <a:rPr lang="en-US" dirty="0"/>
-            </a:br>
-            <a:r>
-              <a:rPr lang="en-US" dirty="0">
-                <a:hlinkClick r:id="rId2"/>
-              </a:rPr>
-              <a:t>http://</a:t>
-            </a:r>
-            <a:r>
-              <a:rPr lang="en-US" dirty="0" smtClean="0">
-                <a:hlinkClick r:id="rId2"/>
-              </a:rPr>
-              <a:t>technet.microsoft.com/en-us/sysinternals/bb896653</a:t>
-            </a:r>
-            <a:endParaRPr lang="en-US" dirty="0" smtClean="0"/>
-          </a:p>
-          <a:p>
-            <a:r>
-              <a:rPr lang="en-US" dirty="0" smtClean="0"/>
-              <a:t>Microsoft </a:t>
-            </a:r>
-            <a:r>
-              <a:rPr lang="en-US" dirty="0" err="1" smtClean="0"/>
-              <a:t>PerfView</a:t>
-            </a:r>
-            <a:endParaRPr lang="en-US" dirty="0" smtClean="0"/>
-          </a:p>
-          <a:p>
-            <a:r>
-              <a:rPr lang="en-US" dirty="0" err="1" smtClean="0"/>
-              <a:t>dotMemory</a:t>
-            </a:r>
-            <a:r>
-              <a:rPr lang="en-US" dirty="0" smtClean="0"/>
-              <a:t> </a:t>
-            </a:r>
-            <a:r>
-              <a:rPr lang="ru-RU" dirty="0" smtClean="0"/>
-              <a:t>от </a:t>
-            </a:r>
-            <a:r>
-              <a:rPr lang="en-US" dirty="0" smtClean="0"/>
-              <a:t>JetBrains</a:t>
+              <a:t>Мониторинг используемой памяти</a:t>
             </a:r>
             <a:endParaRPr lang="ru-RU" dirty="0"/>
           </a:p>
@@ -15999,7 +16569,7 @@
     </p:spTree>
     <p:extLst>
       <p:ext uri="{BB962C8B-B14F-4D97-AF65-F5344CB8AC3E}">
-        <p14:creationId xmlns:p14="http://schemas.microsoft.com/office/powerpoint/2010/main" val="2842368969"/>
+        <p14:creationId xmlns:p14="http://schemas.microsoft.com/office/powerpoint/2010/main" val="833686513"/>
       </p:ext>
     </p:extLst>
   </p:cSld>
@@ -16045,6 +16615,324 @@
         </p:nvSpPr>
         <p:spPr/>
         <p:txBody>
+          <a:bodyPr>
+            <a:normAutofit fontScale="90000"/>
+          </a:bodyPr>
+          <a:lstStyle/>
+          <a:p>
+            <a:r>
+              <a:rPr lang="ru-RU" dirty="0" smtClean="0"/>
+              <a:t>Мониторинг используемой памяти из кода</a:t>
+            </a:r>
+            <a:endParaRPr lang="ru-RU" dirty="0"/>
+          </a:p>
+        </p:txBody>
+      </p:sp>
+      <p:sp>
+        <p:nvSpPr>
+          <p:cNvPr id="3" name="Content Placeholder 2"/>
+          <p:cNvSpPr>
+            <a:spLocks noGrp="1"/>
+          </p:cNvSpPr>
+          <p:nvPr>
+            <p:ph idx="1"/>
+          </p:nvPr>
+        </p:nvSpPr>
+        <p:spPr/>
+        <p:txBody>
+          <a:bodyPr/>
+          <a:lstStyle/>
+          <a:p>
+            <a:r>
+              <a:rPr lang="en-US" dirty="0" err="1" smtClean="0"/>
+              <a:t>GC.CollectionCount</a:t>
+            </a:r>
+            <a:r>
+              <a:rPr lang="en-US" dirty="0" smtClean="0"/>
+              <a:t>(</a:t>
+            </a:r>
+            <a:r>
+              <a:rPr lang="ru-RU" dirty="0" smtClean="0"/>
+              <a:t>номерПоколения</a:t>
+            </a:r>
+            <a:r>
+              <a:rPr lang="en-US" dirty="0" smtClean="0"/>
+              <a:t>)</a:t>
+            </a:r>
+            <a:r>
+              <a:rPr lang="ru-RU" dirty="0" smtClean="0"/>
+              <a:t> – сообщает сколько раз выполнялась сборка мусора для указанного поколения</a:t>
+            </a:r>
+          </a:p>
+          <a:p>
+            <a:r>
+              <a:rPr lang="en-US" dirty="0" err="1"/>
+              <a:t>GC.GetTotalMemory</a:t>
+            </a:r>
+            <a:r>
+              <a:rPr lang="en-US" dirty="0"/>
+              <a:t>(</a:t>
+            </a:r>
+            <a:r>
+              <a:rPr lang="en-US" dirty="0" err="1"/>
+              <a:t>bool</a:t>
+            </a:r>
+            <a:r>
+              <a:rPr lang="en-US" dirty="0"/>
+              <a:t> </a:t>
+            </a:r>
+            <a:r>
+              <a:rPr lang="en-US" dirty="0" err="1"/>
+              <a:t>forceFullCollection</a:t>
+            </a:r>
+            <a:r>
+              <a:rPr lang="en-US" dirty="0" smtClean="0"/>
+              <a:t>)</a:t>
+            </a:r>
+            <a:r>
+              <a:rPr lang="ru-RU" dirty="0" smtClean="0"/>
+              <a:t> – возвращает кол-во байтов выделенных в куче</a:t>
+            </a:r>
+          </a:p>
+          <a:p>
+            <a:r>
+              <a:rPr lang="en-US" dirty="0" err="1" smtClean="0"/>
+              <a:t>Environment.WorkingSet</a:t>
+            </a:r>
+            <a:r>
+              <a:rPr lang="en-US" dirty="0" smtClean="0"/>
+              <a:t> – </a:t>
+            </a:r>
+            <a:r>
+              <a:rPr lang="ru-RU" dirty="0" smtClean="0"/>
+              <a:t>размер в байтах рабочего множества процесса </a:t>
+            </a:r>
+            <a:r>
+              <a:rPr lang="en-US" dirty="0" smtClean="0"/>
+              <a:t>(working set)</a:t>
+            </a:r>
+            <a:endParaRPr lang="en-US" dirty="0"/>
+          </a:p>
+          <a:p>
+            <a:endParaRPr lang="en-US" dirty="0"/>
+          </a:p>
+          <a:p>
+            <a:endParaRPr lang="ru-RU" dirty="0"/>
+          </a:p>
+        </p:txBody>
+      </p:sp>
+    </p:spTree>
+    <p:extLst>
+      <p:ext uri="{BB962C8B-B14F-4D97-AF65-F5344CB8AC3E}">
+        <p14:creationId xmlns:p14="http://schemas.microsoft.com/office/powerpoint/2010/main" val="921719331"/>
+      </p:ext>
+    </p:extLst>
+  </p:cSld>
+  <p:clrMapOvr>
+    <a:masterClrMapping/>
+  </p:clrMapOvr>
+  <p:timing>
+    <p:tnLst>
+      <p:par>
+        <p:cTn id="1" dur="indefinite" restart="never" nodeType="tmRoot"/>
+      </p:par>
+    </p:tnLst>
+  </p:timing>
+</p:sld>
+</file>
+
+<file path=ppt/slides/slide34.xml><?xml version="1.0" encoding="utf-8"?>
+<p:sld xmlns:a="http://schemas.openxmlformats.org/drawingml/2006/main" xmlns:r="http://schemas.openxmlformats.org/officeDocument/2006/relationships" xmlns:p="http://schemas.openxmlformats.org/presentationml/2006/main">
+  <p:cSld>
+    <p:spTree>
+      <p:nvGrpSpPr>
+        <p:cNvPr id="1" name=""/>
+        <p:cNvGrpSpPr/>
+        <p:nvPr/>
+      </p:nvGrpSpPr>
+      <p:grpSpPr>
+        <a:xfrm>
+          <a:off x="0" y="0"/>
+          <a:ext cx="0" cy="0"/>
+          <a:chOff x="0" y="0"/>
+          <a:chExt cx="0" cy="0"/>
+        </a:xfrm>
+      </p:grpSpPr>
+      <p:sp>
+        <p:nvSpPr>
+          <p:cNvPr id="2" name="Title 1"/>
+          <p:cNvSpPr>
+            <a:spLocks noGrp="1"/>
+          </p:cNvSpPr>
+          <p:nvPr>
+            <p:ph type="title"/>
+          </p:nvPr>
+        </p:nvSpPr>
+        <p:spPr/>
+        <p:txBody>
+          <a:bodyPr>
+            <a:normAutofit fontScale="90000"/>
+          </a:bodyPr>
+          <a:lstStyle/>
+          <a:p>
+            <a:r>
+              <a:rPr lang="ru-RU" dirty="0" smtClean="0"/>
+              <a:t>Мониторинг используемой памяти внешними средствами</a:t>
+            </a:r>
+            <a:endParaRPr lang="ru-RU" dirty="0"/>
+          </a:p>
+        </p:txBody>
+      </p:sp>
+      <p:sp>
+        <p:nvSpPr>
+          <p:cNvPr id="3" name="Content Placeholder 2"/>
+          <p:cNvSpPr>
+            <a:spLocks noGrp="1"/>
+          </p:cNvSpPr>
+          <p:nvPr>
+            <p:ph idx="1"/>
+          </p:nvPr>
+        </p:nvSpPr>
+        <p:spPr/>
+        <p:txBody>
+          <a:bodyPr>
+            <a:normAutofit/>
+          </a:bodyPr>
+          <a:lstStyle/>
+          <a:p>
+            <a:r>
+              <a:rPr lang="ru-RU" dirty="0" smtClean="0"/>
+              <a:t>Счетчики  производительности</a:t>
+            </a:r>
+            <a:endParaRPr lang="en-US" dirty="0" smtClean="0"/>
+          </a:p>
+          <a:p>
+            <a:pPr lvl="1"/>
+            <a:r>
+              <a:rPr lang="en-US" dirty="0" smtClean="0"/>
+              <a:t>Performance Monitor</a:t>
+            </a:r>
+            <a:r>
+              <a:rPr lang="ru-RU" dirty="0" smtClean="0"/>
+              <a:t> (</a:t>
+            </a:r>
+            <a:r>
+              <a:rPr lang="en-US" dirty="0" smtClean="0"/>
+              <a:t>Control Panel </a:t>
+            </a:r>
+            <a:r>
+              <a:rPr lang="en-US" dirty="0"/>
+              <a:t>\ Administrative </a:t>
+            </a:r>
+            <a:r>
+              <a:rPr lang="en-US" dirty="0" smtClean="0"/>
+              <a:t>Tools)</a:t>
+            </a:r>
+          </a:p>
+          <a:p>
+            <a:pPr lvl="1"/>
+            <a:r>
+              <a:rPr lang="en-US" dirty="0"/>
+              <a:t>Process Explorer</a:t>
+            </a:r>
+            <a:br>
+              <a:rPr lang="en-US" dirty="0"/>
+            </a:br>
+            <a:r>
+              <a:rPr lang="en-US" dirty="0">
+                <a:hlinkClick r:id="rId2"/>
+              </a:rPr>
+              <a:t>http://</a:t>
+            </a:r>
+            <a:r>
+              <a:rPr lang="en-US" dirty="0" smtClean="0">
+                <a:hlinkClick r:id="rId2"/>
+              </a:rPr>
+              <a:t>technet.microsoft.com/en-us/sysinternals/bb896653</a:t>
+            </a:r>
+            <a:endParaRPr lang="en-US" dirty="0" smtClean="0"/>
+          </a:p>
+          <a:p>
+            <a:r>
+              <a:rPr lang="en-US" dirty="0" smtClean="0"/>
+              <a:t>Microsoft </a:t>
+            </a:r>
+            <a:r>
+              <a:rPr lang="en-US" dirty="0" err="1" smtClean="0"/>
+              <a:t>PerfView</a:t>
+            </a:r>
+            <a:endParaRPr lang="en-US" dirty="0" smtClean="0"/>
+          </a:p>
+          <a:p>
+            <a:r>
+              <a:rPr lang="en-US" dirty="0" err="1" smtClean="0"/>
+              <a:t>dotMemory</a:t>
+            </a:r>
+            <a:r>
+              <a:rPr lang="en-US" dirty="0" smtClean="0"/>
+              <a:t> </a:t>
+            </a:r>
+            <a:r>
+              <a:rPr lang="ru-RU" dirty="0" smtClean="0"/>
+              <a:t>от </a:t>
+            </a:r>
+            <a:r>
+              <a:rPr lang="en-US" dirty="0" smtClean="0"/>
+              <a:t>JetBrains</a:t>
+            </a:r>
+            <a:endParaRPr lang="ru-RU" dirty="0"/>
+          </a:p>
+        </p:txBody>
+      </p:sp>
+    </p:spTree>
+    <p:extLst>
+      <p:ext uri="{BB962C8B-B14F-4D97-AF65-F5344CB8AC3E}">
+        <p14:creationId xmlns:p14="http://schemas.microsoft.com/office/powerpoint/2010/main" val="2842368969"/>
+      </p:ext>
+    </p:extLst>
+  </p:cSld>
+  <p:clrMapOvr>
+    <a:masterClrMapping/>
+  </p:clrMapOvr>
+  <p:timing>
+    <p:tnLst>
+      <p:par>
+        <p:cTn id="1" dur="indefinite" restart="never" nodeType="tmRoot"/>
+      </p:par>
+    </p:tnLst>
+  </p:timing>
+</p:sld>
+</file>
+
+<file path=ppt/slides/slide35.xml><?xml version="1.0" encoding="utf-8"?>
+<p:sld xmlns:a="http://schemas.openxmlformats.org/drawingml/2006/main" xmlns:r="http://schemas.openxmlformats.org/officeDocument/2006/relationships" xmlns:p="http://schemas.openxmlformats.org/presentationml/2006/main">
+  <p:cSld>
+    <p:spTree>
+      <p:nvGrpSpPr>
+        <p:cNvPr id="1" name=""/>
+        <p:cNvGrpSpPr/>
+        <p:nvPr/>
+      </p:nvGrpSpPr>
+      <p:grpSpPr>
+        <a:xfrm>
+          <a:off x="0" y="0"/>
+          <a:ext cx="0" cy="0"/>
+          <a:chOff x="0" y="0"/>
+          <a:chExt cx="0" cy="0"/>
+        </a:xfrm>
+      </p:grpSpPr>
+      <p:sp>
+        <p:nvSpPr>
+          <p:cNvPr id="2" name="Title 1"/>
+          <p:cNvSpPr>
+            <a:spLocks noGrp="1"/>
+          </p:cNvSpPr>
+          <p:nvPr>
+            <p:ph type="title"/>
+          </p:nvPr>
+        </p:nvSpPr>
+        <p:spPr/>
+        <p:txBody>
           <a:bodyPr/>
           <a:lstStyle/>
           <a:p>
@@ -16195,7 +17083,7 @@
 </p:sld>
 </file>
 
-<file path=ppt/slides/slide34.xml><?xml version="1.0" encoding="utf-8"?>
+<file path=ppt/slides/slide36.xml><?xml version="1.0" encoding="utf-8"?>
 <p:sld xmlns:a="http://schemas.openxmlformats.org/drawingml/2006/main" xmlns:r="http://schemas.openxmlformats.org/officeDocument/2006/relationships" xmlns:p="http://schemas.openxmlformats.org/presentationml/2006/main">
   <p:cSld>
     <p:spTree>
@@ -20826,7 +21714,7 @@
 </p:sld>
 </file>
 
-<file path=ppt/slides/slide35.xml><?xml version="1.0" encoding="utf-8"?>
+<file path=ppt/slides/slide37.xml><?xml version="1.0" encoding="utf-8"?>
 <p:sld xmlns:a="http://schemas.openxmlformats.org/drawingml/2006/main" xmlns:r="http://schemas.openxmlformats.org/officeDocument/2006/relationships" xmlns:p="http://schemas.openxmlformats.org/presentationml/2006/main">
   <p:cSld>
     <p:spTree>

</xml_diff>

<commit_message>
Add info about async/await state machine
</commit_message>
<xml_diff>
--- a/Presentation/memory-management-and-gc.pptx
+++ b/Presentation/memory-management-and-gc.pptx
@@ -153,7 +153,7 @@
   </p:defaultTextStyle>
   <p:extLst>
     <p:ext uri="{EFAFB233-063F-42B5-8137-9DF3F51BA10A}">
-      <p15:sldGuideLst xmlns:p15="http://schemas.microsoft.com/office/powerpoint/2012/main" xmlns="">
+      <p15:sldGuideLst xmlns:p15="http://schemas.microsoft.com/office/powerpoint/2012/main">
         <p15:guide id="1" orient="horz" pos="2160">
           <p15:clr>
             <a:srgbClr val="A4A3A4"/>
@@ -167,7 +167,7 @@
       </p15:sldGuideLst>
     </p:ext>
     <p:ext uri="{2D200454-40CA-4A62-9FC3-DE9A4176ACB9}">
-      <p15:notesGuideLst xmlns:p15="http://schemas.microsoft.com/office/powerpoint/2012/main" xmlns="">
+      <p15:notesGuideLst xmlns:p15="http://schemas.microsoft.com/office/powerpoint/2012/main">
         <p15:guide id="1" orient="horz" pos="2880">
           <p15:clr>
             <a:srgbClr val="A4A3A4"/>
@@ -266,7 +266,7 @@
           <a:p>
             <a:fld id="{B24A7054-7FFB-49F4-A126-5DF6E687FF53}" type="datetimeFigureOut">
               <a:rPr lang="ru-RU" smtClean="0"/>
-              <a:t>22.02.2019</a:t>
+              <a:t>27.03.2020</a:t>
             </a:fld>
             <a:endParaRPr lang="ru-RU"/>
           </a:p>
@@ -1124,7 +1124,7 @@
           <a:p>
             <a:fld id="{8E6E6A2A-E9D3-4A0D-B04A-ABDD367A1E08}" type="datetimeFigureOut">
               <a:rPr lang="ru-RU" smtClean="0"/>
-              <a:t>22.02.2019</a:t>
+              <a:t>27.03.2020</a:t>
             </a:fld>
             <a:endParaRPr lang="ru-RU"/>
           </a:p>
@@ -2659,7 +2659,7 @@
           <a:p>
             <a:fld id="{AC3D3127-B7C4-45E3-9797-C527EC9FDD78}" type="datetimeFigureOut">
               <a:rPr lang="ru-RU" smtClean="0"/>
-              <a:t>22.02.2019</a:t>
+              <a:t>27.03.2020</a:t>
             </a:fld>
             <a:endParaRPr lang="ru-RU"/>
           </a:p>
@@ -3145,7 +3145,7 @@
           <p:cNvPr id="8" name="TextBox 7">
             <a:extLst>
               <a:ext uri="{FF2B5EF4-FFF2-40B4-BE49-F238E27FC236}">
-                <a16:creationId xmlns:a16="http://schemas.microsoft.com/office/drawing/2014/main" xmlns="" id="{B109B65D-4CC7-6D4D-B0CE-265B451C9B56}"/>
+                <a16:creationId xmlns:a16="http://schemas.microsoft.com/office/drawing/2014/main" id="{B109B65D-4CC7-6D4D-B0CE-265B451C9B56}"/>
               </a:ext>
             </a:extLst>
           </p:cNvPr>
@@ -13773,10 +13773,6 @@
               <a:rPr lang="en-US" dirty="0"/>
               <a:t>.NET 4.5.1</a:t>
             </a:r>
-            <a:r>
-              <a:rPr lang="ru-RU" dirty="0"/>
-              <a:t/>
-            </a:r>
             <a:br>
               <a:rPr lang="ru-RU" dirty="0"/>
             </a:br>
@@ -13870,13 +13866,6 @@
                 <a:cs typeface="Consolas" panose="020B0609020204030204" pitchFamily="49" charset="0"/>
               </a:rPr>
               <a:t>;</a:t>
-            </a:r>
-            <a:r>
-              <a:rPr lang="ru-RU" sz="1600" dirty="0">
-                <a:latin typeface="Consolas" panose="020B0609020204030204" pitchFamily="49" charset="0"/>
-                <a:cs typeface="Consolas" panose="020B0609020204030204" pitchFamily="49" charset="0"/>
-              </a:rPr>
-              <a:t/>
             </a:r>
             <a:br>
               <a:rPr lang="ru-RU" sz="1600" dirty="0">
@@ -14144,11 +14133,14 @@
         </p:nvSpPr>
         <p:spPr/>
         <p:txBody>
-          <a:bodyPr/>
+          <a:bodyPr>
+            <a:normAutofit fontScale="92500" lnSpcReduction="10000"/>
+          </a:bodyPr>
           <a:lstStyle/>
           <a:p>
-            <a:pPr marL="0" indent="0">
-              <a:buNone/>
+            <a:pPr marL="514350" indent="-514350">
+              <a:buFont typeface="+mj-lt"/>
+              <a:buAutoNum type="arabicPeriod"/>
             </a:pPr>
             <a:r>
               <a:rPr lang="ru-RU" dirty="0"/>
@@ -14176,11 +14168,54 @@
             </a:r>
             <a:r>
               <a:rPr lang="ru-RU" dirty="0"/>
-              <a:t>исскуственно продлевать время жизни локальных переменных до завершения метода. </a:t>
-            </a:r>
-            <a:r>
-              <a:rPr lang="ru-RU"/>
-              <a:t>Это сделано чтобы программист мог без помех заниматься отладкой.</a:t>
+              <a:t>исскуственно продлевать время жизни локальных переменных до завершения метода. Это сделано чтобы программист мог без помех заниматься отладкой.</a:t>
+            </a:r>
+            <a:endParaRPr lang="en-US" dirty="0"/>
+          </a:p>
+          <a:p>
+            <a:pPr marL="514350" indent="-514350">
+              <a:buFont typeface="+mj-lt"/>
+              <a:buAutoNum type="arabicPeriod"/>
+            </a:pPr>
+            <a:r>
+              <a:rPr lang="ru-RU" dirty="0"/>
+              <a:t>В </a:t>
+            </a:r>
+            <a:r>
+              <a:rPr lang="en-US" dirty="0"/>
+              <a:t>Debug </a:t>
+            </a:r>
+            <a:r>
+              <a:rPr lang="ru-RU" dirty="0"/>
+              <a:t>конфигурации</a:t>
+            </a:r>
+            <a:r>
+              <a:rPr lang="en-US" dirty="0"/>
+              <a:t> </a:t>
+            </a:r>
+            <a:r>
+              <a:rPr lang="ru-RU" dirty="0"/>
+              <a:t>тип для </a:t>
+            </a:r>
+            <a:r>
+              <a:rPr lang="en-US" dirty="0"/>
+              <a:t>state machine </a:t>
+            </a:r>
+            <a:r>
+              <a:rPr lang="ru-RU" dirty="0"/>
+              <a:t>это класс, а в </a:t>
+            </a:r>
+            <a:r>
+              <a:rPr lang="en-US" dirty="0"/>
+              <a:t>Release </a:t>
+            </a:r>
+            <a:r>
+              <a:rPr lang="ru-RU" dirty="0"/>
+              <a:t>конфигурации – </a:t>
+            </a:r>
+            <a:r>
+              <a:rPr lang="en-US" dirty="0"/>
+              <a:t>struct.</a:t>
             </a:r>
             <a:endParaRPr lang="ru-RU" dirty="0"/>
           </a:p>
@@ -14664,10 +14699,6 @@
             <a:r>
               <a:rPr lang="ru-RU" b="1" u="sng" dirty="0"/>
               <a:t>Ускорить</a:t>
-            </a:r>
-            <a:r>
-              <a:rPr lang="ru-RU" b="1" dirty="0"/>
-              <a:t/>
             </a:r>
             <a:br>
               <a:rPr lang="ru-RU" b="1" dirty="0"/>
@@ -15790,14 +15821,6 @@
   <p:clrMapOvr>
     <a:masterClrMapping/>
   </p:clrMapOvr>
-  <mc:AlternateContent xmlns:mc="http://schemas.openxmlformats.org/markup-compatibility/2006">
-    <mc:Choice xmlns:p14="http://schemas.microsoft.com/office/powerpoint/2010/main" Requires="p14">
-      <p:transition spd="slow" p14:dur="2000"/>
-    </mc:Choice>
-    <mc:Fallback>
-      <p:transition spd="slow"/>
-    </mc:Fallback>
-  </mc:AlternateContent>
 </p:sld>
 </file>
 
@@ -16272,16 +16295,6 @@
                 </a:rPr>
                 <a:t>Пользовательское</a:t>
               </a:r>
-              <a:r>
-                <a:rPr lang="ru-RU" kern="0" dirty="0">
-                  <a:solidFill>
-                    <a:srgbClr val="FFFFFF"/>
-                  </a:solidFill>
-                  <a:latin typeface="Arial"/>
-                  <a:cs typeface="Calibri" pitchFamily="34" charset="0"/>
-                </a:rPr>
-                <a:t/>
-              </a:r>
               <a:br>
                 <a:rPr lang="ru-RU" kern="0" dirty="0">
                   <a:solidFill>
@@ -16884,16 +16897,6 @@
                 </a:rPr>
                 <a:t>Системное</a:t>
               </a:r>
-              <a:r>
-                <a:rPr lang="ru-RU" kern="0" dirty="0">
-                  <a:solidFill>
-                    <a:srgbClr val="FFFFFF"/>
-                  </a:solidFill>
-                  <a:latin typeface="Arial"/>
-                  <a:cs typeface="Calibri" pitchFamily="34" charset="0"/>
-                </a:rPr>
-                <a:t/>
-              </a:r>
               <a:br>
                 <a:rPr lang="ru-RU" kern="0" dirty="0">
                   <a:solidFill>
@@ -18766,14 +18769,6 @@
   <p:clrMapOvr>
     <a:masterClrMapping/>
   </p:clrMapOvr>
-  <mc:AlternateContent xmlns:mc="http://schemas.openxmlformats.org/markup-compatibility/2006">
-    <mc:Choice xmlns:p14="http://schemas.microsoft.com/office/powerpoint/2010/main" Requires="p14">
-      <p:transition spd="slow" p14:dur="2000"/>
-    </mc:Choice>
-    <mc:Fallback>
-      <p:transition spd="slow"/>
-    </mc:Fallback>
-  </mc:AlternateContent>
 </p:sld>
 </file>
 
@@ -18987,10 +18982,6 @@
               <a:rPr lang="ru-RU" sz="2400" dirty="0"/>
               <a:t>Счетчики производительности для мониторинга памяти</a:t>
             </a:r>
-            <a:r>
-              <a:rPr lang="en-US" sz="2400" dirty="0"/>
-              <a:t/>
-            </a:r>
             <a:br>
               <a:rPr lang="en-US" sz="2400" dirty="0"/>
             </a:br>
@@ -19040,14 +19031,14 @@
                 <a:gridCol w="3312368">
                   <a:extLst>
                     <a:ext uri="{9D8B030D-6E8A-4147-A177-3AD203B41FA5}">
-                      <a16:colId xmlns:a16="http://schemas.microsoft.com/office/drawing/2014/main" xmlns="" val="20000"/>
+                      <a16:colId xmlns:a16="http://schemas.microsoft.com/office/drawing/2014/main" val="20000"/>
                     </a:ext>
                   </a:extLst>
                 </a:gridCol>
                 <a:gridCol w="4896544">
                   <a:extLst>
                     <a:ext uri="{9D8B030D-6E8A-4147-A177-3AD203B41FA5}">
-                      <a16:colId xmlns:a16="http://schemas.microsoft.com/office/drawing/2014/main" xmlns="" val="20001"/>
+                      <a16:colId xmlns:a16="http://schemas.microsoft.com/office/drawing/2014/main" val="20001"/>
                     </a:ext>
                   </a:extLst>
                 </a:gridCol>
@@ -19355,7 +19346,7 @@
                 </a:tc>
                 <a:extLst>
                   <a:ext uri="{0D108BD9-81ED-4DB2-BD59-A6C34878D82A}">
-                    <a16:rowId xmlns:a16="http://schemas.microsoft.com/office/drawing/2014/main" xmlns="" val="10000"/>
+                    <a16:rowId xmlns:a16="http://schemas.microsoft.com/office/drawing/2014/main" val="10000"/>
                   </a:ext>
                 </a:extLst>
               </a:tr>
@@ -19675,7 +19666,7 @@
                 </a:tc>
                 <a:extLst>
                   <a:ext uri="{0D108BD9-81ED-4DB2-BD59-A6C34878D82A}">
-                    <a16:rowId xmlns:a16="http://schemas.microsoft.com/office/drawing/2014/main" xmlns="" val="10001"/>
+                    <a16:rowId xmlns:a16="http://schemas.microsoft.com/office/drawing/2014/main" val="10001"/>
                   </a:ext>
                 </a:extLst>
               </a:tr>
@@ -20001,7 +19992,7 @@
                 </a:tc>
                 <a:extLst>
                   <a:ext uri="{0D108BD9-81ED-4DB2-BD59-A6C34878D82A}">
-                    <a16:rowId xmlns:a16="http://schemas.microsoft.com/office/drawing/2014/main" xmlns="" val="10002"/>
+                    <a16:rowId xmlns:a16="http://schemas.microsoft.com/office/drawing/2014/main" val="10002"/>
                   </a:ext>
                 </a:extLst>
               </a:tr>
@@ -20343,7 +20334,7 @@
                 </a:tc>
                 <a:extLst>
                   <a:ext uri="{0D108BD9-81ED-4DB2-BD59-A6C34878D82A}">
-                    <a16:rowId xmlns:a16="http://schemas.microsoft.com/office/drawing/2014/main" xmlns="" val="10003"/>
+                    <a16:rowId xmlns:a16="http://schemas.microsoft.com/office/drawing/2014/main" val="10003"/>
                   </a:ext>
                 </a:extLst>
               </a:tr>
@@ -20661,7 +20652,7 @@
                 </a:tc>
                 <a:extLst>
                   <a:ext uri="{0D108BD9-81ED-4DB2-BD59-A6C34878D82A}">
-                    <a16:rowId xmlns:a16="http://schemas.microsoft.com/office/drawing/2014/main" xmlns="" val="10004"/>
+                    <a16:rowId xmlns:a16="http://schemas.microsoft.com/office/drawing/2014/main" val="10004"/>
                   </a:ext>
                 </a:extLst>
               </a:tr>
@@ -21020,7 +21011,7 @@
                 </a:tc>
                 <a:extLst>
                   <a:ext uri="{0D108BD9-81ED-4DB2-BD59-A6C34878D82A}">
-                    <a16:rowId xmlns:a16="http://schemas.microsoft.com/office/drawing/2014/main" xmlns="" val="10005"/>
+                    <a16:rowId xmlns:a16="http://schemas.microsoft.com/office/drawing/2014/main" val="10005"/>
                   </a:ext>
                 </a:extLst>
               </a:tr>
@@ -21381,7 +21372,7 @@
                 </a:tc>
                 <a:extLst>
                   <a:ext uri="{0D108BD9-81ED-4DB2-BD59-A6C34878D82A}">
-                    <a16:rowId xmlns:a16="http://schemas.microsoft.com/office/drawing/2014/main" xmlns="" val="10006"/>
+                    <a16:rowId xmlns:a16="http://schemas.microsoft.com/office/drawing/2014/main" val="10006"/>
                   </a:ext>
                 </a:extLst>
               </a:tr>
@@ -21740,7 +21731,7 @@
                 </a:tc>
                 <a:extLst>
                   <a:ext uri="{0D108BD9-81ED-4DB2-BD59-A6C34878D82A}">
-                    <a16:rowId xmlns:a16="http://schemas.microsoft.com/office/drawing/2014/main" xmlns="" val="10007"/>
+                    <a16:rowId xmlns:a16="http://schemas.microsoft.com/office/drawing/2014/main" val="10007"/>
                   </a:ext>
                 </a:extLst>
               </a:tr>
@@ -22044,7 +22035,7 @@
                 </a:tc>
                 <a:extLst>
                   <a:ext uri="{0D108BD9-81ED-4DB2-BD59-A6C34878D82A}">
-                    <a16:rowId xmlns:a16="http://schemas.microsoft.com/office/drawing/2014/main" xmlns="" val="10008"/>
+                    <a16:rowId xmlns:a16="http://schemas.microsoft.com/office/drawing/2014/main" val="10008"/>
                   </a:ext>
                 </a:extLst>
               </a:tr>
@@ -22348,7 +22339,7 @@
                 </a:tc>
                 <a:extLst>
                   <a:ext uri="{0D108BD9-81ED-4DB2-BD59-A6C34878D82A}">
-                    <a16:rowId xmlns:a16="http://schemas.microsoft.com/office/drawing/2014/main" xmlns="" val="10009"/>
+                    <a16:rowId xmlns:a16="http://schemas.microsoft.com/office/drawing/2014/main" val="10009"/>
                   </a:ext>
                 </a:extLst>
               </a:tr>
@@ -22508,7 +22499,7 @@
                 </a:tc>
                 <a:extLst>
                   <a:ext uri="{0D108BD9-81ED-4DB2-BD59-A6C34878D82A}">
-                    <a16:rowId xmlns:a16="http://schemas.microsoft.com/office/drawing/2014/main" xmlns="" val="10010"/>
+                    <a16:rowId xmlns:a16="http://schemas.microsoft.com/office/drawing/2014/main" val="10010"/>
                   </a:ext>
                 </a:extLst>
               </a:tr>
@@ -22660,7 +22651,7 @@
                 </a:tc>
                 <a:extLst>
                   <a:ext uri="{0D108BD9-81ED-4DB2-BD59-A6C34878D82A}">
-                    <a16:rowId xmlns:a16="http://schemas.microsoft.com/office/drawing/2014/main" xmlns="" val="10011"/>
+                    <a16:rowId xmlns:a16="http://schemas.microsoft.com/office/drawing/2014/main" val="10011"/>
                   </a:ext>
                 </a:extLst>
               </a:tr>
@@ -22820,7 +22811,7 @@
                 </a:tc>
                 <a:extLst>
                   <a:ext uri="{0D108BD9-81ED-4DB2-BD59-A6C34878D82A}">
-                    <a16:rowId xmlns:a16="http://schemas.microsoft.com/office/drawing/2014/main" xmlns="" val="10012"/>
+                    <a16:rowId xmlns:a16="http://schemas.microsoft.com/office/drawing/2014/main" val="10012"/>
                   </a:ext>
                 </a:extLst>
               </a:tr>
@@ -22980,7 +22971,7 @@
                 </a:tc>
                 <a:extLst>
                   <a:ext uri="{0D108BD9-81ED-4DB2-BD59-A6C34878D82A}">
-                    <a16:rowId xmlns:a16="http://schemas.microsoft.com/office/drawing/2014/main" xmlns="" val="10013"/>
+                    <a16:rowId xmlns:a16="http://schemas.microsoft.com/office/drawing/2014/main" val="10013"/>
                   </a:ext>
                 </a:extLst>
               </a:tr>
@@ -23017,17 +23008,6 @@
                           <a:cs typeface="Consolas" panose="020B0609020204030204" pitchFamily="49" charset="0"/>
                         </a:rPr>
                         <a:t>Gen 1,2 heap size</a:t>
-                      </a:r>
-                      <a:r>
-                        <a:rPr lang="ru-RU" sz="1400" b="1" i="0" u="none" strike="noStrike" dirty="0">
-                          <a:solidFill>
-                            <a:schemeClr val="bg1"/>
-                          </a:solidFill>
-                          <a:effectLst/>
-                          <a:latin typeface="+mn-lt"/>
-                          <a:cs typeface="Consolas" panose="020B0609020204030204" pitchFamily="49" charset="0"/>
-                        </a:rPr>
-                        <a:t/>
                       </a:r>
                       <a:br>
                         <a:rPr lang="ru-RU" sz="1400" b="1" i="0" u="none" strike="noStrike" dirty="0">
@@ -23221,7 +23201,7 @@
                 </a:tc>
                 <a:extLst>
                   <a:ext uri="{0D108BD9-81ED-4DB2-BD59-A6C34878D82A}">
-                    <a16:rowId xmlns:a16="http://schemas.microsoft.com/office/drawing/2014/main" xmlns="" val="10014"/>
+                    <a16:rowId xmlns:a16="http://schemas.microsoft.com/office/drawing/2014/main" val="10014"/>
                   </a:ext>
                 </a:extLst>
               </a:tr>
@@ -23373,7 +23353,7 @@
                 </a:tc>
                 <a:extLst>
                   <a:ext uri="{0D108BD9-81ED-4DB2-BD59-A6C34878D82A}">
-                    <a16:rowId xmlns:a16="http://schemas.microsoft.com/office/drawing/2014/main" xmlns="" val="10015"/>
+                    <a16:rowId xmlns:a16="http://schemas.microsoft.com/office/drawing/2014/main" val="10015"/>
                   </a:ext>
                 </a:extLst>
               </a:tr>
@@ -23544,7 +23524,7 @@
                 </a:tc>
                 <a:extLst>
                   <a:ext uri="{0D108BD9-81ED-4DB2-BD59-A6C34878D82A}">
-                    <a16:rowId xmlns:a16="http://schemas.microsoft.com/office/drawing/2014/main" xmlns="" val="10016"/>
+                    <a16:rowId xmlns:a16="http://schemas.microsoft.com/office/drawing/2014/main" val="10016"/>
                   </a:ext>
                 </a:extLst>
               </a:tr>
@@ -23810,10 +23790,6 @@
             <a:r>
               <a:rPr lang="en-US" sz="3200" dirty="0"/>
               <a:t>Under the Hood of .NET Memory Management</a:t>
-            </a:r>
-            <a:r>
-              <a:rPr lang="ru-RU" sz="3200" dirty="0"/>
-              <a:t/>
             </a:r>
             <a:br>
               <a:rPr lang="ru-RU" sz="3200" dirty="0"/>

</xml_diff>